<commit_message>
updating the PMTL pipeline ppt
</commit_message>
<xml_diff>
--- a/presentations/PMTL_Embedding_Short.pptx
+++ b/presentations/PMTL_Embedding_Short.pptx
@@ -5,12 +5,21 @@
     <p:sldMasterId id="2147483672" r:id="rId4"/>
   </p:sldMasterIdLst>
   <p:notesMasterIdLst>
-    <p:notesMasterId r:id="rId8"/>
+    <p:notesMasterId r:id="rId17"/>
   </p:notesMasterIdLst>
   <p:sldIdLst>
     <p:sldId id="256" r:id="rId5"/>
-    <p:sldId id="257" r:id="rId6"/>
-    <p:sldId id="258" r:id="rId7"/>
+    <p:sldId id="259" r:id="rId6"/>
+    <p:sldId id="260" r:id="rId7"/>
+    <p:sldId id="265" r:id="rId8"/>
+    <p:sldId id="266" r:id="rId9"/>
+    <p:sldId id="267" r:id="rId10"/>
+    <p:sldId id="262" r:id="rId11"/>
+    <p:sldId id="261" r:id="rId12"/>
+    <p:sldId id="269" r:id="rId13"/>
+    <p:sldId id="268" r:id="rId14"/>
+    <p:sldId id="257" r:id="rId15"/>
+    <p:sldId id="258" r:id="rId16"/>
   </p:sldIdLst>
   <p:sldSz cx="12192000" cy="6858000"/>
   <p:notesSz cx="6858000" cy="9144000"/>
@@ -210,7 +219,7 @@
           <a:p>
             <a:fld id="{6B374326-AD78-4E67-8599-BA8A5604D89A}" type="datetimeFigureOut">
               <a:rPr lang="en-US" smtClean="0"/>
-              <a:t>3/17/21</a:t>
+              <a:t>4/25/24</a:t>
             </a:fld>
             <a:endParaRPr lang="en-US"/>
           </a:p>
@@ -1515,31 +1524,20 @@
             <p:ph type="ctrTitle"/>
           </p:nvPr>
         </p:nvSpPr>
-        <p:spPr/>
+        <p:spPr>
+          <a:xfrm>
+            <a:off x="180801" y="758309"/>
+            <a:ext cx="6320012" cy="1544541"/>
+          </a:xfrm>
+        </p:spPr>
         <p:txBody>
           <a:bodyPr/>
           <a:lstStyle/>
           <a:p>
-            <a:endParaRPr lang="en-US" dirty="0"/>
-          </a:p>
-        </p:txBody>
-      </p:sp>
-      <p:sp>
-        <p:nvSpPr>
-          <p:cNvPr id="5" name="Subtitle 4"/>
-          <p:cNvSpPr>
-            <a:spLocks noGrp="1"/>
-          </p:cNvSpPr>
-          <p:nvPr>
-            <p:ph type="subTitle" idx="1"/>
-          </p:nvPr>
-        </p:nvSpPr>
-        <p:spPr/>
-        <p:txBody>
-          <a:bodyPr/>
-          <a:lstStyle/>
-          <a:p>
-            <a:endParaRPr lang="en-US"/>
+            <a:r>
+              <a:rPr lang="en-US" dirty="0"/>
+              <a:t>A comprehensive pipeline for the Analysis of drug , target and Tumor databases</a:t>
+            </a:r>
           </a:p>
         </p:txBody>
       </p:sp>
@@ -1576,12 +1574,31 @@
             <p:ph type="body" sz="quarter" idx="13"/>
           </p:nvPr>
         </p:nvSpPr>
-        <p:spPr/>
+        <p:spPr>
+          <a:xfrm>
+            <a:off x="180975" y="4555149"/>
+            <a:ext cx="5577417" cy="502920"/>
+          </a:xfrm>
+        </p:spPr>
         <p:txBody>
           <a:bodyPr/>
           <a:lstStyle/>
           <a:p>
-            <a:endParaRPr lang="en-US"/>
+            <a:r>
+              <a:rPr lang="en-US" dirty="0"/>
+              <a:t>Aditya </a:t>
+            </a:r>
+            <a:r>
+              <a:rPr lang="en-US" dirty="0" err="1"/>
+              <a:t>Lahiri</a:t>
+            </a:r>
+            <a:r>
+              <a:rPr lang="en-US" dirty="0"/>
+              <a:t> and Deanne Taylor</a:t>
+            </a:r>
+          </a:p>
+          <a:p>
+            <a:endParaRPr lang="en-US" dirty="0"/>
           </a:p>
         </p:txBody>
       </p:sp>
@@ -1615,6 +1632,414 @@
     <p:extLst>
       <p:ext uri="{BB962C8B-B14F-4D97-AF65-F5344CB8AC3E}">
         <p14:creationId xmlns:p14="http://schemas.microsoft.com/office/powerpoint/2010/main" val="682876590"/>
+      </p:ext>
+    </p:extLst>
+  </p:cSld>
+  <p:clrMapOvr>
+    <a:masterClrMapping/>
+  </p:clrMapOvr>
+</p:sld>
+</file>
+
+<file path=ppt/slides/slide10.xml><?xml version="1.0" encoding="utf-8"?>
+<p:sld xmlns:a="http://schemas.openxmlformats.org/drawingml/2006/main" xmlns:r="http://schemas.openxmlformats.org/officeDocument/2006/relationships" xmlns:p="http://schemas.openxmlformats.org/presentationml/2006/main">
+  <p:cSld>
+    <p:spTree>
+      <p:nvGrpSpPr>
+        <p:cNvPr id="1" name=""/>
+        <p:cNvGrpSpPr/>
+        <p:nvPr/>
+      </p:nvGrpSpPr>
+      <p:grpSpPr>
+        <a:xfrm>
+          <a:off x="0" y="0"/>
+          <a:ext cx="0" cy="0"/>
+          <a:chOff x="0" y="0"/>
+          <a:chExt cx="0" cy="0"/>
+        </a:xfrm>
+      </p:grpSpPr>
+      <p:sp>
+        <p:nvSpPr>
+          <p:cNvPr id="2" name="Title 1"/>
+          <p:cNvSpPr>
+            <a:spLocks noGrp="1"/>
+          </p:cNvSpPr>
+          <p:nvPr>
+            <p:ph type="title"/>
+          </p:nvPr>
+        </p:nvSpPr>
+        <p:spPr>
+          <a:xfrm>
+            <a:off x="0" y="0"/>
+            <a:ext cx="9586155" cy="652524"/>
+          </a:xfrm>
+        </p:spPr>
+        <p:txBody>
+          <a:bodyPr/>
+          <a:lstStyle/>
+          <a:p>
+            <a:r>
+              <a:rPr lang="en-US" dirty="0"/>
+              <a:t>Pipeline summary: PMTLS </a:t>
+            </a:r>
+          </a:p>
+        </p:txBody>
+      </p:sp>
+      <p:sp>
+        <p:nvSpPr>
+          <p:cNvPr id="4" name="Slide Number Placeholder 3"/>
+          <p:cNvSpPr>
+            <a:spLocks noGrp="1"/>
+          </p:cNvSpPr>
+          <p:nvPr>
+            <p:ph type="sldNum" sz="quarter" idx="12"/>
+          </p:nvPr>
+        </p:nvSpPr>
+        <p:spPr/>
+        <p:txBody>
+          <a:bodyPr/>
+          <a:lstStyle/>
+          <a:p>
+            <a:fld id="{AD40181A-01B0-4CB8-8614-1473649F6741}" type="slidenum">
+              <a:rPr lang="en-US" smtClean="0">
+                <a:solidFill>
+                  <a:schemeClr val="bg1"/>
+                </a:solidFill>
+              </a:rPr>
+              <a:t>10</a:t>
+            </a:fld>
+            <a:endParaRPr lang="en-US" dirty="0">
+              <a:solidFill>
+                <a:schemeClr val="bg1"/>
+              </a:solidFill>
+            </a:endParaRPr>
+          </a:p>
+        </p:txBody>
+      </p:sp>
+      <p:sp>
+        <p:nvSpPr>
+          <p:cNvPr id="7" name="Content Placeholder 2">
+            <a:extLst>
+              <a:ext uri="{FF2B5EF4-FFF2-40B4-BE49-F238E27FC236}">
+                <a16:creationId xmlns:a16="http://schemas.microsoft.com/office/drawing/2014/main" id="{F49D6E59-7AD1-9F97-7C12-C9212E8C1DD0}"/>
+              </a:ext>
+            </a:extLst>
+          </p:cNvPr>
+          <p:cNvSpPr>
+            <a:spLocks noGrp="1"/>
+          </p:cNvSpPr>
+          <p:nvPr>
+            <p:ph idx="1"/>
+          </p:nvPr>
+        </p:nvSpPr>
+        <p:spPr>
+          <a:xfrm>
+            <a:off x="591116" y="1143000"/>
+            <a:ext cx="11600884" cy="4663440"/>
+          </a:xfrm>
+        </p:spPr>
+        <p:txBody>
+          <a:bodyPr>
+            <a:noAutofit/>
+          </a:bodyPr>
+          <a:lstStyle/>
+          <a:p>
+            <a:endParaRPr lang="en-US" sz="1800" dirty="0">
+              <a:solidFill>
+                <a:srgbClr val="000000"/>
+              </a:solidFill>
+            </a:endParaRPr>
+          </a:p>
+          <a:p>
+            <a:endParaRPr lang="en-US" sz="1800" dirty="0">
+              <a:solidFill>
+                <a:srgbClr val="000000"/>
+              </a:solidFill>
+            </a:endParaRPr>
+          </a:p>
+          <a:p>
+            <a:pPr marL="0" indent="0">
+              <a:buNone/>
+            </a:pPr>
+            <a:endParaRPr lang="en-US" sz="1800" dirty="0">
+              <a:solidFill>
+                <a:srgbClr val="000000"/>
+              </a:solidFill>
+            </a:endParaRPr>
+          </a:p>
+          <a:p>
+            <a:endParaRPr lang="en-US" sz="1800" dirty="0">
+              <a:solidFill>
+                <a:srgbClr val="000000"/>
+              </a:solidFill>
+            </a:endParaRPr>
+          </a:p>
+          <a:p>
+            <a:pPr marL="457200" lvl="1" indent="0">
+              <a:buNone/>
+            </a:pPr>
+            <a:endParaRPr lang="en-US" sz="1400" b="0" i="0" u="none" strike="noStrike" dirty="0">
+              <a:solidFill>
+                <a:srgbClr val="000000"/>
+              </a:solidFill>
+              <a:effectLst/>
+              <a:latin typeface="Arial" panose="020B0604020202020204" pitchFamily="34" charset="0"/>
+            </a:endParaRPr>
+          </a:p>
+          <a:p>
+            <a:endParaRPr lang="en-US" sz="1800" dirty="0">
+              <a:solidFill>
+                <a:srgbClr val="000000"/>
+              </a:solidFill>
+            </a:endParaRPr>
+          </a:p>
+          <a:p>
+            <a:endParaRPr lang="en-US" sz="1800" dirty="0">
+              <a:solidFill>
+                <a:srgbClr val="000000"/>
+              </a:solidFill>
+            </a:endParaRPr>
+          </a:p>
+          <a:p>
+            <a:endParaRPr lang="en-US" sz="1800" dirty="0">
+              <a:solidFill>
+                <a:srgbClr val="000000"/>
+              </a:solidFill>
+            </a:endParaRPr>
+          </a:p>
+          <a:p>
+            <a:endParaRPr lang="en-US" sz="1800" dirty="0">
+              <a:solidFill>
+                <a:srgbClr val="000000"/>
+              </a:solidFill>
+            </a:endParaRPr>
+          </a:p>
+          <a:p>
+            <a:endParaRPr lang="en-US" sz="1800" dirty="0">
+              <a:solidFill>
+                <a:srgbClr val="000000"/>
+              </a:solidFill>
+            </a:endParaRPr>
+          </a:p>
+          <a:p>
+            <a:endParaRPr lang="en-US" dirty="0"/>
+          </a:p>
+          <a:p>
+            <a:endParaRPr lang="en-US" dirty="0"/>
+          </a:p>
+        </p:txBody>
+      </p:sp>
+      <p:pic>
+        <p:nvPicPr>
+          <p:cNvPr id="5" name="Picture 4" descr="A screenshot of a cell phone&#10;&#10;Description automatically generated">
+            <a:extLst>
+              <a:ext uri="{FF2B5EF4-FFF2-40B4-BE49-F238E27FC236}">
+                <a16:creationId xmlns:a16="http://schemas.microsoft.com/office/drawing/2014/main" id="{6D56C6B2-8682-89D5-26B7-104FDF004FDD}"/>
+              </a:ext>
+            </a:extLst>
+          </p:cNvPr>
+          <p:cNvPicPr>
+            <a:picLocks noChangeAspect="1"/>
+          </p:cNvPicPr>
+          <p:nvPr/>
+        </p:nvPicPr>
+        <p:blipFill>
+          <a:blip r:embed="rId2">
+            <a:extLst>
+              <a:ext uri="{28A0092B-C50C-407E-A947-70E740481C1C}">
+                <a14:useLocalDpi xmlns:a14="http://schemas.microsoft.com/office/drawing/2010/main" val="0"/>
+              </a:ext>
+            </a:extLst>
+          </a:blip>
+          <a:stretch>
+            <a:fillRect/>
+          </a:stretch>
+        </p:blipFill>
+        <p:spPr>
+          <a:xfrm>
+            <a:off x="1729642" y="602775"/>
+            <a:ext cx="3153445" cy="5753577"/>
+          </a:xfrm>
+          <a:prstGeom prst="rect">
+            <a:avLst/>
+          </a:prstGeom>
+        </p:spPr>
+      </p:pic>
+    </p:spTree>
+    <p:extLst>
+      <p:ext uri="{BB962C8B-B14F-4D97-AF65-F5344CB8AC3E}">
+        <p14:creationId xmlns:p14="http://schemas.microsoft.com/office/powerpoint/2010/main" val="3808387762"/>
+      </p:ext>
+    </p:extLst>
+  </p:cSld>
+  <p:clrMapOvr>
+    <a:masterClrMapping/>
+  </p:clrMapOvr>
+</p:sld>
+</file>
+
+<file path=ppt/slides/slide11.xml><?xml version="1.0" encoding="utf-8"?>
+<p:sld xmlns:a="http://schemas.openxmlformats.org/drawingml/2006/main" xmlns:r="http://schemas.openxmlformats.org/officeDocument/2006/relationships" xmlns:p="http://schemas.openxmlformats.org/presentationml/2006/main">
+  <p:cSld>
+    <p:spTree>
+      <p:nvGrpSpPr>
+        <p:cNvPr id="1" name=""/>
+        <p:cNvGrpSpPr/>
+        <p:nvPr/>
+      </p:nvGrpSpPr>
+      <p:grpSpPr>
+        <a:xfrm>
+          <a:off x="0" y="0"/>
+          <a:ext cx="0" cy="0"/>
+          <a:chOff x="0" y="0"/>
+          <a:chExt cx="0" cy="0"/>
+        </a:xfrm>
+      </p:grpSpPr>
+      <p:sp>
+        <p:nvSpPr>
+          <p:cNvPr id="4" name="Slide Number Placeholder 3"/>
+          <p:cNvSpPr>
+            <a:spLocks noGrp="1"/>
+          </p:cNvSpPr>
+          <p:nvPr>
+            <p:ph type="sldNum" sz="quarter" idx="12"/>
+          </p:nvPr>
+        </p:nvSpPr>
+        <p:spPr/>
+        <p:txBody>
+          <a:bodyPr/>
+          <a:lstStyle/>
+          <a:p>
+            <a:fld id="{AD40181A-01B0-4CB8-8614-1473649F6741}" type="slidenum">
+              <a:rPr lang="en-US" smtClean="0">
+                <a:solidFill>
+                  <a:schemeClr val="bg1"/>
+                </a:solidFill>
+              </a:rPr>
+              <a:t>11</a:t>
+            </a:fld>
+            <a:endParaRPr lang="en-US" dirty="0">
+              <a:solidFill>
+                <a:schemeClr val="bg1"/>
+              </a:solidFill>
+            </a:endParaRPr>
+          </a:p>
+        </p:txBody>
+      </p:sp>
+      <p:sp>
+        <p:nvSpPr>
+          <p:cNvPr id="5" name="Content Placeholder 2">
+            <a:extLst>
+              <a:ext uri="{FF2B5EF4-FFF2-40B4-BE49-F238E27FC236}">
+                <a16:creationId xmlns:a16="http://schemas.microsoft.com/office/drawing/2014/main" id="{8418E8BD-8EC1-191C-A55A-3CC21F83C6FE}"/>
+              </a:ext>
+            </a:extLst>
+          </p:cNvPr>
+          <p:cNvSpPr>
+            <a:spLocks noGrp="1"/>
+          </p:cNvSpPr>
+          <p:nvPr>
+            <p:ph idx="1"/>
+          </p:nvPr>
+        </p:nvSpPr>
+        <p:spPr>
+          <a:xfrm>
+            <a:off x="1222053" y="1736231"/>
+            <a:ext cx="10651402" cy="3895344"/>
+          </a:xfrm>
+        </p:spPr>
+        <p:txBody>
+          <a:bodyPr/>
+          <a:lstStyle/>
+          <a:p>
+            <a:endParaRPr lang="en-US" dirty="0"/>
+          </a:p>
+        </p:txBody>
+      </p:sp>
+    </p:spTree>
+    <p:extLst>
+      <p:ext uri="{BB962C8B-B14F-4D97-AF65-F5344CB8AC3E}">
+        <p14:creationId xmlns:p14="http://schemas.microsoft.com/office/powerpoint/2010/main" val="334728898"/>
+      </p:ext>
+    </p:extLst>
+  </p:cSld>
+  <p:clrMapOvr>
+    <a:masterClrMapping/>
+  </p:clrMapOvr>
+</p:sld>
+</file>
+
+<file path=ppt/slides/slide12.xml><?xml version="1.0" encoding="utf-8"?>
+<p:sld xmlns:a="http://schemas.openxmlformats.org/drawingml/2006/main" xmlns:r="http://schemas.openxmlformats.org/officeDocument/2006/relationships" xmlns:p="http://schemas.openxmlformats.org/presentationml/2006/main">
+  <p:cSld>
+    <p:spTree>
+      <p:nvGrpSpPr>
+        <p:cNvPr id="1" name=""/>
+        <p:cNvGrpSpPr/>
+        <p:nvPr/>
+      </p:nvGrpSpPr>
+      <p:grpSpPr>
+        <a:xfrm>
+          <a:off x="0" y="0"/>
+          <a:ext cx="0" cy="0"/>
+          <a:chOff x="0" y="0"/>
+          <a:chExt cx="0" cy="0"/>
+        </a:xfrm>
+      </p:grpSpPr>
+      <p:sp>
+        <p:nvSpPr>
+          <p:cNvPr id="2" name="Slide Number Placeholder 1"/>
+          <p:cNvSpPr>
+            <a:spLocks noGrp="1"/>
+          </p:cNvSpPr>
+          <p:nvPr>
+            <p:ph type="sldNum" sz="quarter" idx="12"/>
+          </p:nvPr>
+        </p:nvSpPr>
+        <p:spPr/>
+        <p:txBody>
+          <a:bodyPr/>
+          <a:lstStyle/>
+          <a:p>
+            <a:fld id="{AD40181A-01B0-4CB8-8614-1473649F6741}" type="slidenum">
+              <a:rPr lang="en-US" smtClean="0">
+                <a:solidFill>
+                  <a:srgbClr val="FFFFFE"/>
+                </a:solidFill>
+              </a:rPr>
+              <a:t>12</a:t>
+            </a:fld>
+            <a:endParaRPr lang="en-US" dirty="0">
+              <a:solidFill>
+                <a:srgbClr val="FFFFFE"/>
+              </a:solidFill>
+            </a:endParaRPr>
+          </a:p>
+        </p:txBody>
+      </p:sp>
+      <p:sp>
+        <p:nvSpPr>
+          <p:cNvPr id="3" name="Title 2"/>
+          <p:cNvSpPr>
+            <a:spLocks noGrp="1"/>
+          </p:cNvSpPr>
+          <p:nvPr>
+            <p:ph type="title"/>
+          </p:nvPr>
+        </p:nvSpPr>
+        <p:spPr/>
+        <p:txBody>
+          <a:bodyPr/>
+          <a:lstStyle/>
+          <a:p>
+            <a:endParaRPr lang="en-US"/>
+          </a:p>
+        </p:txBody>
+      </p:sp>
+    </p:spTree>
+    <p:extLst>
+      <p:ext uri="{BB962C8B-B14F-4D97-AF65-F5344CB8AC3E}">
+        <p14:creationId xmlns:p14="http://schemas.microsoft.com/office/powerpoint/2010/main" val="3321473658"/>
       </p:ext>
     </p:extLst>
   </p:cSld>
@@ -1653,7 +2078,7 @@
         </p:nvSpPr>
         <p:spPr>
           <a:xfrm>
-            <a:off x="1222053" y="320156"/>
+            <a:off x="591117" y="0"/>
             <a:ext cx="10651402" cy="1143000"/>
           </a:xfrm>
         </p:spPr>
@@ -1661,7 +2086,10 @@
           <a:bodyPr/>
           <a:lstStyle/>
           <a:p>
-            <a:endParaRPr lang="en-US" dirty="0"/>
+            <a:r>
+              <a:rPr lang="en-US" dirty="0"/>
+              <a:t>Background</a:t>
+            </a:r>
           </a:p>
         </p:txBody>
       </p:sp>
@@ -1677,13 +2105,194 @@
         </p:nvSpPr>
         <p:spPr>
           <a:xfrm>
-            <a:off x="1222053" y="1736231"/>
-            <a:ext cx="10651402" cy="3895344"/>
+            <a:off x="591116" y="1143000"/>
+            <a:ext cx="11600884" cy="4663440"/>
           </a:xfrm>
         </p:spPr>
         <p:txBody>
-          <a:bodyPr/>
+          <a:bodyPr>
+            <a:noAutofit/>
+          </a:bodyPr>
           <a:lstStyle/>
+          <a:p>
+            <a:r>
+              <a:rPr lang="en-US" sz="1800" b="0" i="0" u="none" strike="noStrike" dirty="0">
+                <a:solidFill>
+                  <a:srgbClr val="000000"/>
+                </a:solidFill>
+                <a:effectLst/>
+                <a:latin typeface="Arial" panose="020B0604020202020204" pitchFamily="34" charset="0"/>
+              </a:rPr>
+              <a:t>There are multiple publicly available databases that outline drug-target ,  drug-disease, and disease-target relationships. </a:t>
+            </a:r>
+          </a:p>
+          <a:p>
+            <a:endParaRPr lang="en-US" sz="1800" dirty="0">
+              <a:solidFill>
+                <a:srgbClr val="000000"/>
+              </a:solidFill>
+            </a:endParaRPr>
+          </a:p>
+          <a:p>
+            <a:r>
+              <a:rPr lang="en-US" sz="1800" b="0" i="0" u="none" strike="noStrike" dirty="0">
+                <a:solidFill>
+                  <a:srgbClr val="000000"/>
+                </a:solidFill>
+                <a:effectLst/>
+                <a:latin typeface="Arial" panose="020B0604020202020204" pitchFamily="34" charset="0"/>
+              </a:rPr>
+              <a:t>However, there is a lack is a lack of publicly available resources that highlight these relationships for cancers , especially pediatric cancer.</a:t>
+            </a:r>
+          </a:p>
+          <a:p>
+            <a:pPr lvl="1"/>
+            <a:r>
+              <a:rPr lang="en-US" sz="1900" dirty="0">
+                <a:solidFill>
+                  <a:srgbClr val="000000"/>
+                </a:solidFill>
+                <a:latin typeface="Arial" panose="020B0604020202020204" pitchFamily="34" charset="0"/>
+              </a:rPr>
+              <a:t>Such a resource can help us understand the drug and target landscape for a particular cancer. </a:t>
+            </a:r>
+            <a:endParaRPr lang="en-US" sz="1900" b="0" i="0" u="none" strike="noStrike" dirty="0">
+              <a:solidFill>
+                <a:srgbClr val="000000"/>
+              </a:solidFill>
+              <a:effectLst/>
+              <a:latin typeface="Arial" panose="020B0604020202020204" pitchFamily="34" charset="0"/>
+            </a:endParaRPr>
+          </a:p>
+          <a:p>
+            <a:endParaRPr lang="en-US" sz="1800" dirty="0">
+              <a:solidFill>
+                <a:srgbClr val="000000"/>
+              </a:solidFill>
+            </a:endParaRPr>
+          </a:p>
+          <a:p>
+            <a:r>
+              <a:rPr lang="en-US" sz="1800" b="0" i="0" u="none" strike="noStrike" dirty="0">
+                <a:solidFill>
+                  <a:srgbClr val="000000"/>
+                </a:solidFill>
+                <a:effectLst/>
+                <a:latin typeface="Arial" panose="020B0604020202020204" pitchFamily="34" charset="0"/>
+              </a:rPr>
+              <a:t>Furthermore, there are limited publicly available resources which elucidate these relationships for drug and disease (specifically cancers) registered in clinical trials database.</a:t>
+            </a:r>
+          </a:p>
+          <a:p>
+            <a:pPr lvl="1"/>
+            <a:r>
+              <a:rPr lang="en-US" sz="1900" b="0" i="0" u="none" strike="noStrike" dirty="0">
+                <a:solidFill>
+                  <a:srgbClr val="000000"/>
+                </a:solidFill>
+                <a:effectLst/>
+                <a:latin typeface="Arial" panose="020B0604020202020204" pitchFamily="34" charset="0"/>
+              </a:rPr>
+              <a:t>In particular, there is a need to identify these relationships for the FDA Pediatric Molecular Target List (FDA-PMTL) , which contains over 400 pediatric cancer gene targets of interest.</a:t>
+            </a:r>
+          </a:p>
+          <a:p>
+            <a:endParaRPr lang="en-US" sz="1800" dirty="0">
+              <a:solidFill>
+                <a:srgbClr val="000000"/>
+              </a:solidFill>
+            </a:endParaRPr>
+          </a:p>
+          <a:p>
+            <a:r>
+              <a:rPr lang="en-US" sz="1800" b="0" i="0" u="none" strike="noStrike" dirty="0">
+                <a:solidFill>
+                  <a:srgbClr val="000000"/>
+                </a:solidFill>
+                <a:effectLst/>
+                <a:latin typeface="Arial" panose="020B0604020202020204" pitchFamily="34" charset="0"/>
+              </a:rPr>
+              <a:t> </a:t>
+            </a:r>
+            <a:r>
+              <a:rPr lang="en-US" sz="1800" b="0" i="0" u="none" strike="noStrike" dirty="0">
+                <a:solidFill>
+                  <a:schemeClr val="tx1"/>
+                </a:solidFill>
+                <a:effectLst/>
+                <a:latin typeface="Arial" panose="020B0604020202020204" pitchFamily="34" charset="0"/>
+              </a:rPr>
+              <a:t>We propose to build a pipeline that ingests data from major public databases </a:t>
+            </a:r>
+            <a:r>
+              <a:rPr lang="en-US" sz="1800" dirty="0">
+                <a:solidFill>
+                  <a:schemeClr val="tx1"/>
+                </a:solidFill>
+              </a:rPr>
+              <a:t>to </a:t>
+            </a:r>
+            <a:r>
+              <a:rPr lang="en-US" sz="1800" b="0" i="0" u="none" strike="noStrike" dirty="0">
+                <a:solidFill>
+                  <a:schemeClr val="tx1"/>
+                </a:solidFill>
+                <a:effectLst/>
+                <a:latin typeface="Arial" panose="020B0604020202020204" pitchFamily="34" charset="0"/>
+              </a:rPr>
+              <a:t>highlight the relationship among drug, cancer, and drug targets.</a:t>
+            </a:r>
+          </a:p>
+          <a:p>
+            <a:pPr marL="457200" lvl="1" indent="0">
+              <a:buNone/>
+            </a:pPr>
+            <a:endParaRPr lang="en-US" sz="1400" b="0" i="0" u="none" strike="noStrike" dirty="0">
+              <a:solidFill>
+                <a:srgbClr val="000000"/>
+              </a:solidFill>
+              <a:effectLst/>
+              <a:latin typeface="Arial" panose="020B0604020202020204" pitchFamily="34" charset="0"/>
+            </a:endParaRPr>
+          </a:p>
+          <a:p>
+            <a:endParaRPr lang="en-US" sz="1800" dirty="0">
+              <a:solidFill>
+                <a:srgbClr val="000000"/>
+              </a:solidFill>
+            </a:endParaRPr>
+          </a:p>
+          <a:p>
+            <a:endParaRPr lang="en-US" sz="1800" dirty="0">
+              <a:solidFill>
+                <a:srgbClr val="000000"/>
+              </a:solidFill>
+            </a:endParaRPr>
+          </a:p>
+          <a:p>
+            <a:endParaRPr lang="en-US" sz="1800" dirty="0">
+              <a:solidFill>
+                <a:srgbClr val="000000"/>
+              </a:solidFill>
+            </a:endParaRPr>
+          </a:p>
+          <a:p>
+            <a:endParaRPr lang="en-US" sz="1800" dirty="0">
+              <a:solidFill>
+                <a:srgbClr val="000000"/>
+              </a:solidFill>
+            </a:endParaRPr>
+          </a:p>
+          <a:p>
+            <a:endParaRPr lang="en-US" sz="1800" dirty="0">
+              <a:solidFill>
+                <a:srgbClr val="000000"/>
+              </a:solidFill>
+            </a:endParaRPr>
+          </a:p>
+          <a:p>
+            <a:endParaRPr lang="en-US" dirty="0"/>
+          </a:p>
           <a:p>
             <a:endParaRPr lang="en-US" dirty="0"/>
           </a:p>
@@ -1723,7 +2332,7 @@
     </p:spTree>
     <p:extLst>
       <p:ext uri="{BB962C8B-B14F-4D97-AF65-F5344CB8AC3E}">
-        <p14:creationId xmlns:p14="http://schemas.microsoft.com/office/powerpoint/2010/main" val="334728898"/>
+        <p14:creationId xmlns:p14="http://schemas.microsoft.com/office/powerpoint/2010/main" val="3902261152"/>
       </p:ext>
     </p:extLst>
   </p:cSld>
@@ -1752,7 +2361,34 @@
       </p:grpSpPr>
       <p:sp>
         <p:nvSpPr>
-          <p:cNvPr id="2" name="Slide Number Placeholder 1"/>
+          <p:cNvPr id="2" name="Title 1"/>
+          <p:cNvSpPr>
+            <a:spLocks noGrp="1"/>
+          </p:cNvSpPr>
+          <p:nvPr>
+            <p:ph type="title"/>
+          </p:nvPr>
+        </p:nvSpPr>
+        <p:spPr>
+          <a:xfrm>
+            <a:off x="591117" y="0"/>
+            <a:ext cx="10651402" cy="1143000"/>
+          </a:xfrm>
+        </p:spPr>
+        <p:txBody>
+          <a:bodyPr/>
+          <a:lstStyle/>
+          <a:p>
+            <a:r>
+              <a:rPr lang="en-US" dirty="0"/>
+              <a:t>Primary Databases : FDA PMTL</a:t>
+            </a:r>
+          </a:p>
+        </p:txBody>
+      </p:sp>
+      <p:sp>
+        <p:nvSpPr>
+          <p:cNvPr id="4" name="Slide Number Placeholder 3"/>
           <p:cNvSpPr>
             <a:spLocks noGrp="1"/>
           </p:cNvSpPr>
@@ -1768,27 +2404,261 @@
             <a:fld id="{AD40181A-01B0-4CB8-8614-1473649F6741}" type="slidenum">
               <a:rPr lang="en-US" smtClean="0">
                 <a:solidFill>
-                  <a:srgbClr val="FFFFFE"/>
+                  <a:schemeClr val="bg1"/>
                 </a:solidFill>
               </a:rPr>
               <a:t>3</a:t>
             </a:fld>
             <a:endParaRPr lang="en-US" dirty="0">
               <a:solidFill>
-                <a:srgbClr val="FFFFFE"/>
+                <a:schemeClr val="bg1"/>
               </a:solidFill>
             </a:endParaRPr>
+          </a:p>
+        </p:txBody>
+      </p:sp>
+      <p:pic>
+        <p:nvPicPr>
+          <p:cNvPr id="10" name="Picture 9" descr="A diagram of a diagram of a cylinder&#10;&#10;Description automatically generated">
+            <a:extLst>
+              <a:ext uri="{FF2B5EF4-FFF2-40B4-BE49-F238E27FC236}">
+                <a16:creationId xmlns:a16="http://schemas.microsoft.com/office/drawing/2014/main" id="{54D6C45A-A9BE-018A-FFFA-48006C0CFF0E}"/>
+              </a:ext>
+            </a:extLst>
+          </p:cNvPr>
+          <p:cNvPicPr>
+            <a:picLocks noChangeAspect="1"/>
+          </p:cNvPicPr>
+          <p:nvPr/>
+        </p:nvPicPr>
+        <p:blipFill>
+          <a:blip r:embed="rId2">
+            <a:extLst>
+              <a:ext uri="{28A0092B-C50C-407E-A947-70E740481C1C}">
+                <a14:useLocalDpi xmlns:a14="http://schemas.microsoft.com/office/drawing/2010/main" val="0"/>
+              </a:ext>
+            </a:extLst>
+          </a:blip>
+          <a:stretch>
+            <a:fillRect/>
+          </a:stretch>
+        </p:blipFill>
+        <p:spPr>
+          <a:xfrm>
+            <a:off x="2895407" y="815270"/>
+            <a:ext cx="5114737" cy="2762648"/>
+          </a:xfrm>
+          <a:prstGeom prst="rect">
+            <a:avLst/>
+          </a:prstGeom>
+        </p:spPr>
+      </p:pic>
+      <p:graphicFrame>
+        <p:nvGraphicFramePr>
+          <p:cNvPr id="11" name="Table 10">
+            <a:extLst>
+              <a:ext uri="{FF2B5EF4-FFF2-40B4-BE49-F238E27FC236}">
+                <a16:creationId xmlns:a16="http://schemas.microsoft.com/office/drawing/2014/main" id="{73872112-10E2-9AB1-C912-CB2C64F3EBE1}"/>
+              </a:ext>
+            </a:extLst>
+          </p:cNvPr>
+          <p:cNvGraphicFramePr>
+            <a:graphicFrameLocks noGrp="1"/>
+          </p:cNvGraphicFramePr>
+          <p:nvPr>
+            <p:extLst>
+              <p:ext uri="{D42A27DB-BD31-4B8C-83A1-F6EECF244321}">
+                <p14:modId xmlns:p14="http://schemas.microsoft.com/office/powerpoint/2010/main" val="723563373"/>
+              </p:ext>
+            </p:extLst>
+          </p:nvPr>
+        </p:nvGraphicFramePr>
+        <p:xfrm>
+          <a:off x="2904645" y="4775782"/>
+          <a:ext cx="6650738" cy="606119"/>
+        </p:xfrm>
+        <a:graphic>
+          <a:graphicData uri="http://schemas.openxmlformats.org/drawingml/2006/table">
+            <a:tbl>
+              <a:tblPr firstRow="1" bandRow="1">
+                <a:tableStyleId>{5C22544A-7EE6-4342-B048-85BDC9FD1C3A}</a:tableStyleId>
+              </a:tblPr>
+              <a:tblGrid>
+                <a:gridCol w="3568919">
+                  <a:extLst>
+                    <a:ext uri="{9D8B030D-6E8A-4147-A177-3AD203B41FA5}">
+                      <a16:colId xmlns:a16="http://schemas.microsoft.com/office/drawing/2014/main" val="2911442727"/>
+                    </a:ext>
+                  </a:extLst>
+                </a:gridCol>
+                <a:gridCol w="3081819">
+                  <a:extLst>
+                    <a:ext uri="{9D8B030D-6E8A-4147-A177-3AD203B41FA5}">
+                      <a16:colId xmlns:a16="http://schemas.microsoft.com/office/drawing/2014/main" val="4273447464"/>
+                    </a:ext>
+                  </a:extLst>
+                </a:gridCol>
+              </a:tblGrid>
+              <a:tr h="331799">
+                <a:tc>
+                  <a:txBody>
+                    <a:bodyPr/>
+                    <a:lstStyle/>
+                    <a:p>
+                      <a:r>
+                        <a:rPr lang="en-US" sz="1200" dirty="0"/>
+                        <a:t>Database</a:t>
+                      </a:r>
+                    </a:p>
+                  </a:txBody>
+                  <a:tcPr/>
+                </a:tc>
+                <a:tc>
+                  <a:txBody>
+                    <a:bodyPr/>
+                    <a:lstStyle/>
+                    <a:p>
+                      <a:r>
+                        <a:rPr lang="en-US" sz="1200" dirty="0"/>
+                        <a:t>Relationships Available</a:t>
+                      </a:r>
+                    </a:p>
+                  </a:txBody>
+                  <a:tcPr/>
+                </a:tc>
+                <a:extLst>
+                  <a:ext uri="{0D108BD9-81ED-4DB2-BD59-A6C34878D82A}">
+                    <a16:rowId xmlns:a16="http://schemas.microsoft.com/office/drawing/2014/main" val="3975797069"/>
+                  </a:ext>
+                </a:extLst>
+              </a:tr>
+              <a:tr h="216841">
+                <a:tc>
+                  <a:txBody>
+                    <a:bodyPr/>
+                    <a:lstStyle/>
+                    <a:p>
+                      <a:pPr marL="0" marR="0" lvl="0" indent="0" algn="l" defTabSz="914400" rtl="0" eaLnBrk="1" fontAlgn="auto" latinLnBrk="0" hangingPunct="1">
+                        <a:lnSpc>
+                          <a:spcPct val="100000"/>
+                        </a:lnSpc>
+                        <a:spcBef>
+                          <a:spcPts val="0"/>
+                        </a:spcBef>
+                        <a:spcAft>
+                          <a:spcPts val="0"/>
+                        </a:spcAft>
+                        <a:buClrTx/>
+                        <a:buSzTx/>
+                        <a:buFontTx/>
+                        <a:buNone/>
+                        <a:tabLst/>
+                        <a:defRPr/>
+                      </a:pPr>
+                      <a:r>
+                        <a:rPr lang="en-US" sz="1200" dirty="0">
+                          <a:solidFill>
+                            <a:schemeClr val="bg2"/>
+                          </a:solidFill>
+                        </a:rPr>
+                        <a:t>FDA PMTL</a:t>
+                      </a:r>
+                    </a:p>
+                  </a:txBody>
+                  <a:tcPr/>
+                </a:tc>
+                <a:tc>
+                  <a:txBody>
+                    <a:bodyPr/>
+                    <a:lstStyle/>
+                    <a:p>
+                      <a:r>
+                        <a:rPr lang="en-US" sz="1200" dirty="0">
+                          <a:solidFill>
+                            <a:schemeClr val="bg2"/>
+                          </a:solidFill>
+                        </a:rPr>
+                        <a:t>PMTL Genes  (Targets)</a:t>
+                      </a:r>
+                    </a:p>
+                  </a:txBody>
+                  <a:tcPr/>
+                </a:tc>
+                <a:extLst>
+                  <a:ext uri="{0D108BD9-81ED-4DB2-BD59-A6C34878D82A}">
+                    <a16:rowId xmlns:a16="http://schemas.microsoft.com/office/drawing/2014/main" val="969235357"/>
+                  </a:ext>
+                </a:extLst>
+              </a:tr>
+            </a:tbl>
+          </a:graphicData>
+        </a:graphic>
+      </p:graphicFrame>
+    </p:spTree>
+    <p:extLst>
+      <p:ext uri="{BB962C8B-B14F-4D97-AF65-F5344CB8AC3E}">
+        <p14:creationId xmlns:p14="http://schemas.microsoft.com/office/powerpoint/2010/main" val="3660203269"/>
+      </p:ext>
+    </p:extLst>
+  </p:cSld>
+  <p:clrMapOvr>
+    <a:masterClrMapping/>
+  </p:clrMapOvr>
+</p:sld>
+</file>
+
+<file path=ppt/slides/slide4.xml><?xml version="1.0" encoding="utf-8"?>
+<p:sld xmlns:a="http://schemas.openxmlformats.org/drawingml/2006/main" xmlns:r="http://schemas.openxmlformats.org/officeDocument/2006/relationships" xmlns:p="http://schemas.openxmlformats.org/presentationml/2006/main">
+  <p:cSld>
+    <p:spTree>
+      <p:nvGrpSpPr>
+        <p:cNvPr id="1" name=""/>
+        <p:cNvGrpSpPr/>
+        <p:nvPr/>
+      </p:nvGrpSpPr>
+      <p:grpSpPr>
+        <a:xfrm>
+          <a:off x="0" y="0"/>
+          <a:ext cx="0" cy="0"/>
+          <a:chOff x="0" y="0"/>
+          <a:chExt cx="0" cy="0"/>
+        </a:xfrm>
+      </p:grpSpPr>
+      <p:sp>
+        <p:nvSpPr>
+          <p:cNvPr id="2" name="Title 1"/>
+          <p:cNvSpPr>
+            <a:spLocks noGrp="1"/>
+          </p:cNvSpPr>
+          <p:nvPr>
+            <p:ph type="title"/>
+          </p:nvPr>
+        </p:nvSpPr>
+        <p:spPr>
+          <a:xfrm>
+            <a:off x="591117" y="0"/>
+            <a:ext cx="10651402" cy="1143000"/>
+          </a:xfrm>
+        </p:spPr>
+        <p:txBody>
+          <a:bodyPr/>
+          <a:lstStyle/>
+          <a:p>
+            <a:r>
+              <a:rPr lang="en-US" dirty="0"/>
+              <a:t>Primary Databases : Clinical Trials</a:t>
+            </a:r>
           </a:p>
         </p:txBody>
       </p:sp>
       <p:sp>
         <p:nvSpPr>
-          <p:cNvPr id="3" name="Title 2"/>
+          <p:cNvPr id="4" name="Slide Number Placeholder 3"/>
           <p:cNvSpPr>
             <a:spLocks noGrp="1"/>
           </p:cNvSpPr>
           <p:nvPr>
-            <p:ph type="title"/>
+            <p:ph type="sldNum" sz="quarter" idx="12"/>
           </p:nvPr>
         </p:nvSpPr>
         <p:spPr/>
@@ -1796,14 +2666,1769 @@
           <a:bodyPr/>
           <a:lstStyle/>
           <a:p>
-            <a:endParaRPr lang="en-US"/>
+            <a:fld id="{AD40181A-01B0-4CB8-8614-1473649F6741}" type="slidenum">
+              <a:rPr lang="en-US" smtClean="0">
+                <a:solidFill>
+                  <a:schemeClr val="bg1"/>
+                </a:solidFill>
+              </a:rPr>
+              <a:t>4</a:t>
+            </a:fld>
+            <a:endParaRPr lang="en-US" dirty="0">
+              <a:solidFill>
+                <a:schemeClr val="bg1"/>
+              </a:solidFill>
+            </a:endParaRPr>
           </a:p>
         </p:txBody>
       </p:sp>
+      <p:pic>
+        <p:nvPicPr>
+          <p:cNvPr id="5" name="Picture 4" descr="A diagram of a medical procedure&#10;&#10;Description automatically generated">
+            <a:extLst>
+              <a:ext uri="{FF2B5EF4-FFF2-40B4-BE49-F238E27FC236}">
+                <a16:creationId xmlns:a16="http://schemas.microsoft.com/office/drawing/2014/main" id="{3B1E731B-FF93-3A40-CC59-22C18CCC6D5A}"/>
+              </a:ext>
+            </a:extLst>
+          </p:cNvPr>
+          <p:cNvPicPr>
+            <a:picLocks noChangeAspect="1"/>
+          </p:cNvPicPr>
+          <p:nvPr/>
+        </p:nvPicPr>
+        <p:blipFill>
+          <a:blip r:embed="rId2">
+            <a:extLst>
+              <a:ext uri="{28A0092B-C50C-407E-A947-70E740481C1C}">
+                <a14:useLocalDpi xmlns:a14="http://schemas.microsoft.com/office/drawing/2010/main" val="0"/>
+              </a:ext>
+            </a:extLst>
+          </a:blip>
+          <a:stretch>
+            <a:fillRect/>
+          </a:stretch>
+        </p:blipFill>
+        <p:spPr>
+          <a:xfrm>
+            <a:off x="4354594" y="704088"/>
+            <a:ext cx="3124448" cy="4160520"/>
+          </a:xfrm>
+          <a:prstGeom prst="rect">
+            <a:avLst/>
+          </a:prstGeom>
+        </p:spPr>
+      </p:pic>
+      <p:graphicFrame>
+        <p:nvGraphicFramePr>
+          <p:cNvPr id="6" name="Table 5">
+            <a:extLst>
+              <a:ext uri="{FF2B5EF4-FFF2-40B4-BE49-F238E27FC236}">
+                <a16:creationId xmlns:a16="http://schemas.microsoft.com/office/drawing/2014/main" id="{B98E6A3E-CD44-C9BE-D1C9-F37C52E95B06}"/>
+              </a:ext>
+            </a:extLst>
+          </p:cNvPr>
+          <p:cNvGraphicFramePr>
+            <a:graphicFrameLocks noGrp="1"/>
+          </p:cNvGraphicFramePr>
+          <p:nvPr>
+            <p:extLst>
+              <p:ext uri="{D42A27DB-BD31-4B8C-83A1-F6EECF244321}">
+                <p14:modId xmlns:p14="http://schemas.microsoft.com/office/powerpoint/2010/main" val="3317365227"/>
+              </p:ext>
+            </p:extLst>
+          </p:nvPr>
+        </p:nvGraphicFramePr>
+        <p:xfrm>
+          <a:off x="3160677" y="5013526"/>
+          <a:ext cx="6650738" cy="788999"/>
+        </p:xfrm>
+        <a:graphic>
+          <a:graphicData uri="http://schemas.openxmlformats.org/drawingml/2006/table">
+            <a:tbl>
+              <a:tblPr firstRow="1" bandRow="1">
+                <a:tableStyleId>{5C22544A-7EE6-4342-B048-85BDC9FD1C3A}</a:tableStyleId>
+              </a:tblPr>
+              <a:tblGrid>
+                <a:gridCol w="3568919">
+                  <a:extLst>
+                    <a:ext uri="{9D8B030D-6E8A-4147-A177-3AD203B41FA5}">
+                      <a16:colId xmlns:a16="http://schemas.microsoft.com/office/drawing/2014/main" val="2911442727"/>
+                    </a:ext>
+                  </a:extLst>
+                </a:gridCol>
+                <a:gridCol w="3081819">
+                  <a:extLst>
+                    <a:ext uri="{9D8B030D-6E8A-4147-A177-3AD203B41FA5}">
+                      <a16:colId xmlns:a16="http://schemas.microsoft.com/office/drawing/2014/main" val="4273447464"/>
+                    </a:ext>
+                  </a:extLst>
+                </a:gridCol>
+              </a:tblGrid>
+              <a:tr h="331799">
+                <a:tc>
+                  <a:txBody>
+                    <a:bodyPr/>
+                    <a:lstStyle/>
+                    <a:p>
+                      <a:r>
+                        <a:rPr lang="en-US" sz="1200" dirty="0"/>
+                        <a:t>Database</a:t>
+                      </a:r>
+                    </a:p>
+                  </a:txBody>
+                  <a:tcPr/>
+                </a:tc>
+                <a:tc>
+                  <a:txBody>
+                    <a:bodyPr/>
+                    <a:lstStyle/>
+                    <a:p>
+                      <a:r>
+                        <a:rPr lang="en-US" sz="1200" dirty="0"/>
+                        <a:t>Relationships Available</a:t>
+                      </a:r>
+                    </a:p>
+                  </a:txBody>
+                  <a:tcPr/>
+                </a:tc>
+                <a:extLst>
+                  <a:ext uri="{0D108BD9-81ED-4DB2-BD59-A6C34878D82A}">
+                    <a16:rowId xmlns:a16="http://schemas.microsoft.com/office/drawing/2014/main" val="3975797069"/>
+                  </a:ext>
+                </a:extLst>
+              </a:tr>
+              <a:tr h="216841">
+                <a:tc>
+                  <a:txBody>
+                    <a:bodyPr/>
+                    <a:lstStyle/>
+                    <a:p>
+                      <a:r>
+                        <a:rPr lang="en-US" sz="1200" dirty="0">
+                          <a:solidFill>
+                            <a:schemeClr val="bg2"/>
+                          </a:solidFill>
+                        </a:rPr>
+                        <a:t>Clinical Trials (CT) </a:t>
+                      </a:r>
+                    </a:p>
+                  </a:txBody>
+                  <a:tcPr/>
+                </a:tc>
+                <a:tc>
+                  <a:txBody>
+                    <a:bodyPr/>
+                    <a:lstStyle/>
+                    <a:p>
+                      <a:r>
+                        <a:rPr lang="en-US" sz="1200" dirty="0">
+                          <a:solidFill>
+                            <a:schemeClr val="bg2"/>
+                          </a:solidFill>
+                        </a:rPr>
+                        <a:t>Drugs  associated with a clinical trial ID</a:t>
+                      </a:r>
+                      <a:br>
+                        <a:rPr lang="en-US" sz="1200" dirty="0">
+                          <a:solidFill>
+                            <a:schemeClr val="bg2"/>
+                          </a:solidFill>
+                        </a:rPr>
+                      </a:br>
+                      <a:r>
+                        <a:rPr lang="en-US" sz="1200" dirty="0">
+                          <a:solidFill>
+                            <a:schemeClr val="bg2"/>
+                          </a:solidFill>
+                        </a:rPr>
+                        <a:t>Diseases associated with a clinical trial ID</a:t>
+                      </a:r>
+                    </a:p>
+                  </a:txBody>
+                  <a:tcPr/>
+                </a:tc>
+                <a:extLst>
+                  <a:ext uri="{0D108BD9-81ED-4DB2-BD59-A6C34878D82A}">
+                    <a16:rowId xmlns:a16="http://schemas.microsoft.com/office/drawing/2014/main" val="969235357"/>
+                  </a:ext>
+                </a:extLst>
+              </a:tr>
+            </a:tbl>
+          </a:graphicData>
+        </a:graphic>
+      </p:graphicFrame>
     </p:spTree>
     <p:extLst>
       <p:ext uri="{BB962C8B-B14F-4D97-AF65-F5344CB8AC3E}">
-        <p14:creationId xmlns:p14="http://schemas.microsoft.com/office/powerpoint/2010/main" val="3321473658"/>
+        <p14:creationId xmlns:p14="http://schemas.microsoft.com/office/powerpoint/2010/main" val="3846043930"/>
+      </p:ext>
+    </p:extLst>
+  </p:cSld>
+  <p:clrMapOvr>
+    <a:masterClrMapping/>
+  </p:clrMapOvr>
+</p:sld>
+</file>
+
+<file path=ppt/slides/slide5.xml><?xml version="1.0" encoding="utf-8"?>
+<p:sld xmlns:a="http://schemas.openxmlformats.org/drawingml/2006/main" xmlns:r="http://schemas.openxmlformats.org/officeDocument/2006/relationships" xmlns:p="http://schemas.openxmlformats.org/presentationml/2006/main">
+  <p:cSld>
+    <p:spTree>
+      <p:nvGrpSpPr>
+        <p:cNvPr id="1" name=""/>
+        <p:cNvGrpSpPr/>
+        <p:nvPr/>
+      </p:nvGrpSpPr>
+      <p:grpSpPr>
+        <a:xfrm>
+          <a:off x="0" y="0"/>
+          <a:ext cx="0" cy="0"/>
+          <a:chOff x="0" y="0"/>
+          <a:chExt cx="0" cy="0"/>
+        </a:xfrm>
+      </p:grpSpPr>
+      <p:sp>
+        <p:nvSpPr>
+          <p:cNvPr id="2" name="Title 1"/>
+          <p:cNvSpPr>
+            <a:spLocks noGrp="1"/>
+          </p:cNvSpPr>
+          <p:nvPr>
+            <p:ph type="title"/>
+          </p:nvPr>
+        </p:nvSpPr>
+        <p:spPr>
+          <a:xfrm>
+            <a:off x="591117" y="0"/>
+            <a:ext cx="10651402" cy="1143000"/>
+          </a:xfrm>
+        </p:spPr>
+        <p:txBody>
+          <a:bodyPr/>
+          <a:lstStyle/>
+          <a:p>
+            <a:r>
+              <a:rPr lang="en-US" dirty="0"/>
+              <a:t>Primary Databases : Open Targets</a:t>
+            </a:r>
+          </a:p>
+        </p:txBody>
+      </p:sp>
+      <p:sp>
+        <p:nvSpPr>
+          <p:cNvPr id="4" name="Slide Number Placeholder 3"/>
+          <p:cNvSpPr>
+            <a:spLocks noGrp="1"/>
+          </p:cNvSpPr>
+          <p:nvPr>
+            <p:ph type="sldNum" sz="quarter" idx="12"/>
+          </p:nvPr>
+        </p:nvSpPr>
+        <p:spPr/>
+        <p:txBody>
+          <a:bodyPr/>
+          <a:lstStyle/>
+          <a:p>
+            <a:fld id="{AD40181A-01B0-4CB8-8614-1473649F6741}" type="slidenum">
+              <a:rPr lang="en-US" smtClean="0">
+                <a:solidFill>
+                  <a:schemeClr val="bg1"/>
+                </a:solidFill>
+              </a:rPr>
+              <a:t>5</a:t>
+            </a:fld>
+            <a:endParaRPr lang="en-US" dirty="0">
+              <a:solidFill>
+                <a:schemeClr val="bg1"/>
+              </a:solidFill>
+            </a:endParaRPr>
+          </a:p>
+        </p:txBody>
+      </p:sp>
+      <p:graphicFrame>
+        <p:nvGraphicFramePr>
+          <p:cNvPr id="6" name="Table 5">
+            <a:extLst>
+              <a:ext uri="{FF2B5EF4-FFF2-40B4-BE49-F238E27FC236}">
+                <a16:creationId xmlns:a16="http://schemas.microsoft.com/office/drawing/2014/main" id="{B98E6A3E-CD44-C9BE-D1C9-F37C52E95B06}"/>
+              </a:ext>
+            </a:extLst>
+          </p:cNvPr>
+          <p:cNvGraphicFramePr>
+            <a:graphicFrameLocks noGrp="1"/>
+          </p:cNvGraphicFramePr>
+          <p:nvPr>
+            <p:extLst>
+              <p:ext uri="{D42A27DB-BD31-4B8C-83A1-F6EECF244321}">
+                <p14:modId xmlns:p14="http://schemas.microsoft.com/office/powerpoint/2010/main" val="3416826399"/>
+              </p:ext>
+            </p:extLst>
+          </p:nvPr>
+        </p:nvGraphicFramePr>
+        <p:xfrm>
+          <a:off x="3206397" y="4757494"/>
+          <a:ext cx="6650738" cy="971879"/>
+        </p:xfrm>
+        <a:graphic>
+          <a:graphicData uri="http://schemas.openxmlformats.org/drawingml/2006/table">
+            <a:tbl>
+              <a:tblPr firstRow="1" bandRow="1">
+                <a:tableStyleId>{5C22544A-7EE6-4342-B048-85BDC9FD1C3A}</a:tableStyleId>
+              </a:tblPr>
+              <a:tblGrid>
+                <a:gridCol w="3568919">
+                  <a:extLst>
+                    <a:ext uri="{9D8B030D-6E8A-4147-A177-3AD203B41FA5}">
+                      <a16:colId xmlns:a16="http://schemas.microsoft.com/office/drawing/2014/main" val="2911442727"/>
+                    </a:ext>
+                  </a:extLst>
+                </a:gridCol>
+                <a:gridCol w="3081819">
+                  <a:extLst>
+                    <a:ext uri="{9D8B030D-6E8A-4147-A177-3AD203B41FA5}">
+                      <a16:colId xmlns:a16="http://schemas.microsoft.com/office/drawing/2014/main" val="4273447464"/>
+                    </a:ext>
+                  </a:extLst>
+                </a:gridCol>
+              </a:tblGrid>
+              <a:tr h="331799">
+                <a:tc>
+                  <a:txBody>
+                    <a:bodyPr/>
+                    <a:lstStyle/>
+                    <a:p>
+                      <a:r>
+                        <a:rPr lang="en-US" sz="1200" dirty="0"/>
+                        <a:t>Database</a:t>
+                      </a:r>
+                    </a:p>
+                  </a:txBody>
+                  <a:tcPr/>
+                </a:tc>
+                <a:tc>
+                  <a:txBody>
+                    <a:bodyPr/>
+                    <a:lstStyle/>
+                    <a:p>
+                      <a:r>
+                        <a:rPr lang="en-US" sz="1200" dirty="0"/>
+                        <a:t>Relationships Available</a:t>
+                      </a:r>
+                    </a:p>
+                  </a:txBody>
+                  <a:tcPr/>
+                </a:tc>
+                <a:extLst>
+                  <a:ext uri="{0D108BD9-81ED-4DB2-BD59-A6C34878D82A}">
+                    <a16:rowId xmlns:a16="http://schemas.microsoft.com/office/drawing/2014/main" val="3975797069"/>
+                  </a:ext>
+                </a:extLst>
+              </a:tr>
+              <a:tr h="216841">
+                <a:tc>
+                  <a:txBody>
+                    <a:bodyPr/>
+                    <a:lstStyle/>
+                    <a:p>
+                      <a:r>
+                        <a:rPr lang="en-US" sz="1200" dirty="0">
+                          <a:solidFill>
+                            <a:schemeClr val="bg2"/>
+                          </a:solidFill>
+                        </a:rPr>
+                        <a:t>Open Targets (OT)</a:t>
+                      </a:r>
+                    </a:p>
+                  </a:txBody>
+                  <a:tcPr/>
+                </a:tc>
+                <a:tc>
+                  <a:txBody>
+                    <a:bodyPr/>
+                    <a:lstStyle/>
+                    <a:p>
+                      <a:r>
+                        <a:rPr lang="en-US" sz="1200" dirty="0">
+                          <a:solidFill>
+                            <a:schemeClr val="bg2"/>
+                          </a:solidFill>
+                        </a:rPr>
+                        <a:t>Drug – Target relationship </a:t>
+                      </a:r>
+                      <a:br>
+                        <a:rPr lang="en-US" sz="1200" dirty="0">
+                          <a:solidFill>
+                            <a:schemeClr val="bg2"/>
+                          </a:solidFill>
+                        </a:rPr>
+                      </a:br>
+                      <a:r>
+                        <a:rPr lang="en-US" sz="1200" dirty="0">
+                          <a:solidFill>
+                            <a:schemeClr val="bg2"/>
+                          </a:solidFill>
+                        </a:rPr>
+                        <a:t>Drug – Disease relationship </a:t>
+                      </a:r>
+                    </a:p>
+                    <a:p>
+                      <a:r>
+                        <a:rPr lang="en-US" sz="1200" dirty="0">
+                          <a:solidFill>
+                            <a:schemeClr val="bg2"/>
+                          </a:solidFill>
+                        </a:rPr>
+                        <a:t>Disease – Target relationship</a:t>
+                      </a:r>
+                    </a:p>
+                  </a:txBody>
+                  <a:tcPr/>
+                </a:tc>
+                <a:extLst>
+                  <a:ext uri="{0D108BD9-81ED-4DB2-BD59-A6C34878D82A}">
+                    <a16:rowId xmlns:a16="http://schemas.microsoft.com/office/drawing/2014/main" val="969235357"/>
+                  </a:ext>
+                </a:extLst>
+              </a:tr>
+            </a:tbl>
+          </a:graphicData>
+        </a:graphic>
+      </p:graphicFrame>
+      <p:pic>
+        <p:nvPicPr>
+          <p:cNvPr id="7" name="Picture 6" descr="A diagram of a diagram of a target&#10;&#10;Description automatically generated with medium confidence">
+            <a:extLst>
+              <a:ext uri="{FF2B5EF4-FFF2-40B4-BE49-F238E27FC236}">
+                <a16:creationId xmlns:a16="http://schemas.microsoft.com/office/drawing/2014/main" id="{DE2A1DD0-F029-5744-78A0-693A816D02A9}"/>
+              </a:ext>
+            </a:extLst>
+          </p:cNvPr>
+          <p:cNvPicPr>
+            <a:picLocks noChangeAspect="1"/>
+          </p:cNvPicPr>
+          <p:nvPr/>
+        </p:nvPicPr>
+        <p:blipFill>
+          <a:blip r:embed="rId2">
+            <a:extLst>
+              <a:ext uri="{28A0092B-C50C-407E-A947-70E740481C1C}">
+                <a14:useLocalDpi xmlns:a14="http://schemas.microsoft.com/office/drawing/2010/main" val="0"/>
+              </a:ext>
+            </a:extLst>
+          </a:blip>
+          <a:stretch>
+            <a:fillRect/>
+          </a:stretch>
+        </p:blipFill>
+        <p:spPr>
+          <a:xfrm>
+            <a:off x="3398997" y="1055475"/>
+            <a:ext cx="5394006" cy="3954068"/>
+          </a:xfrm>
+          <a:prstGeom prst="rect">
+            <a:avLst/>
+          </a:prstGeom>
+        </p:spPr>
+      </p:pic>
+    </p:spTree>
+    <p:extLst>
+      <p:ext uri="{BB962C8B-B14F-4D97-AF65-F5344CB8AC3E}">
+        <p14:creationId xmlns:p14="http://schemas.microsoft.com/office/powerpoint/2010/main" val="4044993693"/>
+      </p:ext>
+    </p:extLst>
+  </p:cSld>
+  <p:clrMapOvr>
+    <a:masterClrMapping/>
+  </p:clrMapOvr>
+</p:sld>
+</file>
+
+<file path=ppt/slides/slide6.xml><?xml version="1.0" encoding="utf-8"?>
+<p:sld xmlns:a="http://schemas.openxmlformats.org/drawingml/2006/main" xmlns:r="http://schemas.openxmlformats.org/officeDocument/2006/relationships" xmlns:p="http://schemas.openxmlformats.org/presentationml/2006/main">
+  <p:cSld>
+    <p:spTree>
+      <p:nvGrpSpPr>
+        <p:cNvPr id="1" name=""/>
+        <p:cNvGrpSpPr/>
+        <p:nvPr/>
+      </p:nvGrpSpPr>
+      <p:grpSpPr>
+        <a:xfrm>
+          <a:off x="0" y="0"/>
+          <a:ext cx="0" cy="0"/>
+          <a:chOff x="0" y="0"/>
+          <a:chExt cx="0" cy="0"/>
+        </a:xfrm>
+      </p:grpSpPr>
+      <p:sp>
+        <p:nvSpPr>
+          <p:cNvPr id="2" name="Title 1"/>
+          <p:cNvSpPr>
+            <a:spLocks noGrp="1"/>
+          </p:cNvSpPr>
+          <p:nvPr>
+            <p:ph type="title"/>
+          </p:nvPr>
+        </p:nvSpPr>
+        <p:spPr>
+          <a:xfrm>
+            <a:off x="426525" y="237744"/>
+            <a:ext cx="10651402" cy="1143000"/>
+          </a:xfrm>
+        </p:spPr>
+        <p:txBody>
+          <a:bodyPr/>
+          <a:lstStyle/>
+          <a:p>
+            <a:r>
+              <a:rPr lang="en-US" dirty="0"/>
+              <a:t>Primary Databases : Illuminating the Druggable Genome</a:t>
+            </a:r>
+            <a:br>
+              <a:rPr lang="en-US" sz="3600" b="0" dirty="0"/>
+            </a:br>
+            <a:endParaRPr lang="en-US" dirty="0"/>
+          </a:p>
+        </p:txBody>
+      </p:sp>
+      <p:sp>
+        <p:nvSpPr>
+          <p:cNvPr id="4" name="Slide Number Placeholder 3"/>
+          <p:cNvSpPr>
+            <a:spLocks noGrp="1"/>
+          </p:cNvSpPr>
+          <p:nvPr>
+            <p:ph type="sldNum" sz="quarter" idx="12"/>
+          </p:nvPr>
+        </p:nvSpPr>
+        <p:spPr/>
+        <p:txBody>
+          <a:bodyPr/>
+          <a:lstStyle/>
+          <a:p>
+            <a:fld id="{AD40181A-01B0-4CB8-8614-1473649F6741}" type="slidenum">
+              <a:rPr lang="en-US" smtClean="0">
+                <a:solidFill>
+                  <a:schemeClr val="bg1"/>
+                </a:solidFill>
+              </a:rPr>
+              <a:t>6</a:t>
+            </a:fld>
+            <a:endParaRPr lang="en-US" dirty="0">
+              <a:solidFill>
+                <a:schemeClr val="bg1"/>
+              </a:solidFill>
+            </a:endParaRPr>
+          </a:p>
+        </p:txBody>
+      </p:sp>
+      <p:graphicFrame>
+        <p:nvGraphicFramePr>
+          <p:cNvPr id="6" name="Table 5">
+            <a:extLst>
+              <a:ext uri="{FF2B5EF4-FFF2-40B4-BE49-F238E27FC236}">
+                <a16:creationId xmlns:a16="http://schemas.microsoft.com/office/drawing/2014/main" id="{B98E6A3E-CD44-C9BE-D1C9-F37C52E95B06}"/>
+              </a:ext>
+            </a:extLst>
+          </p:cNvPr>
+          <p:cNvGraphicFramePr>
+            <a:graphicFrameLocks noGrp="1"/>
+          </p:cNvGraphicFramePr>
+          <p:nvPr>
+            <p:extLst>
+              <p:ext uri="{D42A27DB-BD31-4B8C-83A1-F6EECF244321}">
+                <p14:modId xmlns:p14="http://schemas.microsoft.com/office/powerpoint/2010/main" val="1445289813"/>
+              </p:ext>
+            </p:extLst>
+          </p:nvPr>
+        </p:nvGraphicFramePr>
+        <p:xfrm>
+          <a:off x="3206397" y="4757494"/>
+          <a:ext cx="6650738" cy="971879"/>
+        </p:xfrm>
+        <a:graphic>
+          <a:graphicData uri="http://schemas.openxmlformats.org/drawingml/2006/table">
+            <a:tbl>
+              <a:tblPr firstRow="1" bandRow="1">
+                <a:tableStyleId>{5C22544A-7EE6-4342-B048-85BDC9FD1C3A}</a:tableStyleId>
+              </a:tblPr>
+              <a:tblGrid>
+                <a:gridCol w="3568919">
+                  <a:extLst>
+                    <a:ext uri="{9D8B030D-6E8A-4147-A177-3AD203B41FA5}">
+                      <a16:colId xmlns:a16="http://schemas.microsoft.com/office/drawing/2014/main" val="2911442727"/>
+                    </a:ext>
+                  </a:extLst>
+                </a:gridCol>
+                <a:gridCol w="3081819">
+                  <a:extLst>
+                    <a:ext uri="{9D8B030D-6E8A-4147-A177-3AD203B41FA5}">
+                      <a16:colId xmlns:a16="http://schemas.microsoft.com/office/drawing/2014/main" val="4273447464"/>
+                    </a:ext>
+                  </a:extLst>
+                </a:gridCol>
+              </a:tblGrid>
+              <a:tr h="331799">
+                <a:tc>
+                  <a:txBody>
+                    <a:bodyPr/>
+                    <a:lstStyle/>
+                    <a:p>
+                      <a:r>
+                        <a:rPr lang="en-US" sz="1200" dirty="0"/>
+                        <a:t>Database</a:t>
+                      </a:r>
+                    </a:p>
+                  </a:txBody>
+                  <a:tcPr/>
+                </a:tc>
+                <a:tc>
+                  <a:txBody>
+                    <a:bodyPr/>
+                    <a:lstStyle/>
+                    <a:p>
+                      <a:r>
+                        <a:rPr lang="en-US" sz="1200" dirty="0"/>
+                        <a:t>Relationships Available</a:t>
+                      </a:r>
+                    </a:p>
+                  </a:txBody>
+                  <a:tcPr/>
+                </a:tc>
+                <a:extLst>
+                  <a:ext uri="{0D108BD9-81ED-4DB2-BD59-A6C34878D82A}">
+                    <a16:rowId xmlns:a16="http://schemas.microsoft.com/office/drawing/2014/main" val="3975797069"/>
+                  </a:ext>
+                </a:extLst>
+              </a:tr>
+              <a:tr h="216841">
+                <a:tc>
+                  <a:txBody>
+                    <a:bodyPr/>
+                    <a:lstStyle/>
+                    <a:p>
+                      <a:r>
+                        <a:rPr lang="en-US" sz="1200" b="0" dirty="0">
+                          <a:solidFill>
+                            <a:schemeClr val="bg2"/>
+                          </a:solidFill>
+                        </a:rPr>
+                        <a:t>Illuminating the Druggable Genome (IDG)</a:t>
+                      </a:r>
+                    </a:p>
+                  </a:txBody>
+                  <a:tcPr/>
+                </a:tc>
+                <a:tc>
+                  <a:txBody>
+                    <a:bodyPr/>
+                    <a:lstStyle/>
+                    <a:p>
+                      <a:r>
+                        <a:rPr lang="en-US" sz="1200" dirty="0">
+                          <a:solidFill>
+                            <a:schemeClr val="bg2"/>
+                          </a:solidFill>
+                        </a:rPr>
+                        <a:t>Drug – Target relationship </a:t>
+                      </a:r>
+                      <a:br>
+                        <a:rPr lang="en-US" sz="1200" dirty="0">
+                          <a:solidFill>
+                            <a:schemeClr val="bg2"/>
+                          </a:solidFill>
+                        </a:rPr>
+                      </a:br>
+                      <a:r>
+                        <a:rPr lang="en-US" sz="1200" dirty="0">
+                          <a:solidFill>
+                            <a:schemeClr val="bg2"/>
+                          </a:solidFill>
+                        </a:rPr>
+                        <a:t>Drug – Disease relationship </a:t>
+                      </a:r>
+                    </a:p>
+                    <a:p>
+                      <a:r>
+                        <a:rPr lang="en-US" sz="1200" dirty="0">
+                          <a:solidFill>
+                            <a:schemeClr val="bg2"/>
+                          </a:solidFill>
+                        </a:rPr>
+                        <a:t>Disease – Target relationship</a:t>
+                      </a:r>
+                    </a:p>
+                  </a:txBody>
+                  <a:tcPr/>
+                </a:tc>
+                <a:extLst>
+                  <a:ext uri="{0D108BD9-81ED-4DB2-BD59-A6C34878D82A}">
+                    <a16:rowId xmlns:a16="http://schemas.microsoft.com/office/drawing/2014/main" val="969235357"/>
+                  </a:ext>
+                </a:extLst>
+              </a:tr>
+            </a:tbl>
+          </a:graphicData>
+        </a:graphic>
+      </p:graphicFrame>
+      <p:pic>
+        <p:nvPicPr>
+          <p:cNvPr id="5" name="Picture 4" descr="A group of circles with text&#10;&#10;Description automatically generated">
+            <a:extLst>
+              <a:ext uri="{FF2B5EF4-FFF2-40B4-BE49-F238E27FC236}">
+                <a16:creationId xmlns:a16="http://schemas.microsoft.com/office/drawing/2014/main" id="{7B4CDCEE-4B24-3347-4BFD-50F5343A5F9F}"/>
+              </a:ext>
+            </a:extLst>
+          </p:cNvPr>
+          <p:cNvPicPr>
+            <a:picLocks noChangeAspect="1"/>
+          </p:cNvPicPr>
+          <p:nvPr/>
+        </p:nvPicPr>
+        <p:blipFill>
+          <a:blip r:embed="rId2">
+            <a:extLst>
+              <a:ext uri="{28A0092B-C50C-407E-A947-70E740481C1C}">
+                <a14:useLocalDpi xmlns:a14="http://schemas.microsoft.com/office/drawing/2010/main" val="0"/>
+              </a:ext>
+            </a:extLst>
+          </a:blip>
+          <a:stretch>
+            <a:fillRect/>
+          </a:stretch>
+        </p:blipFill>
+        <p:spPr>
+          <a:xfrm>
+            <a:off x="3029760" y="942458"/>
+            <a:ext cx="5903928" cy="3700266"/>
+          </a:xfrm>
+          <a:prstGeom prst="rect">
+            <a:avLst/>
+          </a:prstGeom>
+        </p:spPr>
+      </p:pic>
+    </p:spTree>
+    <p:extLst>
+      <p:ext uri="{BB962C8B-B14F-4D97-AF65-F5344CB8AC3E}">
+        <p14:creationId xmlns:p14="http://schemas.microsoft.com/office/powerpoint/2010/main" val="3225231431"/>
+      </p:ext>
+    </p:extLst>
+  </p:cSld>
+  <p:clrMapOvr>
+    <a:masterClrMapping/>
+  </p:clrMapOvr>
+</p:sld>
+</file>
+
+<file path=ppt/slides/slide7.xml><?xml version="1.0" encoding="utf-8"?>
+<p:sld xmlns:a="http://schemas.openxmlformats.org/drawingml/2006/main" xmlns:r="http://schemas.openxmlformats.org/officeDocument/2006/relationships" xmlns:p="http://schemas.openxmlformats.org/presentationml/2006/main">
+  <p:cSld>
+    <p:spTree>
+      <p:nvGrpSpPr>
+        <p:cNvPr id="1" name=""/>
+        <p:cNvGrpSpPr/>
+        <p:nvPr/>
+      </p:nvGrpSpPr>
+      <p:grpSpPr>
+        <a:xfrm>
+          <a:off x="0" y="0"/>
+          <a:ext cx="0" cy="0"/>
+          <a:chOff x="0" y="0"/>
+          <a:chExt cx="0" cy="0"/>
+        </a:xfrm>
+      </p:grpSpPr>
+      <p:sp>
+        <p:nvSpPr>
+          <p:cNvPr id="2" name="Title 1"/>
+          <p:cNvSpPr>
+            <a:spLocks noGrp="1"/>
+          </p:cNvSpPr>
+          <p:nvPr>
+            <p:ph type="title"/>
+          </p:nvPr>
+        </p:nvSpPr>
+        <p:spPr>
+          <a:xfrm>
+            <a:off x="591117" y="0"/>
+            <a:ext cx="10651402" cy="1143000"/>
+          </a:xfrm>
+        </p:spPr>
+        <p:txBody>
+          <a:bodyPr/>
+          <a:lstStyle/>
+          <a:p>
+            <a:r>
+              <a:rPr lang="en-US" dirty="0"/>
+              <a:t>ALL Primary Databases</a:t>
+            </a:r>
+          </a:p>
+        </p:txBody>
+      </p:sp>
+      <p:sp>
+        <p:nvSpPr>
+          <p:cNvPr id="4" name="Slide Number Placeholder 3"/>
+          <p:cNvSpPr>
+            <a:spLocks noGrp="1"/>
+          </p:cNvSpPr>
+          <p:nvPr>
+            <p:ph type="sldNum" sz="quarter" idx="12"/>
+          </p:nvPr>
+        </p:nvSpPr>
+        <p:spPr/>
+        <p:txBody>
+          <a:bodyPr/>
+          <a:lstStyle/>
+          <a:p>
+            <a:fld id="{AD40181A-01B0-4CB8-8614-1473649F6741}" type="slidenum">
+              <a:rPr lang="en-US" smtClean="0">
+                <a:solidFill>
+                  <a:schemeClr val="bg1"/>
+                </a:solidFill>
+              </a:rPr>
+              <a:t>7</a:t>
+            </a:fld>
+            <a:endParaRPr lang="en-US" dirty="0">
+              <a:solidFill>
+                <a:schemeClr val="bg1"/>
+              </a:solidFill>
+            </a:endParaRPr>
+          </a:p>
+        </p:txBody>
+      </p:sp>
+      <p:graphicFrame>
+        <p:nvGraphicFramePr>
+          <p:cNvPr id="8" name="Table 7">
+            <a:extLst>
+              <a:ext uri="{FF2B5EF4-FFF2-40B4-BE49-F238E27FC236}">
+                <a16:creationId xmlns:a16="http://schemas.microsoft.com/office/drawing/2014/main" id="{34326590-4065-6365-04C4-6D5B32C5773B}"/>
+              </a:ext>
+            </a:extLst>
+          </p:cNvPr>
+          <p:cNvGraphicFramePr>
+            <a:graphicFrameLocks noGrp="1"/>
+          </p:cNvGraphicFramePr>
+          <p:nvPr>
+            <p:extLst>
+              <p:ext uri="{D42A27DB-BD31-4B8C-83A1-F6EECF244321}">
+                <p14:modId xmlns:p14="http://schemas.microsoft.com/office/powerpoint/2010/main" val="2384600558"/>
+              </p:ext>
+            </p:extLst>
+          </p:nvPr>
+        </p:nvGraphicFramePr>
+        <p:xfrm>
+          <a:off x="2408472" y="860637"/>
+          <a:ext cx="7144707" cy="2568363"/>
+        </p:xfrm>
+        <a:graphic>
+          <a:graphicData uri="http://schemas.openxmlformats.org/drawingml/2006/table">
+            <a:tbl>
+              <a:tblPr firstRow="1" bandRow="1">
+                <a:tableStyleId>{5C22544A-7EE6-4342-B048-85BDC9FD1C3A}</a:tableStyleId>
+              </a:tblPr>
+              <a:tblGrid>
+                <a:gridCol w="3833992">
+                  <a:extLst>
+                    <a:ext uri="{9D8B030D-6E8A-4147-A177-3AD203B41FA5}">
+                      <a16:colId xmlns:a16="http://schemas.microsoft.com/office/drawing/2014/main" val="2911442727"/>
+                    </a:ext>
+                  </a:extLst>
+                </a:gridCol>
+                <a:gridCol w="3310715">
+                  <a:extLst>
+                    <a:ext uri="{9D8B030D-6E8A-4147-A177-3AD203B41FA5}">
+                      <a16:colId xmlns:a16="http://schemas.microsoft.com/office/drawing/2014/main" val="4273447464"/>
+                    </a:ext>
+                  </a:extLst>
+                </a:gridCol>
+              </a:tblGrid>
+              <a:tr h="0">
+                <a:tc>
+                  <a:txBody>
+                    <a:bodyPr/>
+                    <a:lstStyle/>
+                    <a:p>
+                      <a:r>
+                        <a:rPr lang="en-US" sz="1200" dirty="0"/>
+                        <a:t>Database</a:t>
+                      </a:r>
+                    </a:p>
+                  </a:txBody>
+                  <a:tcPr/>
+                </a:tc>
+                <a:tc>
+                  <a:txBody>
+                    <a:bodyPr/>
+                    <a:lstStyle/>
+                    <a:p>
+                      <a:r>
+                        <a:rPr lang="en-US" sz="1200" dirty="0"/>
+                        <a:t>Relationships Available</a:t>
+                      </a:r>
+                    </a:p>
+                  </a:txBody>
+                  <a:tcPr/>
+                </a:tc>
+                <a:extLst>
+                  <a:ext uri="{0D108BD9-81ED-4DB2-BD59-A6C34878D82A}">
+                    <a16:rowId xmlns:a16="http://schemas.microsoft.com/office/drawing/2014/main" val="3975797069"/>
+                  </a:ext>
+                </a:extLst>
+              </a:tr>
+              <a:tr h="238908">
+                <a:tc>
+                  <a:txBody>
+                    <a:bodyPr/>
+                    <a:lstStyle/>
+                    <a:p>
+                      <a:r>
+                        <a:rPr lang="en-US" sz="1200" dirty="0">
+                          <a:solidFill>
+                            <a:schemeClr val="bg2"/>
+                          </a:solidFill>
+                        </a:rPr>
+                        <a:t>FDA PMTL</a:t>
+                      </a:r>
+                    </a:p>
+                  </a:txBody>
+                  <a:tcPr/>
+                </a:tc>
+                <a:tc>
+                  <a:txBody>
+                    <a:bodyPr/>
+                    <a:lstStyle/>
+                    <a:p>
+                      <a:r>
+                        <a:rPr lang="en-US" sz="1200" dirty="0">
+                          <a:solidFill>
+                            <a:schemeClr val="bg2"/>
+                          </a:solidFill>
+                        </a:rPr>
+                        <a:t>PMTL Genes  (Targets)</a:t>
+                      </a:r>
+                    </a:p>
+                  </a:txBody>
+                  <a:tcPr/>
+                </a:tc>
+                <a:extLst>
+                  <a:ext uri="{0D108BD9-81ED-4DB2-BD59-A6C34878D82A}">
+                    <a16:rowId xmlns:a16="http://schemas.microsoft.com/office/drawing/2014/main" val="969235357"/>
+                  </a:ext>
+                </a:extLst>
+              </a:tr>
+              <a:tr h="398181">
+                <a:tc>
+                  <a:txBody>
+                    <a:bodyPr/>
+                    <a:lstStyle/>
+                    <a:p>
+                      <a:r>
+                        <a:rPr lang="en-US" sz="1200" dirty="0">
+                          <a:solidFill>
+                            <a:schemeClr val="bg2"/>
+                          </a:solidFill>
+                        </a:rPr>
+                        <a:t>Clinical Trials (CT)</a:t>
+                      </a:r>
+                    </a:p>
+                  </a:txBody>
+                  <a:tcPr/>
+                </a:tc>
+                <a:tc>
+                  <a:txBody>
+                    <a:bodyPr/>
+                    <a:lstStyle/>
+                    <a:p>
+                      <a:r>
+                        <a:rPr lang="en-US" sz="1200" dirty="0">
+                          <a:solidFill>
+                            <a:schemeClr val="bg2"/>
+                          </a:solidFill>
+                        </a:rPr>
+                        <a:t>Drugs  associated with a clinical trial ID</a:t>
+                      </a:r>
+                      <a:br>
+                        <a:rPr lang="en-US" sz="1200" dirty="0">
+                          <a:solidFill>
+                            <a:schemeClr val="bg2"/>
+                          </a:solidFill>
+                        </a:rPr>
+                      </a:br>
+                      <a:r>
+                        <a:rPr lang="en-US" sz="1200" dirty="0">
+                          <a:solidFill>
+                            <a:schemeClr val="bg2"/>
+                          </a:solidFill>
+                        </a:rPr>
+                        <a:t>Diseases associated with a clinical trial ID</a:t>
+                      </a:r>
+                    </a:p>
+                  </a:txBody>
+                  <a:tcPr/>
+                </a:tc>
+                <a:extLst>
+                  <a:ext uri="{0D108BD9-81ED-4DB2-BD59-A6C34878D82A}">
+                    <a16:rowId xmlns:a16="http://schemas.microsoft.com/office/drawing/2014/main" val="250947842"/>
+                  </a:ext>
+                </a:extLst>
+              </a:tr>
+              <a:tr h="557453">
+                <a:tc>
+                  <a:txBody>
+                    <a:bodyPr/>
+                    <a:lstStyle/>
+                    <a:p>
+                      <a:r>
+                        <a:rPr lang="en-US" sz="1200" dirty="0">
+                          <a:solidFill>
+                            <a:schemeClr val="bg2"/>
+                          </a:solidFill>
+                        </a:rPr>
+                        <a:t>Open Targets (OT)</a:t>
+                      </a:r>
+                    </a:p>
+                  </a:txBody>
+                  <a:tcPr/>
+                </a:tc>
+                <a:tc>
+                  <a:txBody>
+                    <a:bodyPr/>
+                    <a:lstStyle/>
+                    <a:p>
+                      <a:r>
+                        <a:rPr lang="en-US" sz="1200" dirty="0">
+                          <a:solidFill>
+                            <a:schemeClr val="bg2"/>
+                          </a:solidFill>
+                        </a:rPr>
+                        <a:t>Drug – Target relationship </a:t>
+                      </a:r>
+                      <a:br>
+                        <a:rPr lang="en-US" sz="1200" dirty="0">
+                          <a:solidFill>
+                            <a:schemeClr val="bg2"/>
+                          </a:solidFill>
+                        </a:rPr>
+                      </a:br>
+                      <a:r>
+                        <a:rPr lang="en-US" sz="1200" dirty="0">
+                          <a:solidFill>
+                            <a:schemeClr val="bg2"/>
+                          </a:solidFill>
+                        </a:rPr>
+                        <a:t>Drug – Disease relationship </a:t>
+                      </a:r>
+                    </a:p>
+                    <a:p>
+                      <a:r>
+                        <a:rPr lang="en-US" sz="1200" dirty="0">
+                          <a:solidFill>
+                            <a:schemeClr val="bg2"/>
+                          </a:solidFill>
+                        </a:rPr>
+                        <a:t>Disease – Target relationship</a:t>
+                      </a:r>
+                    </a:p>
+                  </a:txBody>
+                  <a:tcPr/>
+                </a:tc>
+                <a:extLst>
+                  <a:ext uri="{0D108BD9-81ED-4DB2-BD59-A6C34878D82A}">
+                    <a16:rowId xmlns:a16="http://schemas.microsoft.com/office/drawing/2014/main" val="1440883971"/>
+                  </a:ext>
+                </a:extLst>
+              </a:tr>
+              <a:tr h="922443">
+                <a:tc>
+                  <a:txBody>
+                    <a:bodyPr/>
+                    <a:lstStyle/>
+                    <a:p>
+                      <a:r>
+                        <a:rPr lang="en-US" sz="1200" b="0" dirty="0">
+                          <a:solidFill>
+                            <a:schemeClr val="bg2"/>
+                          </a:solidFill>
+                        </a:rPr>
+                        <a:t>Illuminating the Druggable Genome (IDG)</a:t>
+                      </a:r>
+                    </a:p>
+                  </a:txBody>
+                  <a:tcPr/>
+                </a:tc>
+                <a:tc>
+                  <a:txBody>
+                    <a:bodyPr/>
+                    <a:lstStyle/>
+                    <a:p>
+                      <a:r>
+                        <a:rPr lang="en-US" sz="1200" dirty="0">
+                          <a:solidFill>
+                            <a:schemeClr val="bg2"/>
+                          </a:solidFill>
+                        </a:rPr>
+                        <a:t>Drug – Target relationship </a:t>
+                      </a:r>
+                      <a:br>
+                        <a:rPr lang="en-US" sz="1200" dirty="0">
+                          <a:solidFill>
+                            <a:schemeClr val="bg2"/>
+                          </a:solidFill>
+                        </a:rPr>
+                      </a:br>
+                      <a:r>
+                        <a:rPr lang="en-US" sz="1200" dirty="0">
+                          <a:solidFill>
+                            <a:schemeClr val="bg2"/>
+                          </a:solidFill>
+                        </a:rPr>
+                        <a:t>Drug – Disease relationship </a:t>
+                      </a:r>
+                    </a:p>
+                    <a:p>
+                      <a:r>
+                        <a:rPr lang="en-US" sz="1200" dirty="0">
+                          <a:solidFill>
+                            <a:schemeClr val="bg2"/>
+                          </a:solidFill>
+                        </a:rPr>
+                        <a:t>Disease – Target relationship</a:t>
+                      </a:r>
+                    </a:p>
+                  </a:txBody>
+                  <a:tcPr/>
+                </a:tc>
+                <a:extLst>
+                  <a:ext uri="{0D108BD9-81ED-4DB2-BD59-A6C34878D82A}">
+                    <a16:rowId xmlns:a16="http://schemas.microsoft.com/office/drawing/2014/main" val="4178934270"/>
+                  </a:ext>
+                </a:extLst>
+              </a:tr>
+            </a:tbl>
+          </a:graphicData>
+        </a:graphic>
+      </p:graphicFrame>
+      <p:pic>
+        <p:nvPicPr>
+          <p:cNvPr id="3" name="Picture 2" descr="A diagram of a diagram of a cylinder&#10;&#10;Description automatically generated">
+            <a:extLst>
+              <a:ext uri="{FF2B5EF4-FFF2-40B4-BE49-F238E27FC236}">
+                <a16:creationId xmlns:a16="http://schemas.microsoft.com/office/drawing/2014/main" id="{4DD17E52-6963-0134-5831-7111E3413083}"/>
+              </a:ext>
+            </a:extLst>
+          </p:cNvPr>
+          <p:cNvPicPr>
+            <a:picLocks noChangeAspect="1"/>
+          </p:cNvPicPr>
+          <p:nvPr/>
+        </p:nvPicPr>
+        <p:blipFill>
+          <a:blip r:embed="rId2">
+            <a:extLst>
+              <a:ext uri="{28A0092B-C50C-407E-A947-70E740481C1C}">
+                <a14:useLocalDpi xmlns:a14="http://schemas.microsoft.com/office/drawing/2010/main" val="0"/>
+              </a:ext>
+            </a:extLst>
+          </a:blip>
+          <a:stretch>
+            <a:fillRect/>
+          </a:stretch>
+        </p:blipFill>
+        <p:spPr>
+          <a:xfrm>
+            <a:off x="0" y="3928887"/>
+            <a:ext cx="2944368" cy="1590356"/>
+          </a:xfrm>
+          <a:prstGeom prst="rect">
+            <a:avLst/>
+          </a:prstGeom>
+        </p:spPr>
+      </p:pic>
+      <p:pic>
+        <p:nvPicPr>
+          <p:cNvPr id="5" name="Picture 4" descr="A diagram of a medical procedure&#10;&#10;Description automatically generated">
+            <a:extLst>
+              <a:ext uri="{FF2B5EF4-FFF2-40B4-BE49-F238E27FC236}">
+                <a16:creationId xmlns:a16="http://schemas.microsoft.com/office/drawing/2014/main" id="{4E71ECCE-0DDB-366F-26AD-C4FEEF26E836}"/>
+              </a:ext>
+            </a:extLst>
+          </p:cNvPr>
+          <p:cNvPicPr>
+            <a:picLocks noChangeAspect="1"/>
+          </p:cNvPicPr>
+          <p:nvPr/>
+        </p:nvPicPr>
+        <p:blipFill>
+          <a:blip r:embed="rId3">
+            <a:extLst>
+              <a:ext uri="{28A0092B-C50C-407E-A947-70E740481C1C}">
+                <a14:useLocalDpi xmlns:a14="http://schemas.microsoft.com/office/drawing/2010/main" val="0"/>
+              </a:ext>
+            </a:extLst>
+          </a:blip>
+          <a:stretch>
+            <a:fillRect/>
+          </a:stretch>
+        </p:blipFill>
+        <p:spPr>
+          <a:xfrm>
+            <a:off x="2944159" y="3362227"/>
+            <a:ext cx="1896701" cy="2525650"/>
+          </a:xfrm>
+          <a:prstGeom prst="rect">
+            <a:avLst/>
+          </a:prstGeom>
+        </p:spPr>
+      </p:pic>
+      <p:pic>
+        <p:nvPicPr>
+          <p:cNvPr id="6" name="Picture 5" descr="A diagram of a diagram of a target&#10;&#10;Description automatically generated with medium confidence">
+            <a:extLst>
+              <a:ext uri="{FF2B5EF4-FFF2-40B4-BE49-F238E27FC236}">
+                <a16:creationId xmlns:a16="http://schemas.microsoft.com/office/drawing/2014/main" id="{273BF554-B059-2327-D949-DD5C84E465A3}"/>
+              </a:ext>
+            </a:extLst>
+          </p:cNvPr>
+          <p:cNvPicPr>
+            <a:picLocks noChangeAspect="1"/>
+          </p:cNvPicPr>
+          <p:nvPr/>
+        </p:nvPicPr>
+        <p:blipFill>
+          <a:blip r:embed="rId4">
+            <a:extLst>
+              <a:ext uri="{28A0092B-C50C-407E-A947-70E740481C1C}">
+                <a14:useLocalDpi xmlns:a14="http://schemas.microsoft.com/office/drawing/2010/main" val="0"/>
+              </a:ext>
+            </a:extLst>
+          </a:blip>
+          <a:stretch>
+            <a:fillRect/>
+          </a:stretch>
+        </p:blipFill>
+        <p:spPr>
+          <a:xfrm>
+            <a:off x="5257465" y="3429000"/>
+            <a:ext cx="3450830" cy="2529626"/>
+          </a:xfrm>
+          <a:prstGeom prst="rect">
+            <a:avLst/>
+          </a:prstGeom>
+        </p:spPr>
+      </p:pic>
+      <p:pic>
+        <p:nvPicPr>
+          <p:cNvPr id="7" name="Picture 6" descr="A group of circles with text&#10;&#10;Description automatically generated">
+            <a:extLst>
+              <a:ext uri="{FF2B5EF4-FFF2-40B4-BE49-F238E27FC236}">
+                <a16:creationId xmlns:a16="http://schemas.microsoft.com/office/drawing/2014/main" id="{764A9FEA-F7B6-5ED9-5338-3D492753EEA3}"/>
+              </a:ext>
+            </a:extLst>
+          </p:cNvPr>
+          <p:cNvPicPr>
+            <a:picLocks noChangeAspect="1"/>
+          </p:cNvPicPr>
+          <p:nvPr/>
+        </p:nvPicPr>
+        <p:blipFill>
+          <a:blip r:embed="rId5">
+            <a:extLst>
+              <a:ext uri="{28A0092B-C50C-407E-A947-70E740481C1C}">
+                <a14:useLocalDpi xmlns:a14="http://schemas.microsoft.com/office/drawing/2010/main" val="0"/>
+              </a:ext>
+            </a:extLst>
+          </a:blip>
+          <a:stretch>
+            <a:fillRect/>
+          </a:stretch>
+        </p:blipFill>
+        <p:spPr>
+          <a:xfrm>
+            <a:off x="8419931" y="3612188"/>
+            <a:ext cx="3453523" cy="2164483"/>
+          </a:xfrm>
+          <a:prstGeom prst="rect">
+            <a:avLst/>
+          </a:prstGeom>
+        </p:spPr>
+      </p:pic>
+    </p:spTree>
+    <p:extLst>
+      <p:ext uri="{BB962C8B-B14F-4D97-AF65-F5344CB8AC3E}">
+        <p14:creationId xmlns:p14="http://schemas.microsoft.com/office/powerpoint/2010/main" val="4114014930"/>
+      </p:ext>
+    </p:extLst>
+  </p:cSld>
+  <p:clrMapOvr>
+    <a:masterClrMapping/>
+  </p:clrMapOvr>
+</p:sld>
+</file>
+
+<file path=ppt/slides/slide8.xml><?xml version="1.0" encoding="utf-8"?>
+<p:sld xmlns:a="http://schemas.openxmlformats.org/drawingml/2006/main" xmlns:r="http://schemas.openxmlformats.org/officeDocument/2006/relationships" xmlns:p="http://schemas.openxmlformats.org/presentationml/2006/main">
+  <p:cSld>
+    <p:spTree>
+      <p:nvGrpSpPr>
+        <p:cNvPr id="1" name=""/>
+        <p:cNvGrpSpPr/>
+        <p:nvPr/>
+      </p:nvGrpSpPr>
+      <p:grpSpPr>
+        <a:xfrm>
+          <a:off x="0" y="0"/>
+          <a:ext cx="0" cy="0"/>
+          <a:chOff x="0" y="0"/>
+          <a:chExt cx="0" cy="0"/>
+        </a:xfrm>
+      </p:grpSpPr>
+      <p:sp>
+        <p:nvSpPr>
+          <p:cNvPr id="2" name="Title 1"/>
+          <p:cNvSpPr>
+            <a:spLocks noGrp="1"/>
+          </p:cNvSpPr>
+          <p:nvPr>
+            <p:ph type="title"/>
+          </p:nvPr>
+        </p:nvSpPr>
+        <p:spPr>
+          <a:xfrm>
+            <a:off x="0" y="0"/>
+            <a:ext cx="9586155" cy="652524"/>
+          </a:xfrm>
+        </p:spPr>
+        <p:txBody>
+          <a:bodyPr/>
+          <a:lstStyle/>
+          <a:p>
+            <a:r>
+              <a:rPr lang="en-US" dirty="0"/>
+              <a:t>Pipeline summary: PMTL – Drug </a:t>
+            </a:r>
+          </a:p>
+        </p:txBody>
+      </p:sp>
+      <p:sp>
+        <p:nvSpPr>
+          <p:cNvPr id="4" name="Slide Number Placeholder 3"/>
+          <p:cNvSpPr>
+            <a:spLocks noGrp="1"/>
+          </p:cNvSpPr>
+          <p:nvPr>
+            <p:ph type="sldNum" sz="quarter" idx="12"/>
+          </p:nvPr>
+        </p:nvSpPr>
+        <p:spPr/>
+        <p:txBody>
+          <a:bodyPr/>
+          <a:lstStyle/>
+          <a:p>
+            <a:fld id="{AD40181A-01B0-4CB8-8614-1473649F6741}" type="slidenum">
+              <a:rPr lang="en-US" smtClean="0">
+                <a:solidFill>
+                  <a:schemeClr val="bg1"/>
+                </a:solidFill>
+              </a:rPr>
+              <a:t>8</a:t>
+            </a:fld>
+            <a:endParaRPr lang="en-US" dirty="0">
+              <a:solidFill>
+                <a:schemeClr val="bg1"/>
+              </a:solidFill>
+            </a:endParaRPr>
+          </a:p>
+        </p:txBody>
+      </p:sp>
+      <p:sp>
+        <p:nvSpPr>
+          <p:cNvPr id="7" name="Content Placeholder 2">
+            <a:extLst>
+              <a:ext uri="{FF2B5EF4-FFF2-40B4-BE49-F238E27FC236}">
+                <a16:creationId xmlns:a16="http://schemas.microsoft.com/office/drawing/2014/main" id="{F49D6E59-7AD1-9F97-7C12-C9212E8C1DD0}"/>
+              </a:ext>
+            </a:extLst>
+          </p:cNvPr>
+          <p:cNvSpPr>
+            <a:spLocks noGrp="1"/>
+          </p:cNvSpPr>
+          <p:nvPr>
+            <p:ph idx="1"/>
+          </p:nvPr>
+        </p:nvSpPr>
+        <p:spPr>
+          <a:xfrm>
+            <a:off x="591116" y="1143000"/>
+            <a:ext cx="11600884" cy="4663440"/>
+          </a:xfrm>
+        </p:spPr>
+        <p:txBody>
+          <a:bodyPr>
+            <a:noAutofit/>
+          </a:bodyPr>
+          <a:lstStyle/>
+          <a:p>
+            <a:endParaRPr lang="en-US" sz="1800" dirty="0">
+              <a:solidFill>
+                <a:srgbClr val="000000"/>
+              </a:solidFill>
+            </a:endParaRPr>
+          </a:p>
+          <a:p>
+            <a:endParaRPr lang="en-US" sz="1800" dirty="0">
+              <a:solidFill>
+                <a:srgbClr val="000000"/>
+              </a:solidFill>
+            </a:endParaRPr>
+          </a:p>
+          <a:p>
+            <a:pPr marL="0" indent="0">
+              <a:buNone/>
+            </a:pPr>
+            <a:endParaRPr lang="en-US" sz="1800" dirty="0">
+              <a:solidFill>
+                <a:srgbClr val="000000"/>
+              </a:solidFill>
+            </a:endParaRPr>
+          </a:p>
+          <a:p>
+            <a:endParaRPr lang="en-US" sz="1800" dirty="0">
+              <a:solidFill>
+                <a:srgbClr val="000000"/>
+              </a:solidFill>
+            </a:endParaRPr>
+          </a:p>
+          <a:p>
+            <a:pPr marL="457200" lvl="1" indent="0">
+              <a:buNone/>
+            </a:pPr>
+            <a:endParaRPr lang="en-US" sz="1400" b="0" i="0" u="none" strike="noStrike" dirty="0">
+              <a:solidFill>
+                <a:srgbClr val="000000"/>
+              </a:solidFill>
+              <a:effectLst/>
+              <a:latin typeface="Arial" panose="020B0604020202020204" pitchFamily="34" charset="0"/>
+            </a:endParaRPr>
+          </a:p>
+          <a:p>
+            <a:endParaRPr lang="en-US" sz="1800" dirty="0">
+              <a:solidFill>
+                <a:srgbClr val="000000"/>
+              </a:solidFill>
+            </a:endParaRPr>
+          </a:p>
+          <a:p>
+            <a:endParaRPr lang="en-US" sz="1800" dirty="0">
+              <a:solidFill>
+                <a:srgbClr val="000000"/>
+              </a:solidFill>
+            </a:endParaRPr>
+          </a:p>
+          <a:p>
+            <a:endParaRPr lang="en-US" sz="1800" dirty="0">
+              <a:solidFill>
+                <a:srgbClr val="000000"/>
+              </a:solidFill>
+            </a:endParaRPr>
+          </a:p>
+          <a:p>
+            <a:endParaRPr lang="en-US" sz="1800" dirty="0">
+              <a:solidFill>
+                <a:srgbClr val="000000"/>
+              </a:solidFill>
+            </a:endParaRPr>
+          </a:p>
+          <a:p>
+            <a:endParaRPr lang="en-US" sz="1800" dirty="0">
+              <a:solidFill>
+                <a:srgbClr val="000000"/>
+              </a:solidFill>
+            </a:endParaRPr>
+          </a:p>
+          <a:p>
+            <a:endParaRPr lang="en-US" dirty="0"/>
+          </a:p>
+          <a:p>
+            <a:endParaRPr lang="en-US" dirty="0"/>
+          </a:p>
+        </p:txBody>
+      </p:sp>
+      <p:pic>
+        <p:nvPicPr>
+          <p:cNvPr id="13" name="Picture 12">
+            <a:extLst>
+              <a:ext uri="{FF2B5EF4-FFF2-40B4-BE49-F238E27FC236}">
+                <a16:creationId xmlns:a16="http://schemas.microsoft.com/office/drawing/2014/main" id="{6D7F4121-701D-39C0-86B5-4725A2B3A690}"/>
+              </a:ext>
+            </a:extLst>
+          </p:cNvPr>
+          <p:cNvPicPr>
+            <a:picLocks noChangeAspect="1"/>
+          </p:cNvPicPr>
+          <p:nvPr/>
+        </p:nvPicPr>
+        <p:blipFill>
+          <a:blip r:embed="rId2">
+            <a:extLst>
+              <a:ext uri="{28A0092B-C50C-407E-A947-70E740481C1C}">
+                <a14:useLocalDpi xmlns:a14="http://schemas.microsoft.com/office/drawing/2010/main" val="0"/>
+              </a:ext>
+            </a:extLst>
+          </a:blip>
+          <a:stretch>
+            <a:fillRect/>
+          </a:stretch>
+        </p:blipFill>
+        <p:spPr>
+          <a:xfrm>
+            <a:off x="416151" y="1323030"/>
+            <a:ext cx="11091999" cy="1319586"/>
+          </a:xfrm>
+          <a:prstGeom prst="rect">
+            <a:avLst/>
+          </a:prstGeom>
+        </p:spPr>
+      </p:pic>
+    </p:spTree>
+    <p:extLst>
+      <p:ext uri="{BB962C8B-B14F-4D97-AF65-F5344CB8AC3E}">
+        <p14:creationId xmlns:p14="http://schemas.microsoft.com/office/powerpoint/2010/main" val="58055699"/>
+      </p:ext>
+    </p:extLst>
+  </p:cSld>
+  <p:clrMapOvr>
+    <a:masterClrMapping/>
+  </p:clrMapOvr>
+</p:sld>
+</file>
+
+<file path=ppt/slides/slide9.xml><?xml version="1.0" encoding="utf-8"?>
+<p:sld xmlns:a="http://schemas.openxmlformats.org/drawingml/2006/main" xmlns:r="http://schemas.openxmlformats.org/officeDocument/2006/relationships" xmlns:p="http://schemas.openxmlformats.org/presentationml/2006/main">
+  <p:cSld>
+    <p:spTree>
+      <p:nvGrpSpPr>
+        <p:cNvPr id="1" name=""/>
+        <p:cNvGrpSpPr/>
+        <p:nvPr/>
+      </p:nvGrpSpPr>
+      <p:grpSpPr>
+        <a:xfrm>
+          <a:off x="0" y="0"/>
+          <a:ext cx="0" cy="0"/>
+          <a:chOff x="0" y="0"/>
+          <a:chExt cx="0" cy="0"/>
+        </a:xfrm>
+      </p:grpSpPr>
+      <p:sp>
+        <p:nvSpPr>
+          <p:cNvPr id="2" name="Title 1"/>
+          <p:cNvSpPr>
+            <a:spLocks noGrp="1"/>
+          </p:cNvSpPr>
+          <p:nvPr>
+            <p:ph type="title"/>
+          </p:nvPr>
+        </p:nvSpPr>
+        <p:spPr>
+          <a:xfrm>
+            <a:off x="0" y="0"/>
+            <a:ext cx="11987784" cy="877824"/>
+          </a:xfrm>
+        </p:spPr>
+        <p:txBody>
+          <a:bodyPr/>
+          <a:lstStyle/>
+          <a:p>
+            <a:r>
+              <a:rPr lang="en-US" dirty="0"/>
+              <a:t>Pipeline summary: PMTL – Drug + PMTL -Tumor </a:t>
+            </a:r>
+          </a:p>
+        </p:txBody>
+      </p:sp>
+      <p:sp>
+        <p:nvSpPr>
+          <p:cNvPr id="4" name="Slide Number Placeholder 3"/>
+          <p:cNvSpPr>
+            <a:spLocks noGrp="1"/>
+          </p:cNvSpPr>
+          <p:nvPr>
+            <p:ph type="sldNum" sz="quarter" idx="12"/>
+          </p:nvPr>
+        </p:nvSpPr>
+        <p:spPr/>
+        <p:txBody>
+          <a:bodyPr/>
+          <a:lstStyle/>
+          <a:p>
+            <a:fld id="{AD40181A-01B0-4CB8-8614-1473649F6741}" type="slidenum">
+              <a:rPr lang="en-US" smtClean="0">
+                <a:solidFill>
+                  <a:schemeClr val="bg1"/>
+                </a:solidFill>
+              </a:rPr>
+              <a:t>9</a:t>
+            </a:fld>
+            <a:endParaRPr lang="en-US" dirty="0">
+              <a:solidFill>
+                <a:schemeClr val="bg1"/>
+              </a:solidFill>
+            </a:endParaRPr>
+          </a:p>
+        </p:txBody>
+      </p:sp>
+      <p:sp>
+        <p:nvSpPr>
+          <p:cNvPr id="7" name="Content Placeholder 2">
+            <a:extLst>
+              <a:ext uri="{FF2B5EF4-FFF2-40B4-BE49-F238E27FC236}">
+                <a16:creationId xmlns:a16="http://schemas.microsoft.com/office/drawing/2014/main" id="{F49D6E59-7AD1-9F97-7C12-C9212E8C1DD0}"/>
+              </a:ext>
+            </a:extLst>
+          </p:cNvPr>
+          <p:cNvSpPr>
+            <a:spLocks noGrp="1"/>
+          </p:cNvSpPr>
+          <p:nvPr>
+            <p:ph idx="1"/>
+          </p:nvPr>
+        </p:nvSpPr>
+        <p:spPr>
+          <a:xfrm>
+            <a:off x="591116" y="1143000"/>
+            <a:ext cx="11600884" cy="4663440"/>
+          </a:xfrm>
+        </p:spPr>
+        <p:txBody>
+          <a:bodyPr>
+            <a:noAutofit/>
+          </a:bodyPr>
+          <a:lstStyle/>
+          <a:p>
+            <a:endParaRPr lang="en-US" sz="1800" dirty="0">
+              <a:solidFill>
+                <a:srgbClr val="000000"/>
+              </a:solidFill>
+            </a:endParaRPr>
+          </a:p>
+          <a:p>
+            <a:endParaRPr lang="en-US" sz="1800" dirty="0">
+              <a:solidFill>
+                <a:srgbClr val="000000"/>
+              </a:solidFill>
+            </a:endParaRPr>
+          </a:p>
+          <a:p>
+            <a:pPr marL="0" indent="0">
+              <a:buNone/>
+            </a:pPr>
+            <a:endParaRPr lang="en-US" sz="1800" dirty="0">
+              <a:solidFill>
+                <a:srgbClr val="000000"/>
+              </a:solidFill>
+            </a:endParaRPr>
+          </a:p>
+          <a:p>
+            <a:endParaRPr lang="en-US" sz="1800" dirty="0">
+              <a:solidFill>
+                <a:srgbClr val="000000"/>
+              </a:solidFill>
+            </a:endParaRPr>
+          </a:p>
+          <a:p>
+            <a:pPr marL="457200" lvl="1" indent="0">
+              <a:buNone/>
+            </a:pPr>
+            <a:endParaRPr lang="en-US" sz="1400" b="0" i="0" u="none" strike="noStrike" dirty="0">
+              <a:solidFill>
+                <a:srgbClr val="000000"/>
+              </a:solidFill>
+              <a:effectLst/>
+              <a:latin typeface="Arial" panose="020B0604020202020204" pitchFamily="34" charset="0"/>
+            </a:endParaRPr>
+          </a:p>
+          <a:p>
+            <a:endParaRPr lang="en-US" sz="1800" dirty="0">
+              <a:solidFill>
+                <a:srgbClr val="000000"/>
+              </a:solidFill>
+            </a:endParaRPr>
+          </a:p>
+          <a:p>
+            <a:endParaRPr lang="en-US" sz="1800" dirty="0">
+              <a:solidFill>
+                <a:srgbClr val="000000"/>
+              </a:solidFill>
+            </a:endParaRPr>
+          </a:p>
+          <a:p>
+            <a:endParaRPr lang="en-US" sz="1800" dirty="0">
+              <a:solidFill>
+                <a:srgbClr val="000000"/>
+              </a:solidFill>
+            </a:endParaRPr>
+          </a:p>
+          <a:p>
+            <a:endParaRPr lang="en-US" sz="1800" dirty="0">
+              <a:solidFill>
+                <a:srgbClr val="000000"/>
+              </a:solidFill>
+            </a:endParaRPr>
+          </a:p>
+          <a:p>
+            <a:endParaRPr lang="en-US" sz="1800" dirty="0">
+              <a:solidFill>
+                <a:srgbClr val="000000"/>
+              </a:solidFill>
+            </a:endParaRPr>
+          </a:p>
+          <a:p>
+            <a:endParaRPr lang="en-US" dirty="0"/>
+          </a:p>
+          <a:p>
+            <a:endParaRPr lang="en-US" dirty="0"/>
+          </a:p>
+        </p:txBody>
+      </p:sp>
+      <p:pic>
+        <p:nvPicPr>
+          <p:cNvPr id="5" name="Picture 4" descr="A close-up of a black background&#10;&#10;Description automatically generated">
+            <a:extLst>
+              <a:ext uri="{FF2B5EF4-FFF2-40B4-BE49-F238E27FC236}">
+                <a16:creationId xmlns:a16="http://schemas.microsoft.com/office/drawing/2014/main" id="{4B29270A-1C7D-0FFA-1F9B-B7FD63B4E77A}"/>
+              </a:ext>
+            </a:extLst>
+          </p:cNvPr>
+          <p:cNvPicPr>
+            <a:picLocks noChangeAspect="1"/>
+          </p:cNvPicPr>
+          <p:nvPr/>
+        </p:nvPicPr>
+        <p:blipFill>
+          <a:blip r:embed="rId2">
+            <a:extLst>
+              <a:ext uri="{28A0092B-C50C-407E-A947-70E740481C1C}">
+                <a14:useLocalDpi xmlns:a14="http://schemas.microsoft.com/office/drawing/2010/main" val="0"/>
+              </a:ext>
+            </a:extLst>
+          </a:blip>
+          <a:stretch>
+            <a:fillRect/>
+          </a:stretch>
+        </p:blipFill>
+        <p:spPr>
+          <a:xfrm>
+            <a:off x="484632" y="1422428"/>
+            <a:ext cx="10999920" cy="2399764"/>
+          </a:xfrm>
+          <a:prstGeom prst="rect">
+            <a:avLst/>
+          </a:prstGeom>
+        </p:spPr>
+      </p:pic>
+    </p:spTree>
+    <p:extLst>
+      <p:ext uri="{BB962C8B-B14F-4D97-AF65-F5344CB8AC3E}">
+        <p14:creationId xmlns:p14="http://schemas.microsoft.com/office/powerpoint/2010/main" val="3374768893"/>
       </p:ext>
     </p:extLst>
   </p:cSld>
@@ -2451,15 +5076,6 @@
 </file>
 
 <file path=customXml/item2.xml><?xml version="1.0" encoding="utf-8"?>
-<?mso-contentType ?>
-<FormTemplates xmlns="http://schemas.microsoft.com/sharepoint/v3/contenttype/forms">
-  <Display>DocumentLibraryForm</Display>
-  <Edit>DocumentLibraryForm</Edit>
-  <New>DocumentLibraryForm</New>
-</FormTemplates>
-</file>
-
-<file path=customXml/item3.xml><?xml version="1.0" encoding="utf-8"?>
 <p:properties xmlns:p="http://schemas.microsoft.com/office/2006/metadata/properties" xmlns:xsi="http://www.w3.org/2001/XMLSchema-instance" xmlns:pc="http://schemas.microsoft.com/office/infopath/2007/PartnerControls">
   <documentManagement>
     <h6a4a4262ab844b18de92e197378cee0 xmlns="e96402cb-0a6e-49e7-8465-cfae72b5129c">
@@ -2475,6 +5091,15 @@
     <IconOverlay xmlns="http://schemas.microsoft.com/sharepoint/v4" xsi:nil="true"/>
   </documentManagement>
 </p:properties>
+</file>
+
+<file path=customXml/item3.xml><?xml version="1.0" encoding="utf-8"?>
+<?mso-contentType ?>
+<FormTemplates xmlns="http://schemas.microsoft.com/sharepoint/v3/contenttype/forms">
+  <Display>DocumentLibraryForm</Display>
+  <Edit>DocumentLibraryForm</Edit>
+  <New>DocumentLibraryForm</New>
+</FormTemplates>
 </file>
 
 <file path=customXml/itemProps1.xml><?xml version="1.0" encoding="utf-8"?>
@@ -2499,14 +5124,6 @@
 </file>
 
 <file path=customXml/itemProps2.xml><?xml version="1.0" encoding="utf-8"?>
-<ds:datastoreItem xmlns:ds="http://schemas.openxmlformats.org/officeDocument/2006/customXml" ds:itemID="{8E78B9CA-BC85-4AC4-82A4-AD53C20980F5}">
-  <ds:schemaRefs>
-    <ds:schemaRef ds:uri="http://schemas.microsoft.com/sharepoint/v3/contenttype/forms"/>
-  </ds:schemaRefs>
-</ds:datastoreItem>
-</file>
-
-<file path=customXml/itemProps3.xml><?xml version="1.0" encoding="utf-8"?>
 <ds:datastoreItem xmlns:ds="http://schemas.openxmlformats.org/officeDocument/2006/customXml" ds:itemID="{7C493EF0-0BE4-4E84-A0BC-FF9879CDB9E8}">
   <ds:schemaRefs>
     <ds:schemaRef ds:uri="http://schemas.microsoft.com/office/2006/metadata/properties"/>
@@ -2517,4 +5134,12 @@
     <ds:schemaRef ds:uri="http://schemas.microsoft.com/sharepoint/v4"/>
   </ds:schemaRefs>
 </ds:datastoreItem>
+</file>
+
+<file path=customXml/itemProps3.xml><?xml version="1.0" encoding="utf-8"?>
+<ds:datastoreItem xmlns:ds="http://schemas.openxmlformats.org/officeDocument/2006/customXml" ds:itemID="{8E78B9CA-BC85-4AC4-82A4-AD53C20980F5}">
+  <ds:schemaRefs>
+    <ds:schemaRef ds:uri="http://schemas.microsoft.com/sharepoint/v3/contenttype/forms"/>
+  </ds:schemaRefs>
+</ds:datastoreItem>
 </file>
</xml_diff>

<commit_message>
adding results for PMTL in ppt
</commit_message>
<xml_diff>
--- a/presentations/PMTL_Embedding_Short.pptx
+++ b/presentations/PMTL_Embedding_Short.pptx
@@ -227,7 +227,7 @@
           <a:p>
             <a:fld id="{6B374326-AD78-4E67-8599-BA8A5604D89A}" type="datetimeFigureOut">
               <a:rPr lang="en-US" smtClean="0"/>
-              <a:t>4/25/24</a:t>
+              <a:t>4/26/24</a:t>
             </a:fld>
             <a:endParaRPr lang="en-US"/>
           </a:p>
@@ -2482,7 +2482,7 @@
                   <a:srgbClr val="000000"/>
                 </a:solidFill>
               </a:rPr>
-              <a:t>For both PMTL and NON PMTL targets (from OT and CT) we have generated tables that map their relationships to tumors and drugs. Following are the description of each table. </a:t>
+              <a:t>For both PMTL and other targets (from OT and CT) we have generated tables that map their relationships to tumors and drugs. Following are the description of each table. </a:t>
             </a:r>
           </a:p>
           <a:p>
@@ -4145,23 +4145,7 @@
                   <a:srgbClr val="000000"/>
                 </a:solidFill>
               </a:rPr>
-              <a:t>PMTL-Tumor table :For each PMTL , this table provides the following: PMTL Gene Symbol , if the PMTL is targeted by at least one drug in CT, OT, or ID, sources where the PMTL was found, tumor name, is it a pediatric cancer, reference for pediatric tumor, evidence count for the given PMTL-tumor relationship from OT , source of the relationship between </a:t>
-            </a:r>
-            <a:r>
-              <a:rPr lang="en-US" sz="1800" dirty="0" err="1">
-                <a:solidFill>
-                  <a:srgbClr val="000000"/>
-                </a:solidFill>
-              </a:rPr>
-              <a:t>pmtl</a:t>
-            </a:r>
-            <a:r>
-              <a:rPr lang="en-US" sz="1800" dirty="0">
-                <a:solidFill>
-                  <a:srgbClr val="000000"/>
-                </a:solidFill>
-              </a:rPr>
-              <a:t> and tumor. </a:t>
+              <a:t>PMTL-Tumor table :For each PMTL , this table provides the following: PMTL Gene Symbol , if the PMTL is targeted by at least one drug in CT, OT, or ID, sources where the PMTL was found, tumor name, is it a pediatric cancer, reference for pediatric tumor, evidence count for the given PMTL-tumor relationship from OT , source of the relationship between PMTL and tumor. </a:t>
             </a:r>
           </a:p>
           <a:p>
@@ -5774,7 +5758,7 @@
           <a:p>
             <a:r>
               <a:rPr lang="en-US" dirty="0"/>
-              <a:t>PIPELINE Results: Non PMTL Drug Table</a:t>
+              <a:t>PIPELINE Results: Target Drug Table</a:t>
             </a:r>
           </a:p>
         </p:txBody>
@@ -5791,7 +5775,7 @@
         </p:nvSpPr>
         <p:spPr>
           <a:xfrm>
-            <a:off x="538284" y="841248"/>
+            <a:off x="417769" y="685800"/>
             <a:ext cx="11600884" cy="4663440"/>
           </a:xfrm>
         </p:spPr>
@@ -5817,7 +5801,7 @@
                   <a:srgbClr val="000000"/>
                 </a:solidFill>
               </a:rPr>
-              <a:t>PMTL-Drug table :For each PMTL , this table provides the Gene Symbol for each PMTL , associated drug name, if it was registered in clinical trials, the age type (pediatric, adult, or mixed) of population it was tested on in clinical trials, if the drug was present in IDG or OT databases, source of the PMTL-Target relationship, source where the PMTL was found. </a:t>
+              <a:t>Target-Drug table :For each Target, this table provides the Gene Symbol, PMTL Status, associated drug name, if it was registered in clinical trials, the age type (pediatric, adult, or mixed) of population it was tested on in clinical trials, if the drug was present in IDG or OT databases, source of the Target-Drug relationship, source where the Target was found. </a:t>
             </a:r>
           </a:p>
           <a:p>
@@ -5827,7 +5811,7 @@
                   <a:srgbClr val="000000"/>
                 </a:solidFill>
               </a:rPr>
-              <a:t>Following is a snapshot of the results taken from the PMTL Drug table:</a:t>
+              <a:t>Following is a snapshot of the results taken from the Target Drug table:</a:t>
             </a:r>
           </a:p>
           <a:p>
@@ -5905,11 +5889,17 @@
           <p:cNvGraphicFramePr>
             <a:graphicFrameLocks noGrp="1"/>
           </p:cNvGraphicFramePr>
-          <p:nvPr/>
+          <p:nvPr>
+            <p:extLst>
+              <p:ext uri="{D42A27DB-BD31-4B8C-83A1-F6EECF244321}">
+                <p14:modId xmlns:p14="http://schemas.microsoft.com/office/powerpoint/2010/main" val="3816443159"/>
+              </p:ext>
+            </p:extLst>
+          </p:nvPr>
         </p:nvGraphicFramePr>
         <p:xfrm>
-          <a:off x="538284" y="2914944"/>
-          <a:ext cx="11548050" cy="2010384"/>
+          <a:off x="444186" y="2837640"/>
+          <a:ext cx="11548048" cy="1706928"/>
         </p:xfrm>
         <a:graphic>
           <a:graphicData uri="http://schemas.openxmlformats.org/drawingml/2006/table">
@@ -5918,70 +5908,77 @@
                 <a:tableStyleId>{5C22544A-7EE6-4342-B048-85BDC9FD1C3A}</a:tableStyleId>
               </a:tblPr>
               <a:tblGrid>
-                <a:gridCol w="1132143">
+                <a:gridCol w="1037897">
                   <a:extLst>
                     <a:ext uri="{9D8B030D-6E8A-4147-A177-3AD203B41FA5}">
                       <a16:colId xmlns:a16="http://schemas.microsoft.com/office/drawing/2014/main" val="767560716"/>
                     </a:ext>
                   </a:extLst>
                 </a:gridCol>
-                <a:gridCol w="1048622">
+                <a:gridCol w="961328">
+                  <a:extLst>
+                    <a:ext uri="{9D8B030D-6E8A-4147-A177-3AD203B41FA5}">
+                      <a16:colId xmlns:a16="http://schemas.microsoft.com/office/drawing/2014/main" val="444106678"/>
+                    </a:ext>
+                  </a:extLst>
+                </a:gridCol>
+                <a:gridCol w="961328">
                   <a:extLst>
                     <a:ext uri="{9D8B030D-6E8A-4147-A177-3AD203B41FA5}">
                       <a16:colId xmlns:a16="http://schemas.microsoft.com/office/drawing/2014/main" val="1109429456"/>
                     </a:ext>
                   </a:extLst>
                 </a:gridCol>
-                <a:gridCol w="1048622">
+                <a:gridCol w="961328">
                   <a:extLst>
                     <a:ext uri="{9D8B030D-6E8A-4147-A177-3AD203B41FA5}">
                       <a16:colId xmlns:a16="http://schemas.microsoft.com/office/drawing/2014/main" val="3792169147"/>
                     </a:ext>
                   </a:extLst>
                 </a:gridCol>
-                <a:gridCol w="1141421">
+                <a:gridCol w="1046402">
                   <a:extLst>
                     <a:ext uri="{9D8B030D-6E8A-4147-A177-3AD203B41FA5}">
                       <a16:colId xmlns:a16="http://schemas.microsoft.com/office/drawing/2014/main" val="4106209877"/>
                     </a:ext>
                   </a:extLst>
                 </a:gridCol>
-                <a:gridCol w="1094299">
+                <a:gridCol w="1003203">
                   <a:extLst>
                     <a:ext uri="{9D8B030D-6E8A-4147-A177-3AD203B41FA5}">
                       <a16:colId xmlns:a16="http://schemas.microsoft.com/office/drawing/2014/main" val="1469228664"/>
                     </a:ext>
                   </a:extLst>
                 </a:gridCol>
-                <a:gridCol w="1172249">
+                <a:gridCol w="1074664">
                   <a:extLst>
                     <a:ext uri="{9D8B030D-6E8A-4147-A177-3AD203B41FA5}">
                       <a16:colId xmlns:a16="http://schemas.microsoft.com/office/drawing/2014/main" val="73438543"/>
                     </a:ext>
                   </a:extLst>
                 </a:gridCol>
-                <a:gridCol w="921630">
+                <a:gridCol w="844908">
                   <a:extLst>
                     <a:ext uri="{9D8B030D-6E8A-4147-A177-3AD203B41FA5}">
                       <a16:colId xmlns:a16="http://schemas.microsoft.com/office/drawing/2014/main" val="2200530130"/>
                     </a:ext>
                   </a:extLst>
                 </a:gridCol>
-                <a:gridCol w="1075236">
+                <a:gridCol w="985727">
                   <a:extLst>
                     <a:ext uri="{9D8B030D-6E8A-4147-A177-3AD203B41FA5}">
                       <a16:colId xmlns:a16="http://schemas.microsoft.com/office/drawing/2014/main" val="1589697548"/>
                     </a:ext>
                   </a:extLst>
                 </a:gridCol>
-                <a:gridCol w="1454143">
+                <a:gridCol w="1333091">
                   <a:extLst>
                     <a:ext uri="{9D8B030D-6E8A-4147-A177-3AD203B41FA5}">
                       <a16:colId xmlns:a16="http://schemas.microsoft.com/office/drawing/2014/main" val="1740583638"/>
                     </a:ext>
                   </a:extLst>
                 </a:gridCol>
-                <a:gridCol w="1459685">
+                <a:gridCol w="1338172">
                   <a:extLst>
                     <a:ext uri="{9D8B030D-6E8A-4147-A177-3AD203B41FA5}">
                       <a16:colId xmlns:a16="http://schemas.microsoft.com/office/drawing/2014/main" val="3889417040"/>
@@ -6022,6 +6019,20 @@
                     <a:p>
                       <a:r>
                         <a:rPr lang="en-US" sz="1000" dirty="0" err="1"/>
+                        <a:t>PMTL_Status</a:t>
+                      </a:r>
+                      <a:endParaRPr lang="en-US" sz="1000" dirty="0"/>
+                    </a:p>
+                  </a:txBody>
+                  <a:tcPr/>
+                </a:tc>
+                <a:tc>
+                  <a:txBody>
+                    <a:bodyPr/>
+                    <a:lstStyle/>
+                    <a:p>
+                      <a:r>
+                        <a:rPr lang="en-US" sz="1000" dirty="0" err="1"/>
                         <a:t>Drug_Name</a:t>
                       </a:r>
                       <a:endParaRPr lang="en-US" sz="1000" dirty="0"/>
@@ -6147,7 +6158,7 @@
                   </a:ext>
                 </a:extLst>
               </a:tr>
-              <a:tr h="260688">
+              <a:tr h="240840">
                 <a:tc>
                   <a:txBody>
                     <a:bodyPr/>
@@ -6162,47 +6173,60 @@
                           <a:effectLst/>
                           <a:latin typeface="Aptos Narrow" panose="020B0004020202020204" pitchFamily="34" charset="0"/>
                         </a:rPr>
-                        <a:t>ABL1</a:t>
-                      </a:r>
-                    </a:p>
-                  </a:txBody>
-                  <a:tcPr marL="9525" marR="9525" marT="9525" marB="0"/>
-                </a:tc>
-                <a:tc>
-                  <a:txBody>
-                    <a:bodyPr/>
-                    <a:lstStyle/>
-                    <a:p>
-                      <a:pPr algn="l" fontAlgn="b"/>
-                      <a:r>
-                        <a:rPr lang="en-US" sz="1200" b="0" i="0" u="none" strike="noStrike" dirty="0" err="1">
-                          <a:solidFill>
-                            <a:srgbClr val="000000"/>
-                          </a:solidFill>
-                          <a:effectLst/>
-                          <a:latin typeface="Aptos Narrow" panose="020B0004020202020204" pitchFamily="34" charset="0"/>
-                        </a:rPr>
-                        <a:t>Axitinib</a:t>
-                      </a:r>
-                      <a:endParaRPr lang="en-US" sz="1200" b="0" i="0" u="none" strike="noStrike" dirty="0">
-                        <a:solidFill>
-                          <a:srgbClr val="000000"/>
-                        </a:solidFill>
-                        <a:effectLst/>
-                        <a:latin typeface="Aptos Narrow" panose="020B0004020202020204" pitchFamily="34" charset="0"/>
-                      </a:endParaRPr>
-                    </a:p>
-                  </a:txBody>
-                  <a:tcPr marL="9525" marR="9525" marT="9525" marB="0"/>
-                </a:tc>
-                <a:tc>
-                  <a:txBody>
-                    <a:bodyPr/>
-                    <a:lstStyle/>
-                    <a:p>
-                      <a:pPr algn="l" fontAlgn="b"/>
-                      <a:r>
-                        <a:rPr lang="en-US" sz="1200" b="0" i="0" u="none" strike="noStrike">
+                        <a:t>ACE</a:t>
+                      </a:r>
+                    </a:p>
+                  </a:txBody>
+                  <a:tcPr marL="9525" marR="9525" marT="9525" marB="0"/>
+                </a:tc>
+                <a:tc>
+                  <a:txBody>
+                    <a:bodyPr/>
+                    <a:lstStyle/>
+                    <a:p>
+                      <a:pPr algn="l" fontAlgn="b"/>
+                      <a:r>
+                        <a:rPr lang="en-US" sz="1200" b="0" i="0" u="none" strike="noStrike">
+                          <a:solidFill>
+                            <a:srgbClr val="000000"/>
+                          </a:solidFill>
+                          <a:effectLst/>
+                          <a:latin typeface="Aptos Narrow" panose="020B0004020202020204" pitchFamily="34" charset="0"/>
+                        </a:rPr>
+                        <a:t>No</a:t>
+                      </a:r>
+                    </a:p>
+                  </a:txBody>
+                  <a:tcPr marL="9525" marR="9525" marT="9525" marB="0"/>
+                </a:tc>
+                <a:tc>
+                  <a:txBody>
+                    <a:bodyPr/>
+                    <a:lstStyle/>
+                    <a:p>
+                      <a:pPr algn="l" fontAlgn="b"/>
+                      <a:r>
+                        <a:rPr lang="en-US" sz="1200" b="0" i="0" u="none" strike="noStrike">
+                          <a:solidFill>
+                            <a:srgbClr val="000000"/>
+                          </a:solidFill>
+                          <a:effectLst/>
+                          <a:latin typeface="Aptos Narrow" panose="020B0004020202020204" pitchFamily="34" charset="0"/>
+                        </a:rPr>
+                        <a:t>accupril</a:t>
+                      </a:r>
+                    </a:p>
+                  </a:txBody>
+                  <a:tcPr marL="9525" marR="9525" marT="9525" marB="0"/>
+                </a:tc>
+                <a:tc>
+                  <a:txBody>
+                    <a:bodyPr/>
+                    <a:lstStyle/>
+                    <a:p>
+                      <a:pPr algn="l" fontAlgn="b"/>
+                      <a:r>
+                        <a:rPr lang="en-US" sz="1200" b="0" i="0" u="none" strike="noStrike" dirty="0">
                           <a:solidFill>
                             <a:srgbClr val="000000"/>
                           </a:solidFill>
@@ -6222,6 +6246,26 @@
                     <a:p>
                       <a:pPr algn="l" fontAlgn="b"/>
                       <a:r>
+                        <a:rPr lang="en-US" sz="1200" b="0" i="0" u="none" strike="noStrike" dirty="0">
+                          <a:solidFill>
+                            <a:srgbClr val="000000"/>
+                          </a:solidFill>
+                          <a:effectLst/>
+                          <a:latin typeface="Aptos Narrow" panose="020B0004020202020204" pitchFamily="34" charset="0"/>
+                        </a:rPr>
+                        <a:t>No</a:t>
+                      </a:r>
+                    </a:p>
+                  </a:txBody>
+                  <a:tcPr marL="9525" marR="9525" marT="9525" marB="0"/>
+                </a:tc>
+                <a:tc>
+                  <a:txBody>
+                    <a:bodyPr/>
+                    <a:lstStyle/>
+                    <a:p>
+                      <a:pPr algn="l" fontAlgn="b"/>
+                      <a:r>
                         <a:rPr lang="en-US" sz="1200" b="0" i="0" u="none" strike="noStrike">
                           <a:solidFill>
                             <a:srgbClr val="000000"/>
@@ -6242,106 +6286,6 @@
                     <a:p>
                       <a:pPr algn="l" fontAlgn="b"/>
                       <a:r>
-                        <a:rPr lang="en-US" sz="1200" b="0" i="0" u="none" strike="noStrike">
-                          <a:solidFill>
-                            <a:srgbClr val="000000"/>
-                          </a:solidFill>
-                          <a:effectLst/>
-                          <a:latin typeface="Aptos Narrow" panose="020B0004020202020204" pitchFamily="34" charset="0"/>
-                        </a:rPr>
-                        <a:t>Yes</a:t>
-                      </a:r>
-                    </a:p>
-                  </a:txBody>
-                  <a:tcPr marL="9525" marR="9525" marT="9525" marB="0"/>
-                </a:tc>
-                <a:tc>
-                  <a:txBody>
-                    <a:bodyPr/>
-                    <a:lstStyle/>
-                    <a:p>
-                      <a:pPr algn="l" fontAlgn="b"/>
-                      <a:r>
-                        <a:rPr lang="en-US" sz="1200" b="0" i="0" u="none" strike="noStrike">
-                          <a:solidFill>
-                            <a:srgbClr val="000000"/>
-                          </a:solidFill>
-                          <a:effectLst/>
-                          <a:latin typeface="Aptos Narrow" panose="020B0004020202020204" pitchFamily="34" charset="0"/>
-                        </a:rPr>
-                        <a:t>Yes</a:t>
-                      </a:r>
-                    </a:p>
-                  </a:txBody>
-                  <a:tcPr marL="9525" marR="9525" marT="9525" marB="0"/>
-                </a:tc>
-                <a:tc>
-                  <a:txBody>
-                    <a:bodyPr/>
-                    <a:lstStyle/>
-                    <a:p>
-                      <a:pPr algn="l" fontAlgn="b"/>
-                      <a:r>
-                        <a:rPr lang="en-US" sz="1200" b="0" i="0" u="none" strike="noStrike">
-                          <a:solidFill>
-                            <a:srgbClr val="000000"/>
-                          </a:solidFill>
-                          <a:effectLst/>
-                          <a:latin typeface="Aptos Narrow" panose="020B0004020202020204" pitchFamily="34" charset="0"/>
-                        </a:rPr>
-                        <a:t>Yes</a:t>
-                      </a:r>
-                    </a:p>
-                  </a:txBody>
-                  <a:tcPr marL="9525" marR="9525" marT="9525" marB="0"/>
-                </a:tc>
-                <a:tc>
-                  <a:txBody>
-                    <a:bodyPr/>
-                    <a:lstStyle/>
-                    <a:p>
-                      <a:pPr algn="l" fontAlgn="b"/>
-                      <a:r>
-                        <a:rPr lang="en-US" sz="1200" b="0" i="0" u="none" strike="noStrike">
-                          <a:solidFill>
-                            <a:srgbClr val="000000"/>
-                          </a:solidFill>
-                          <a:effectLst/>
-                          <a:latin typeface="Aptos Narrow" panose="020B0004020202020204" pitchFamily="34" charset="0"/>
-                        </a:rPr>
-                        <a:t>Yes</a:t>
-                      </a:r>
-                    </a:p>
-                  </a:txBody>
-                  <a:tcPr marL="9525" marR="9525" marT="9525" marB="0"/>
-                </a:tc>
-                <a:tc>
-                  <a:txBody>
-                    <a:bodyPr/>
-                    <a:lstStyle/>
-                    <a:p>
-                      <a:pPr algn="l" fontAlgn="b"/>
-                      <a:r>
-                        <a:rPr lang="en-US" sz="1200" b="0" i="0" u="none" strike="noStrike">
-                          <a:solidFill>
-                            <a:srgbClr val="000000"/>
-                          </a:solidFill>
-                          <a:effectLst/>
-                          <a:latin typeface="Aptos Narrow" panose="020B0004020202020204" pitchFamily="34" charset="0"/>
-                        </a:rPr>
-                        <a:t>IDG</a:t>
-                      </a:r>
-                    </a:p>
-                  </a:txBody>
-                  <a:tcPr marL="9525" marR="9525" marT="9525" marB="0"/>
-                </a:tc>
-                <a:tc>
-                  <a:txBody>
-                    <a:bodyPr/>
-                    <a:lstStyle/>
-                    <a:p>
-                      <a:pPr algn="l" fontAlgn="b"/>
-                      <a:r>
                         <a:rPr lang="en-US" sz="1200" b="0" i="0" u="none" strike="noStrike" dirty="0">
                           <a:solidFill>
                             <a:srgbClr val="000000"/>
@@ -6349,7 +6293,87 @@
                           <a:effectLst/>
                           <a:latin typeface="Aptos Narrow" panose="020B0004020202020204" pitchFamily="34" charset="0"/>
                         </a:rPr>
-                        <a:t>OT_IDG_PMTL</a:t>
+                        <a:t>No</a:t>
+                      </a:r>
+                    </a:p>
+                  </a:txBody>
+                  <a:tcPr marL="9525" marR="9525" marT="9525" marB="0"/>
+                </a:tc>
+                <a:tc>
+                  <a:txBody>
+                    <a:bodyPr/>
+                    <a:lstStyle/>
+                    <a:p>
+                      <a:pPr algn="l" fontAlgn="b"/>
+                      <a:r>
+                        <a:rPr lang="en-US" sz="1200" b="0" i="0" u="none" strike="noStrike">
+                          <a:solidFill>
+                            <a:srgbClr val="000000"/>
+                          </a:solidFill>
+                          <a:effectLst/>
+                          <a:latin typeface="Aptos Narrow" panose="020B0004020202020204" pitchFamily="34" charset="0"/>
+                        </a:rPr>
+                        <a:t>No</a:t>
+                      </a:r>
+                    </a:p>
+                  </a:txBody>
+                  <a:tcPr marL="9525" marR="9525" marT="9525" marB="0"/>
+                </a:tc>
+                <a:tc>
+                  <a:txBody>
+                    <a:bodyPr/>
+                    <a:lstStyle/>
+                    <a:p>
+                      <a:pPr algn="l" fontAlgn="b"/>
+                      <a:r>
+                        <a:rPr lang="en-US" sz="1200" b="0" i="0" u="none" strike="noStrike">
+                          <a:solidFill>
+                            <a:srgbClr val="000000"/>
+                          </a:solidFill>
+                          <a:effectLst/>
+                          <a:latin typeface="Aptos Narrow" panose="020B0004020202020204" pitchFamily="34" charset="0"/>
+                        </a:rPr>
+                        <a:t>No</a:t>
+                      </a:r>
+                    </a:p>
+                  </a:txBody>
+                  <a:tcPr marL="9525" marR="9525" marT="9525" marB="0"/>
+                </a:tc>
+                <a:tc>
+                  <a:txBody>
+                    <a:bodyPr/>
+                    <a:lstStyle/>
+                    <a:p>
+                      <a:pPr algn="l" fontAlgn="b"/>
+                      <a:r>
+                        <a:rPr lang="en-US" sz="1200" b="0" i="0" u="none" strike="noStrike">
+                          <a:solidFill>
+                            <a:srgbClr val="000000"/>
+                          </a:solidFill>
+                          <a:effectLst/>
+                          <a:latin typeface="Aptos Narrow" panose="020B0004020202020204" pitchFamily="34" charset="0"/>
+                        </a:rPr>
+                        <a:t>CT</a:t>
+                      </a:r>
+                    </a:p>
+                  </a:txBody>
+                  <a:tcPr marL="9525" marR="9525" marT="9525" marB="0"/>
+                </a:tc>
+                <a:tc>
+                  <a:txBody>
+                    <a:bodyPr/>
+                    <a:lstStyle/>
+                    <a:p>
+                      <a:pPr algn="l" fontAlgn="b"/>
+                      <a:r>
+                        <a:rPr lang="en-US" sz="1200" b="0" i="0" u="none" strike="noStrike" dirty="0">
+                          <a:solidFill>
+                            <a:srgbClr val="000000"/>
+                          </a:solidFill>
+                          <a:effectLst/>
+                          <a:latin typeface="Aptos Narrow" panose="020B0004020202020204" pitchFamily="34" charset="0"/>
+                        </a:rPr>
+                        <a:t>OT_IDG</a:t>
                       </a:r>
                     </a:p>
                   </a:txBody>
@@ -6376,35 +6400,48 @@
                           <a:effectLst/>
                           <a:latin typeface="Aptos Narrow" panose="020B0004020202020204" pitchFamily="34" charset="0"/>
                         </a:rPr>
-                        <a:t>BCL2</a:t>
-                      </a:r>
-                    </a:p>
-                  </a:txBody>
-                  <a:tcPr marL="9525" marR="9525" marT="9525" marB="0"/>
-                </a:tc>
-                <a:tc>
-                  <a:txBody>
-                    <a:bodyPr/>
-                    <a:lstStyle/>
-                    <a:p>
-                      <a:pPr algn="l" fontAlgn="b"/>
-                      <a:r>
-                        <a:rPr lang="en-US" sz="1200" b="0" i="0" u="none" strike="noStrike" dirty="0" err="1">
-                          <a:solidFill>
-                            <a:srgbClr val="000000"/>
-                          </a:solidFill>
-                          <a:effectLst/>
-                          <a:latin typeface="Aptos Narrow" panose="020B0004020202020204" pitchFamily="34" charset="0"/>
-                        </a:rPr>
-                        <a:t>oblimersen</a:t>
-                      </a:r>
-                      <a:endParaRPr lang="en-US" sz="1200" b="0" i="0" u="none" strike="noStrike" dirty="0">
-                        <a:solidFill>
-                          <a:srgbClr val="000000"/>
-                        </a:solidFill>
-                        <a:effectLst/>
-                        <a:latin typeface="Aptos Narrow" panose="020B0004020202020204" pitchFamily="34" charset="0"/>
-                      </a:endParaRPr>
+                        <a:t>EGFR</a:t>
+                      </a:r>
+                    </a:p>
+                  </a:txBody>
+                  <a:tcPr marL="9525" marR="9525" marT="9525" marB="0"/>
+                </a:tc>
+                <a:tc>
+                  <a:txBody>
+                    <a:bodyPr/>
+                    <a:lstStyle/>
+                    <a:p>
+                      <a:pPr algn="l" fontAlgn="b"/>
+                      <a:r>
+                        <a:rPr lang="en-US" sz="1200" b="0" i="0" u="none" strike="noStrike">
+                          <a:solidFill>
+                            <a:srgbClr val="000000"/>
+                          </a:solidFill>
+                          <a:effectLst/>
+                          <a:latin typeface="Aptos Narrow" panose="020B0004020202020204" pitchFamily="34" charset="0"/>
+                        </a:rPr>
+                        <a:t>Yes</a:t>
+                      </a:r>
+                    </a:p>
+                  </a:txBody>
+                  <a:tcPr marL="9525" marR="9525" marT="9525" marB="0"/>
+                </a:tc>
+                <a:tc>
+                  <a:txBody>
+                    <a:bodyPr/>
+                    <a:lstStyle/>
+                    <a:p>
+                      <a:pPr algn="l" fontAlgn="b"/>
+                      <a:r>
+                        <a:rPr lang="en-US" sz="1200" b="0" i="0" u="none" strike="noStrike">
+                          <a:solidFill>
+                            <a:srgbClr val="000000"/>
+                          </a:solidFill>
+                          <a:effectLst/>
+                          <a:latin typeface="Aptos Narrow" panose="020B0004020202020204" pitchFamily="34" charset="0"/>
+                        </a:rPr>
+                        <a:t>falnidamol</a:t>
+                      </a:r>
                     </a:p>
                   </a:txBody>
                   <a:tcPr marL="9525" marR="9525" marT="9525" marB="0"/>
@@ -6423,6 +6460,86 @@
                           <a:effectLst/>
                           <a:latin typeface="Aptos Narrow" panose="020B0004020202020204" pitchFamily="34" charset="0"/>
                         </a:rPr>
+                        <a:t>No</a:t>
+                      </a:r>
+                    </a:p>
+                  </a:txBody>
+                  <a:tcPr marL="9525" marR="9525" marT="9525" marB="0"/>
+                </a:tc>
+                <a:tc>
+                  <a:txBody>
+                    <a:bodyPr/>
+                    <a:lstStyle/>
+                    <a:p>
+                      <a:pPr algn="l" fontAlgn="b"/>
+                      <a:r>
+                        <a:rPr lang="en-US" sz="1200" b="0" i="0" u="none" strike="noStrike" dirty="0">
+                          <a:solidFill>
+                            <a:srgbClr val="000000"/>
+                          </a:solidFill>
+                          <a:effectLst/>
+                          <a:latin typeface="Aptos Narrow" panose="020B0004020202020204" pitchFamily="34" charset="0"/>
+                        </a:rPr>
+                        <a:t>No</a:t>
+                      </a:r>
+                    </a:p>
+                  </a:txBody>
+                  <a:tcPr marL="9525" marR="9525" marT="9525" marB="0"/>
+                </a:tc>
+                <a:tc>
+                  <a:txBody>
+                    <a:bodyPr/>
+                    <a:lstStyle/>
+                    <a:p>
+                      <a:pPr algn="l" fontAlgn="b"/>
+                      <a:r>
+                        <a:rPr lang="en-US" sz="1200" b="0" i="0" u="none" strike="noStrike">
+                          <a:solidFill>
+                            <a:srgbClr val="000000"/>
+                          </a:solidFill>
+                          <a:effectLst/>
+                          <a:latin typeface="Aptos Narrow" panose="020B0004020202020204" pitchFamily="34" charset="0"/>
+                        </a:rPr>
+                        <a:t>No</a:t>
+                      </a:r>
+                    </a:p>
+                  </a:txBody>
+                  <a:tcPr marL="9525" marR="9525" marT="9525" marB="0"/>
+                </a:tc>
+                <a:tc>
+                  <a:txBody>
+                    <a:bodyPr/>
+                    <a:lstStyle/>
+                    <a:p>
+                      <a:pPr algn="l" fontAlgn="b"/>
+                      <a:r>
+                        <a:rPr lang="en-US" sz="1200" b="0" i="0" u="none" strike="noStrike" dirty="0">
+                          <a:solidFill>
+                            <a:srgbClr val="000000"/>
+                          </a:solidFill>
+                          <a:effectLst/>
+                          <a:latin typeface="Aptos Narrow" panose="020B0004020202020204" pitchFamily="34" charset="0"/>
+                        </a:rPr>
+                        <a:t>No</a:t>
+                      </a:r>
+                    </a:p>
+                  </a:txBody>
+                  <a:tcPr marL="9525" marR="9525" marT="9525" marB="0"/>
+                </a:tc>
+                <a:tc>
+                  <a:txBody>
+                    <a:bodyPr/>
+                    <a:lstStyle/>
+                    <a:p>
+                      <a:pPr algn="l" fontAlgn="b"/>
+                      <a:r>
+                        <a:rPr lang="en-US" sz="1200" b="0" i="0" u="none" strike="noStrike">
+                          <a:solidFill>
+                            <a:srgbClr val="000000"/>
+                          </a:solidFill>
+                          <a:effectLst/>
+                          <a:latin typeface="Aptos Narrow" panose="020B0004020202020204" pitchFamily="34" charset="0"/>
+                        </a:rPr>
                         <a:t>Yes</a:t>
                       </a:r>
                     </a:p>
@@ -6436,7 +6553,7 @@
                     <a:p>
                       <a:pPr algn="l" fontAlgn="b"/>
                       <a:r>
-                        <a:rPr lang="en-US" sz="1200" b="0" i="0" u="none" strike="noStrike" dirty="0">
+                        <a:rPr lang="en-US" sz="1200" b="0" i="0" u="none" strike="noStrike">
                           <a:solidFill>
                             <a:srgbClr val="000000"/>
                           </a:solidFill>
@@ -6456,94 +6573,14 @@
                     <a:p>
                       <a:pPr algn="l" fontAlgn="b"/>
                       <a:r>
-                        <a:rPr lang="en-US" sz="1200" b="0" i="0" u="none" strike="noStrike" dirty="0">
-                          <a:solidFill>
-                            <a:srgbClr val="000000"/>
-                          </a:solidFill>
-                          <a:effectLst/>
-                          <a:latin typeface="Aptos Narrow" panose="020B0004020202020204" pitchFamily="34" charset="0"/>
-                        </a:rPr>
-                        <a:t>Yes</a:t>
-                      </a:r>
-                    </a:p>
-                  </a:txBody>
-                  <a:tcPr marL="9525" marR="9525" marT="9525" marB="0"/>
-                </a:tc>
-                <a:tc>
-                  <a:txBody>
-                    <a:bodyPr/>
-                    <a:lstStyle/>
-                    <a:p>
-                      <a:pPr algn="l" fontAlgn="b"/>
-                      <a:r>
-                        <a:rPr lang="en-US" sz="1200" b="0" i="0" u="none" strike="noStrike" dirty="0">
-                          <a:solidFill>
-                            <a:srgbClr val="000000"/>
-                          </a:solidFill>
-                          <a:effectLst/>
-                          <a:latin typeface="Aptos Narrow" panose="020B0004020202020204" pitchFamily="34" charset="0"/>
-                        </a:rPr>
-                        <a:t>No</a:t>
-                      </a:r>
-                    </a:p>
-                  </a:txBody>
-                  <a:tcPr marL="9525" marR="9525" marT="9525" marB="0"/>
-                </a:tc>
-                <a:tc>
-                  <a:txBody>
-                    <a:bodyPr/>
-                    <a:lstStyle/>
-                    <a:p>
-                      <a:pPr algn="l" fontAlgn="b"/>
-                      <a:r>
-                        <a:rPr lang="en-US" sz="1200" b="0" i="0" u="none" strike="noStrike" dirty="0">
-                          <a:solidFill>
-                            <a:srgbClr val="000000"/>
-                          </a:solidFill>
-                          <a:effectLst/>
-                          <a:latin typeface="Aptos Narrow" panose="020B0004020202020204" pitchFamily="34" charset="0"/>
-                        </a:rPr>
-                        <a:t>Yes</a:t>
-                      </a:r>
-                    </a:p>
-                  </a:txBody>
-                  <a:tcPr marL="9525" marR="9525" marT="9525" marB="0"/>
-                </a:tc>
-                <a:tc>
-                  <a:txBody>
-                    <a:bodyPr/>
-                    <a:lstStyle/>
-                    <a:p>
-                      <a:pPr algn="l" fontAlgn="b"/>
-                      <a:r>
-                        <a:rPr lang="en-US" sz="1200" b="0" i="0" u="none" strike="noStrike">
-                          <a:solidFill>
-                            <a:srgbClr val="000000"/>
-                          </a:solidFill>
-                          <a:effectLst/>
-                          <a:latin typeface="Aptos Narrow" panose="020B0004020202020204" pitchFamily="34" charset="0"/>
-                        </a:rPr>
-                        <a:t>No</a:t>
-                      </a:r>
-                    </a:p>
-                  </a:txBody>
-                  <a:tcPr marL="9525" marR="9525" marT="9525" marB="0"/>
-                </a:tc>
-                <a:tc>
-                  <a:txBody>
-                    <a:bodyPr/>
-                    <a:lstStyle/>
-                    <a:p>
-                      <a:pPr algn="l" fontAlgn="b"/>
-                      <a:r>
-                        <a:rPr lang="en-US" sz="1200" b="0" i="0" u="none" strike="noStrike">
-                          <a:solidFill>
-                            <a:srgbClr val="000000"/>
-                          </a:solidFill>
-                          <a:effectLst/>
-                          <a:latin typeface="Aptos Narrow" panose="020B0004020202020204" pitchFamily="34" charset="0"/>
-                        </a:rPr>
-                        <a:t>OT_CT</a:t>
+                        <a:rPr lang="en-US" sz="1200" b="0" i="0" u="none" strike="noStrike">
+                          <a:solidFill>
+                            <a:srgbClr val="000000"/>
+                          </a:solidFill>
+                          <a:effectLst/>
+                          <a:latin typeface="Aptos Narrow" panose="020B0004020202020204" pitchFamily="34" charset="0"/>
+                        </a:rPr>
+                        <a:t>OT</a:t>
                       </a:r>
                     </a:p>
                   </a:txBody>
@@ -6590,7 +6627,47 @@
                           <a:effectLst/>
                           <a:latin typeface="Aptos Narrow" panose="020B0004020202020204" pitchFamily="34" charset="0"/>
                         </a:rPr>
-                        <a:t>PARP10</a:t>
+                        <a:t>SCN11A</a:t>
+                      </a:r>
+                    </a:p>
+                  </a:txBody>
+                  <a:tcPr marL="9525" marR="9525" marT="9525" marB="0"/>
+                </a:tc>
+                <a:tc>
+                  <a:txBody>
+                    <a:bodyPr/>
+                    <a:lstStyle/>
+                    <a:p>
+                      <a:pPr algn="l" fontAlgn="b"/>
+                      <a:r>
+                        <a:rPr lang="en-US" sz="1200" b="0" i="0" u="none" strike="noStrike">
+                          <a:solidFill>
+                            <a:srgbClr val="000000"/>
+                          </a:solidFill>
+                          <a:effectLst/>
+                          <a:latin typeface="Aptos Narrow" panose="020B0004020202020204" pitchFamily="34" charset="0"/>
+                        </a:rPr>
+                        <a:t>No</a:t>
+                      </a:r>
+                    </a:p>
+                  </a:txBody>
+                  <a:tcPr marL="9525" marR="9525" marT="9525" marB="0"/>
+                </a:tc>
+                <a:tc>
+                  <a:txBody>
+                    <a:bodyPr/>
+                    <a:lstStyle/>
+                    <a:p>
+                      <a:pPr algn="l" fontAlgn="b"/>
+                      <a:r>
+                        <a:rPr lang="en-US" sz="1200" b="0" i="0" u="none" strike="noStrike">
+                          <a:solidFill>
+                            <a:srgbClr val="000000"/>
+                          </a:solidFill>
+                          <a:effectLst/>
+                          <a:latin typeface="Aptos Narrow" panose="020B0004020202020204" pitchFamily="34" charset="0"/>
+                        </a:rPr>
+                        <a:t>phenytoin</a:t>
                       </a:r>
                     </a:p>
                   </a:txBody>
@@ -6610,7 +6687,7 @@
                           <a:effectLst/>
                           <a:latin typeface="Aptos Narrow" panose="020B0004020202020204" pitchFamily="34" charset="0"/>
                         </a:rPr>
-                        <a:t>rucaparib</a:t>
+                        <a:t>Yes</a:t>
                       </a:r>
                     </a:p>
                   </a:txBody>
@@ -6650,7 +6727,7 @@
                           <a:effectLst/>
                           <a:latin typeface="Aptos Narrow" panose="020B0004020202020204" pitchFamily="34" charset="0"/>
                         </a:rPr>
-                        <a:t>No</a:t>
+                        <a:t>Yes</a:t>
                       </a:r>
                     </a:p>
                   </a:txBody>
@@ -6683,6 +6760,66 @@
                     <a:p>
                       <a:pPr algn="l" fontAlgn="b"/>
                       <a:r>
+                        <a:rPr lang="en-US" sz="1200" b="0" i="0" u="none" strike="noStrike">
+                          <a:solidFill>
+                            <a:srgbClr val="000000"/>
+                          </a:solidFill>
+                          <a:effectLst/>
+                          <a:latin typeface="Aptos Narrow" panose="020B0004020202020204" pitchFamily="34" charset="0"/>
+                        </a:rPr>
+                        <a:t>Yes</a:t>
+                      </a:r>
+                    </a:p>
+                  </a:txBody>
+                  <a:tcPr marL="9525" marR="9525" marT="9525" marB="0"/>
+                </a:tc>
+                <a:tc>
+                  <a:txBody>
+                    <a:bodyPr/>
+                    <a:lstStyle/>
+                    <a:p>
+                      <a:pPr algn="l" fontAlgn="b"/>
+                      <a:r>
+                        <a:rPr lang="en-US" sz="1200" b="0" i="0" u="none" strike="noStrike">
+                          <a:solidFill>
+                            <a:srgbClr val="000000"/>
+                          </a:solidFill>
+                          <a:effectLst/>
+                          <a:latin typeface="Aptos Narrow" panose="020B0004020202020204" pitchFamily="34" charset="0"/>
+                        </a:rPr>
+                        <a:t>Yes</a:t>
+                      </a:r>
+                    </a:p>
+                  </a:txBody>
+                  <a:tcPr marL="9525" marR="9525" marT="9525" marB="0"/>
+                </a:tc>
+                <a:tc>
+                  <a:txBody>
+                    <a:bodyPr/>
+                    <a:lstStyle/>
+                    <a:p>
+                      <a:pPr algn="l" fontAlgn="b"/>
+                      <a:r>
+                        <a:rPr lang="en-US" sz="1200" b="0" i="0" u="none" strike="noStrike">
+                          <a:solidFill>
+                            <a:srgbClr val="000000"/>
+                          </a:solidFill>
+                          <a:effectLst/>
+                          <a:latin typeface="Aptos Narrow" panose="020B0004020202020204" pitchFamily="34" charset="0"/>
+                        </a:rPr>
+                        <a:t>OT_CT</a:t>
+                      </a:r>
+                    </a:p>
+                  </a:txBody>
+                  <a:tcPr marL="9525" marR="9525" marT="9525" marB="0"/>
+                </a:tc>
+                <a:tc>
+                  <a:txBody>
+                    <a:bodyPr/>
+                    <a:lstStyle/>
+                    <a:p>
+                      <a:pPr algn="l" fontAlgn="b"/>
+                      <a:r>
                         <a:rPr lang="en-US" sz="1200" b="0" i="0" u="none" strike="noStrike" dirty="0">
                           <a:solidFill>
                             <a:srgbClr val="000000"/>
@@ -6690,87 +6827,7 @@
                           <a:effectLst/>
                           <a:latin typeface="Aptos Narrow" panose="020B0004020202020204" pitchFamily="34" charset="0"/>
                         </a:rPr>
-                        <a:t>Yes</a:t>
-                      </a:r>
-                    </a:p>
-                  </a:txBody>
-                  <a:tcPr marL="9525" marR="9525" marT="9525" marB="0"/>
-                </a:tc>
-                <a:tc>
-                  <a:txBody>
-                    <a:bodyPr/>
-                    <a:lstStyle/>
-                    <a:p>
-                      <a:pPr algn="l" fontAlgn="b"/>
-                      <a:r>
-                        <a:rPr lang="en-US" sz="1200" b="0" i="0" u="none" strike="noStrike">
-                          <a:solidFill>
-                            <a:srgbClr val="000000"/>
-                          </a:solidFill>
-                          <a:effectLst/>
-                          <a:latin typeface="Aptos Narrow" panose="020B0004020202020204" pitchFamily="34" charset="0"/>
-                        </a:rPr>
-                        <a:t>Yes</a:t>
-                      </a:r>
-                    </a:p>
-                  </a:txBody>
-                  <a:tcPr marL="9525" marR="9525" marT="9525" marB="0"/>
-                </a:tc>
-                <a:tc>
-                  <a:txBody>
-                    <a:bodyPr/>
-                    <a:lstStyle/>
-                    <a:p>
-                      <a:pPr algn="l" fontAlgn="b"/>
-                      <a:r>
-                        <a:rPr lang="en-US" sz="1200" b="0" i="0" u="none" strike="noStrike">
-                          <a:solidFill>
-                            <a:srgbClr val="000000"/>
-                          </a:solidFill>
-                          <a:effectLst/>
-                          <a:latin typeface="Aptos Narrow" panose="020B0004020202020204" pitchFamily="34" charset="0"/>
-                        </a:rPr>
-                        <a:t>Yes</a:t>
-                      </a:r>
-                    </a:p>
-                  </a:txBody>
-                  <a:tcPr marL="9525" marR="9525" marT="9525" marB="0"/>
-                </a:tc>
-                <a:tc>
-                  <a:txBody>
-                    <a:bodyPr/>
-                    <a:lstStyle/>
-                    <a:p>
-                      <a:pPr algn="l" fontAlgn="b"/>
-                      <a:r>
-                        <a:rPr lang="en-US" sz="1200" b="0" i="0" u="none" strike="noStrike">
-                          <a:solidFill>
-                            <a:srgbClr val="000000"/>
-                          </a:solidFill>
-                          <a:effectLst/>
-                          <a:latin typeface="Aptos Narrow" panose="020B0004020202020204" pitchFamily="34" charset="0"/>
-                        </a:rPr>
-                        <a:t>IDG</a:t>
-                      </a:r>
-                    </a:p>
-                  </a:txBody>
-                  <a:tcPr marL="9525" marR="9525" marT="9525" marB="0"/>
-                </a:tc>
-                <a:tc>
-                  <a:txBody>
-                    <a:bodyPr/>
-                    <a:lstStyle/>
-                    <a:p>
-                      <a:pPr algn="l" fontAlgn="b"/>
-                      <a:r>
-                        <a:rPr lang="en-US" sz="1200" b="0" i="0" u="none" strike="noStrike" dirty="0">
-                          <a:solidFill>
-                            <a:srgbClr val="000000"/>
-                          </a:solidFill>
-                          <a:effectLst/>
-                          <a:latin typeface="Aptos Narrow" panose="020B0004020202020204" pitchFamily="34" charset="0"/>
-                        </a:rPr>
-                        <a:t>IDG_PMTL</a:t>
+                        <a:t>OT_IDG</a:t>
                       </a:r>
                     </a:p>
                   </a:txBody>
@@ -6797,7 +6854,27 @@
                           <a:effectLst/>
                           <a:latin typeface="Aptos Narrow" panose="020B0004020202020204" pitchFamily="34" charset="0"/>
                         </a:rPr>
-                        <a:t>MAP2K2</a:t>
+                        <a:t>TYRP1</a:t>
+                      </a:r>
+                    </a:p>
+                  </a:txBody>
+                  <a:tcPr marL="9525" marR="9525" marT="9525" marB="0"/>
+                </a:tc>
+                <a:tc>
+                  <a:txBody>
+                    <a:bodyPr/>
+                    <a:lstStyle/>
+                    <a:p>
+                      <a:pPr algn="l" fontAlgn="b"/>
+                      <a:r>
+                        <a:rPr lang="en-US" sz="1200" b="0" i="0" u="none" strike="noStrike">
+                          <a:solidFill>
+                            <a:srgbClr val="000000"/>
+                          </a:solidFill>
+                          <a:effectLst/>
+                          <a:latin typeface="Aptos Narrow" panose="020B0004020202020204" pitchFamily="34" charset="0"/>
+                        </a:rPr>
+                        <a:t>No</a:t>
                       </a:r>
                     </a:p>
                   </a:txBody>
@@ -6817,7 +6894,7 @@
                           <a:effectLst/>
                           <a:latin typeface="Aptos Narrow" panose="020B0004020202020204" pitchFamily="34" charset="0"/>
                         </a:rPr>
-                        <a:t>bay86-9766</a:t>
+                        <a:t>imc-20d7s</a:t>
                       </a:r>
                     </a:p>
                   </a:txBody>
@@ -6870,6 +6947,26 @@
                     <a:p>
                       <a:pPr algn="l" fontAlgn="b"/>
                       <a:r>
+                        <a:rPr lang="en-US" sz="1200" b="0" i="0" u="none" strike="noStrike">
+                          <a:solidFill>
+                            <a:srgbClr val="000000"/>
+                          </a:solidFill>
+                          <a:effectLst/>
+                          <a:latin typeface="Aptos Narrow" panose="020B0004020202020204" pitchFamily="34" charset="0"/>
+                        </a:rPr>
+                        <a:t>Yes</a:t>
+                      </a:r>
+                    </a:p>
+                  </a:txBody>
+                  <a:tcPr marL="9525" marR="9525" marT="9525" marB="0"/>
+                </a:tc>
+                <a:tc>
+                  <a:txBody>
+                    <a:bodyPr/>
+                    <a:lstStyle/>
+                    <a:p>
+                      <a:pPr algn="l" fontAlgn="b"/>
+                      <a:r>
                         <a:rPr lang="en-US" sz="1200" b="0" i="0" u="none" strike="noStrike" dirty="0">
                           <a:solidFill>
                             <a:srgbClr val="000000"/>
@@ -6877,7 +6974,67 @@
                           <a:effectLst/>
                           <a:latin typeface="Aptos Narrow" panose="020B0004020202020204" pitchFamily="34" charset="0"/>
                         </a:rPr>
-                        <a:t>Yes</a:t>
+                        <a:t>No</a:t>
+                      </a:r>
+                    </a:p>
+                  </a:txBody>
+                  <a:tcPr marL="9525" marR="9525" marT="9525" marB="0"/>
+                </a:tc>
+                <a:tc>
+                  <a:txBody>
+                    <a:bodyPr/>
+                    <a:lstStyle/>
+                    <a:p>
+                      <a:pPr algn="l" fontAlgn="b"/>
+                      <a:r>
+                        <a:rPr lang="en-US" sz="1200" b="0" i="0" u="none" strike="noStrike">
+                          <a:solidFill>
+                            <a:srgbClr val="000000"/>
+                          </a:solidFill>
+                          <a:effectLst/>
+                          <a:latin typeface="Aptos Narrow" panose="020B0004020202020204" pitchFamily="34" charset="0"/>
+                        </a:rPr>
+                        <a:t>No</a:t>
+                      </a:r>
+                    </a:p>
+                  </a:txBody>
+                  <a:tcPr marL="9525" marR="9525" marT="9525" marB="0"/>
+                </a:tc>
+                <a:tc>
+                  <a:txBody>
+                    <a:bodyPr/>
+                    <a:lstStyle/>
+                    <a:p>
+                      <a:pPr algn="l" fontAlgn="b"/>
+                      <a:r>
+                        <a:rPr lang="en-US" sz="1200" b="0" i="0" u="none" strike="noStrike">
+                          <a:solidFill>
+                            <a:srgbClr val="000000"/>
+                          </a:solidFill>
+                          <a:effectLst/>
+                          <a:latin typeface="Aptos Narrow" panose="020B0004020202020204" pitchFamily="34" charset="0"/>
+                        </a:rPr>
+                        <a:t>No</a:t>
+                      </a:r>
+                    </a:p>
+                  </a:txBody>
+                  <a:tcPr marL="9525" marR="9525" marT="9525" marB="0"/>
+                </a:tc>
+                <a:tc>
+                  <a:txBody>
+                    <a:bodyPr/>
+                    <a:lstStyle/>
+                    <a:p>
+                      <a:pPr algn="l" fontAlgn="b"/>
+                      <a:r>
+                        <a:rPr lang="en-US" sz="1200" b="0" i="0" u="none" strike="noStrike">
+                          <a:solidFill>
+                            <a:srgbClr val="000000"/>
+                          </a:solidFill>
+                          <a:effectLst/>
+                          <a:latin typeface="Aptos Narrow" panose="020B0004020202020204" pitchFamily="34" charset="0"/>
+                        </a:rPr>
+                        <a:t>CT</a:t>
                       </a:r>
                     </a:p>
                   </a:txBody>
@@ -6897,87 +7054,7 @@
                           <a:effectLst/>
                           <a:latin typeface="Aptos Narrow" panose="020B0004020202020204" pitchFamily="34" charset="0"/>
                         </a:rPr>
-                        <a:t>No</a:t>
-                      </a:r>
-                    </a:p>
-                  </a:txBody>
-                  <a:tcPr marL="9525" marR="9525" marT="9525" marB="0"/>
-                </a:tc>
-                <a:tc>
-                  <a:txBody>
-                    <a:bodyPr/>
-                    <a:lstStyle/>
-                    <a:p>
-                      <a:pPr algn="l" fontAlgn="b"/>
-                      <a:r>
-                        <a:rPr lang="en-US" sz="1200" b="0" i="0" u="none" strike="noStrike">
-                          <a:solidFill>
-                            <a:srgbClr val="000000"/>
-                          </a:solidFill>
-                          <a:effectLst/>
-                          <a:latin typeface="Aptos Narrow" panose="020B0004020202020204" pitchFamily="34" charset="0"/>
-                        </a:rPr>
-                        <a:t>No</a:t>
-                      </a:r>
-                    </a:p>
-                  </a:txBody>
-                  <a:tcPr marL="9525" marR="9525" marT="9525" marB="0"/>
-                </a:tc>
-                <a:tc>
-                  <a:txBody>
-                    <a:bodyPr/>
-                    <a:lstStyle/>
-                    <a:p>
-                      <a:pPr algn="l" fontAlgn="b"/>
-                      <a:r>
-                        <a:rPr lang="en-US" sz="1200" b="0" i="0" u="none" strike="noStrike">
-                          <a:solidFill>
-                            <a:srgbClr val="000000"/>
-                          </a:solidFill>
-                          <a:effectLst/>
-                          <a:latin typeface="Aptos Narrow" panose="020B0004020202020204" pitchFamily="34" charset="0"/>
-                        </a:rPr>
-                        <a:t>No</a:t>
-                      </a:r>
-                    </a:p>
-                  </a:txBody>
-                  <a:tcPr marL="9525" marR="9525" marT="9525" marB="0"/>
-                </a:tc>
-                <a:tc>
-                  <a:txBody>
-                    <a:bodyPr/>
-                    <a:lstStyle/>
-                    <a:p>
-                      <a:pPr algn="l" fontAlgn="b"/>
-                      <a:r>
-                        <a:rPr lang="en-US" sz="1200" b="0" i="0" u="none" strike="noStrike">
-                          <a:solidFill>
-                            <a:srgbClr val="000000"/>
-                          </a:solidFill>
-                          <a:effectLst/>
-                          <a:latin typeface="Aptos Narrow" panose="020B0004020202020204" pitchFamily="34" charset="0"/>
-                        </a:rPr>
-                        <a:t>CT</a:t>
-                      </a:r>
-                    </a:p>
-                  </a:txBody>
-                  <a:tcPr marL="9525" marR="9525" marT="9525" marB="0"/>
-                </a:tc>
-                <a:tc>
-                  <a:txBody>
-                    <a:bodyPr/>
-                    <a:lstStyle/>
-                    <a:p>
-                      <a:pPr algn="l" fontAlgn="b"/>
-                      <a:r>
-                        <a:rPr lang="en-US" sz="1200" b="0" i="0" u="none" strike="noStrike" dirty="0">
-                          <a:solidFill>
-                            <a:srgbClr val="000000"/>
-                          </a:solidFill>
-                          <a:effectLst/>
-                          <a:latin typeface="Aptos Narrow" panose="020B0004020202020204" pitchFamily="34" charset="0"/>
-                        </a:rPr>
-                        <a:t>OT_IDG_PMTL</a:t>
+                        <a:t>OT_IDG</a:t>
                       </a:r>
                     </a:p>
                   </a:txBody>
@@ -6989,7 +7066,7 @@
                   </a:ext>
                 </a:extLst>
               </a:tr>
-              <a:tr h="521352">
+              <a:tr h="237744">
                 <a:tc>
                   <a:txBody>
                     <a:bodyPr/>
@@ -7004,27 +7081,7 @@
                           <a:effectLst/>
                           <a:latin typeface="Aptos Narrow" panose="020B0004020202020204" pitchFamily="34" charset="0"/>
                         </a:rPr>
-                        <a:t>JAK2</a:t>
-                      </a:r>
-                    </a:p>
-                  </a:txBody>
-                  <a:tcPr marL="9525" marR="9525" marT="9525" marB="0"/>
-                </a:tc>
-                <a:tc>
-                  <a:txBody>
-                    <a:bodyPr/>
-                    <a:lstStyle/>
-                    <a:p>
-                      <a:pPr algn="l" fontAlgn="b"/>
-                      <a:r>
-                        <a:rPr lang="en-US" sz="1200" b="0" i="0" u="none" strike="noStrike">
-                          <a:solidFill>
-                            <a:srgbClr val="000000"/>
-                          </a:solidFill>
-                          <a:effectLst/>
-                          <a:latin typeface="Aptos Narrow" panose="020B0004020202020204" pitchFamily="34" charset="0"/>
-                        </a:rPr>
-                        <a:t>xl-019</a:t>
+                        <a:t>ZAP70</a:t>
                       </a:r>
                     </a:p>
                   </a:txBody>
@@ -7064,6 +7121,46 @@
                           <a:effectLst/>
                           <a:latin typeface="Aptos Narrow" panose="020B0004020202020204" pitchFamily="34" charset="0"/>
                         </a:rPr>
+                        <a:t>fostamatinib</a:t>
+                      </a:r>
+                    </a:p>
+                  </a:txBody>
+                  <a:tcPr marL="9525" marR="9525" marT="9525" marB="0"/>
+                </a:tc>
+                <a:tc>
+                  <a:txBody>
+                    <a:bodyPr/>
+                    <a:lstStyle/>
+                    <a:p>
+                      <a:pPr algn="l" fontAlgn="b"/>
+                      <a:r>
+                        <a:rPr lang="en-US" sz="1200" b="0" i="0" u="none" strike="noStrike" dirty="0">
+                          <a:solidFill>
+                            <a:srgbClr val="000000"/>
+                          </a:solidFill>
+                          <a:effectLst/>
+                          <a:latin typeface="Aptos Narrow" panose="020B0004020202020204" pitchFamily="34" charset="0"/>
+                        </a:rPr>
+                        <a:t>Yes</a:t>
+                      </a:r>
+                    </a:p>
+                  </a:txBody>
+                  <a:tcPr marL="9525" marR="9525" marT="9525" marB="0"/>
+                </a:tc>
+                <a:tc>
+                  <a:txBody>
+                    <a:bodyPr/>
+                    <a:lstStyle/>
+                    <a:p>
+                      <a:pPr algn="l" fontAlgn="b"/>
+                      <a:r>
+                        <a:rPr lang="en-US" sz="1200" b="0" i="0" u="none" strike="noStrike" dirty="0">
+                          <a:solidFill>
+                            <a:srgbClr val="000000"/>
+                          </a:solidFill>
+                          <a:effectLst/>
+                          <a:latin typeface="Aptos Narrow" panose="020B0004020202020204" pitchFamily="34" charset="0"/>
+                        </a:rPr>
                         <a:t>No</a:t>
                       </a:r>
                     </a:p>
@@ -7084,6 +7181,26 @@
                           <a:effectLst/>
                           <a:latin typeface="Aptos Narrow" panose="020B0004020202020204" pitchFamily="34" charset="0"/>
                         </a:rPr>
+                        <a:t>Yes</a:t>
+                      </a:r>
+                    </a:p>
+                  </a:txBody>
+                  <a:tcPr marL="9525" marR="9525" marT="9525" marB="0"/>
+                </a:tc>
+                <a:tc>
+                  <a:txBody>
+                    <a:bodyPr/>
+                    <a:lstStyle/>
+                    <a:p>
+                      <a:pPr algn="l" fontAlgn="b"/>
+                      <a:r>
+                        <a:rPr lang="en-US" sz="1200" b="0" i="0" u="none" strike="noStrike" dirty="0">
+                          <a:solidFill>
+                            <a:srgbClr val="000000"/>
+                          </a:solidFill>
+                          <a:effectLst/>
+                          <a:latin typeface="Aptos Narrow" panose="020B0004020202020204" pitchFamily="34" charset="0"/>
+                        </a:rPr>
                         <a:t>No</a:t>
                       </a:r>
                     </a:p>
@@ -7097,6 +7214,66 @@
                     <a:p>
                       <a:pPr algn="l" fontAlgn="b"/>
                       <a:r>
+                        <a:rPr lang="en-US" sz="1200" b="0" i="0" u="none" strike="noStrike">
+                          <a:solidFill>
+                            <a:srgbClr val="000000"/>
+                          </a:solidFill>
+                          <a:effectLst/>
+                          <a:latin typeface="Aptos Narrow" panose="020B0004020202020204" pitchFamily="34" charset="0"/>
+                        </a:rPr>
+                        <a:t>Yes</a:t>
+                      </a:r>
+                    </a:p>
+                  </a:txBody>
+                  <a:tcPr marL="9525" marR="9525" marT="9525" marB="0"/>
+                </a:tc>
+                <a:tc>
+                  <a:txBody>
+                    <a:bodyPr/>
+                    <a:lstStyle/>
+                    <a:p>
+                      <a:pPr algn="l" fontAlgn="b"/>
+                      <a:r>
+                        <a:rPr lang="en-US" sz="1200" b="0" i="0" u="none" strike="noStrike">
+                          <a:solidFill>
+                            <a:srgbClr val="000000"/>
+                          </a:solidFill>
+                          <a:effectLst/>
+                          <a:latin typeface="Aptos Narrow" panose="020B0004020202020204" pitchFamily="34" charset="0"/>
+                        </a:rPr>
+                        <a:t>Yes</a:t>
+                      </a:r>
+                    </a:p>
+                  </a:txBody>
+                  <a:tcPr marL="9525" marR="9525" marT="9525" marB="0"/>
+                </a:tc>
+                <a:tc>
+                  <a:txBody>
+                    <a:bodyPr/>
+                    <a:lstStyle/>
+                    <a:p>
+                      <a:pPr algn="l" fontAlgn="b"/>
+                      <a:r>
+                        <a:rPr lang="en-US" sz="1200" b="0" i="0" u="none" strike="noStrike">
+                          <a:solidFill>
+                            <a:srgbClr val="000000"/>
+                          </a:solidFill>
+                          <a:effectLst/>
+                          <a:latin typeface="Aptos Narrow" panose="020B0004020202020204" pitchFamily="34" charset="0"/>
+                        </a:rPr>
+                        <a:t>IDG</a:t>
+                      </a:r>
+                    </a:p>
+                  </a:txBody>
+                  <a:tcPr marL="9525" marR="9525" marT="9525" marB="0"/>
+                </a:tc>
+                <a:tc>
+                  <a:txBody>
+                    <a:bodyPr/>
+                    <a:lstStyle/>
+                    <a:p>
+                      <a:pPr algn="l" fontAlgn="b"/>
+                      <a:r>
                         <a:rPr lang="en-US" sz="1200" b="0" i="0" u="none" strike="noStrike" dirty="0">
                           <a:solidFill>
                             <a:srgbClr val="000000"/>
@@ -7104,87 +7281,7 @@
                           <a:effectLst/>
                           <a:latin typeface="Aptos Narrow" panose="020B0004020202020204" pitchFamily="34" charset="0"/>
                         </a:rPr>
-                        <a:t>No</a:t>
-                      </a:r>
-                    </a:p>
-                  </a:txBody>
-                  <a:tcPr marL="9525" marR="9525" marT="9525" marB="0"/>
-                </a:tc>
-                <a:tc>
-                  <a:txBody>
-                    <a:bodyPr/>
-                    <a:lstStyle/>
-                    <a:p>
-                      <a:pPr algn="l" fontAlgn="b"/>
-                      <a:r>
-                        <a:rPr lang="en-US" sz="1200" b="0" i="0" u="none" strike="noStrike" dirty="0">
-                          <a:solidFill>
-                            <a:srgbClr val="000000"/>
-                          </a:solidFill>
-                          <a:effectLst/>
-                          <a:latin typeface="Aptos Narrow" panose="020B0004020202020204" pitchFamily="34" charset="0"/>
-                        </a:rPr>
-                        <a:t>Yes</a:t>
-                      </a:r>
-                    </a:p>
-                  </a:txBody>
-                  <a:tcPr marL="9525" marR="9525" marT="9525" marB="0"/>
-                </a:tc>
-                <a:tc>
-                  <a:txBody>
-                    <a:bodyPr/>
-                    <a:lstStyle/>
-                    <a:p>
-                      <a:pPr algn="l" fontAlgn="b"/>
-                      <a:r>
-                        <a:rPr lang="en-US" sz="1200" b="0" i="0" u="none" strike="noStrike" dirty="0">
-                          <a:solidFill>
-                            <a:srgbClr val="000000"/>
-                          </a:solidFill>
-                          <a:effectLst/>
-                          <a:latin typeface="Aptos Narrow" panose="020B0004020202020204" pitchFamily="34" charset="0"/>
-                        </a:rPr>
-                        <a:t>No</a:t>
-                      </a:r>
-                    </a:p>
-                  </a:txBody>
-                  <a:tcPr marL="9525" marR="9525" marT="9525" marB="0"/>
-                </a:tc>
-                <a:tc>
-                  <a:txBody>
-                    <a:bodyPr/>
-                    <a:lstStyle/>
-                    <a:p>
-                      <a:pPr algn="l" fontAlgn="b"/>
-                      <a:r>
-                        <a:rPr lang="en-US" sz="1200" b="0" i="0" u="none" strike="noStrike" dirty="0">
-                          <a:solidFill>
-                            <a:srgbClr val="000000"/>
-                          </a:solidFill>
-                          <a:effectLst/>
-                          <a:latin typeface="Aptos Narrow" panose="020B0004020202020204" pitchFamily="34" charset="0"/>
-                        </a:rPr>
-                        <a:t>OT</a:t>
-                      </a:r>
-                    </a:p>
-                  </a:txBody>
-                  <a:tcPr marL="9525" marR="9525" marT="9525" marB="0"/>
-                </a:tc>
-                <a:tc>
-                  <a:txBody>
-                    <a:bodyPr/>
-                    <a:lstStyle/>
-                    <a:p>
-                      <a:pPr algn="l" fontAlgn="b"/>
-                      <a:r>
-                        <a:rPr lang="en-US" sz="1200" b="0" i="0" u="none" strike="noStrike" dirty="0">
-                          <a:solidFill>
-                            <a:srgbClr val="000000"/>
-                          </a:solidFill>
-                          <a:effectLst/>
-                          <a:latin typeface="Aptos Narrow" panose="020B0004020202020204" pitchFamily="34" charset="0"/>
-                        </a:rPr>
-                        <a:t>OT_IDG_PMTL</a:t>
+                        <a:t>IDG</a:t>
                       </a:r>
                     </a:p>
                   </a:txBody>
@@ -7214,7 +7311,7 @@
         </p:nvSpPr>
         <p:spPr>
           <a:xfrm>
-            <a:off x="591117" y="5135356"/>
+            <a:off x="504442" y="4905349"/>
             <a:ext cx="11427536" cy="646331"/>
           </a:xfrm>
           <a:prstGeom prst="rect">
@@ -7230,7 +7327,7 @@
           <a:p>
             <a:r>
               <a:rPr lang="en-US" dirty="0"/>
-              <a:t>Majority of the PMTLs have multiple drugs associated with them. This table has 6669 relationships (rows) between PMTLs and Drugs</a:t>
+              <a:t>Majority of the Targets have multiple drugs associated with them. This table has 26880 relationships (rows) between Targets and Drugs</a:t>
             </a:r>
           </a:p>
         </p:txBody>
@@ -7287,15 +7384,7 @@
           <a:p>
             <a:r>
               <a:rPr lang="en-US" dirty="0"/>
-              <a:t>PIPELINE Results</a:t>
-            </a:r>
-            <a:r>
-              <a:rPr lang="en-US"/>
-              <a:t>: NON PMTL </a:t>
-            </a:r>
-            <a:r>
-              <a:rPr lang="en-US" dirty="0"/>
-              <a:t>Tumor Table</a:t>
+              <a:t>PIPELINE Results: Target Tumor Table</a:t>
             </a:r>
           </a:p>
         </p:txBody>
@@ -7312,7 +7401,7 @@
         </p:nvSpPr>
         <p:spPr>
           <a:xfrm>
-            <a:off x="127370" y="639633"/>
+            <a:off x="83398" y="328737"/>
             <a:ext cx="11600884" cy="4663440"/>
           </a:xfrm>
         </p:spPr>
@@ -7338,33 +7427,17 @@
                   <a:srgbClr val="000000"/>
                 </a:solidFill>
               </a:rPr>
-              <a:t>PMTL-Tumor table :For each PMTL , this table provides the following: PMTL Gene Symbol , if the PMTL is targeted by at least one drug in CT, OT, or ID, sources where the PMTL was found, tumor name, is it a pediatric cancer, reference for pediatric tumor, evidence count for the given PMTL-tumor relationship from OT , source of the relationship between </a:t>
+              <a:t>Target-Tumor table :For each Target , this table provides the following: Gene Symbol , if these gene target are targeted by at least one drug in CT, OT, or ID, sources where the Target was found, tumor name, is it a pediatric tumor, reference for pediatric tumor, evidence count for the given target-tumor relationship from OT , source of the relationship between target and tumor. </a:t>
             </a:r>
-            <a:r>
-              <a:rPr lang="en-US" sz="1800" dirty="0" err="1">
-                <a:solidFill>
-                  <a:srgbClr val="000000"/>
-                </a:solidFill>
-              </a:rPr>
-              <a:t>pmtl</a:t>
-            </a:r>
+          </a:p>
+          <a:p>
             <a:r>
               <a:rPr lang="en-US" sz="1800" dirty="0">
                 <a:solidFill>
                   <a:srgbClr val="000000"/>
                 </a:solidFill>
               </a:rPr>
-              <a:t> and tumor. </a:t>
-            </a:r>
-          </a:p>
-          <a:p>
-            <a:r>
-              <a:rPr lang="en-US" sz="1800" dirty="0">
-                <a:solidFill>
-                  <a:srgbClr val="000000"/>
-                </a:solidFill>
-              </a:rPr>
-              <a:t>Following is a snapshot of the results taken from the PMTL Tumor table:</a:t>
+              <a:t>Following is a snapshot of the results taken from the Target Tumor table:</a:t>
             </a:r>
           </a:p>
           <a:p>
@@ -7442,11 +7515,17 @@
           <p:cNvGraphicFramePr>
             <a:graphicFrameLocks noGrp="1"/>
           </p:cNvGraphicFramePr>
-          <p:nvPr/>
+          <p:nvPr>
+            <p:extLst>
+              <p:ext uri="{D42A27DB-BD31-4B8C-83A1-F6EECF244321}">
+                <p14:modId xmlns:p14="http://schemas.microsoft.com/office/powerpoint/2010/main" val="782795535"/>
+              </p:ext>
+            </p:extLst>
+          </p:nvPr>
         </p:nvGraphicFramePr>
         <p:xfrm>
-          <a:off x="416563" y="2472170"/>
-          <a:ext cx="11775437" cy="2830903"/>
+          <a:off x="360513" y="2272284"/>
+          <a:ext cx="11512941" cy="2066153"/>
         </p:xfrm>
         <a:graphic>
           <a:graphicData uri="http://schemas.openxmlformats.org/drawingml/2006/table">
@@ -7455,70 +7534,77 @@
                 <a:tableStyleId>{5C22544A-7EE6-4342-B048-85BDC9FD1C3A}</a:tableStyleId>
               </a:tblPr>
               <a:tblGrid>
-                <a:gridCol w="1154436">
+                <a:gridCol w="1027926">
                   <a:extLst>
                     <a:ext uri="{9D8B030D-6E8A-4147-A177-3AD203B41FA5}">
                       <a16:colId xmlns:a16="http://schemas.microsoft.com/office/drawing/2014/main" val="767560716"/>
                     </a:ext>
                   </a:extLst>
                 </a:gridCol>
-                <a:gridCol w="1069270">
+                <a:gridCol w="892856">
+                  <a:extLst>
+                    <a:ext uri="{9D8B030D-6E8A-4147-A177-3AD203B41FA5}">
+                      <a16:colId xmlns:a16="http://schemas.microsoft.com/office/drawing/2014/main" val="3139742265"/>
+                    </a:ext>
+                  </a:extLst>
+                </a:gridCol>
+                <a:gridCol w="851478">
                   <a:extLst>
                     <a:ext uri="{9D8B030D-6E8A-4147-A177-3AD203B41FA5}">
                       <a16:colId xmlns:a16="http://schemas.microsoft.com/office/drawing/2014/main" val="1109429456"/>
                     </a:ext>
                   </a:extLst>
                 </a:gridCol>
-                <a:gridCol w="1069270">
+                <a:gridCol w="929675">
                   <a:extLst>
                     <a:ext uri="{9D8B030D-6E8A-4147-A177-3AD203B41FA5}">
                       <a16:colId xmlns:a16="http://schemas.microsoft.com/office/drawing/2014/main" val="3792169147"/>
                     </a:ext>
                   </a:extLst>
                 </a:gridCol>
-                <a:gridCol w="1163896">
+                <a:gridCol w="1094757">
                   <a:extLst>
                     <a:ext uri="{9D8B030D-6E8A-4147-A177-3AD203B41FA5}">
                       <a16:colId xmlns:a16="http://schemas.microsoft.com/office/drawing/2014/main" val="4106209877"/>
                     </a:ext>
                   </a:extLst>
                 </a:gridCol>
-                <a:gridCol w="1115846">
+                <a:gridCol w="920986">
                   <a:extLst>
                     <a:ext uri="{9D8B030D-6E8A-4147-A177-3AD203B41FA5}">
                       <a16:colId xmlns:a16="http://schemas.microsoft.com/office/drawing/2014/main" val="1469228664"/>
                     </a:ext>
                   </a:extLst>
                 </a:gridCol>
-                <a:gridCol w="1195331">
+                <a:gridCol w="1338036">
                   <a:extLst>
                     <a:ext uri="{9D8B030D-6E8A-4147-A177-3AD203B41FA5}">
                       <a16:colId xmlns:a16="http://schemas.microsoft.com/office/drawing/2014/main" val="73438543"/>
                     </a:ext>
                   </a:extLst>
                 </a:gridCol>
-                <a:gridCol w="939777">
+                <a:gridCol w="835370">
                   <a:extLst>
                     <a:ext uri="{9D8B030D-6E8A-4147-A177-3AD203B41FA5}">
                       <a16:colId xmlns:a16="http://schemas.microsoft.com/office/drawing/2014/main" val="2200530130"/>
                     </a:ext>
                   </a:extLst>
                 </a:gridCol>
-                <a:gridCol w="1096408">
+                <a:gridCol w="1447557">
                   <a:extLst>
                     <a:ext uri="{9D8B030D-6E8A-4147-A177-3AD203B41FA5}">
                       <a16:colId xmlns:a16="http://schemas.microsoft.com/office/drawing/2014/main" val="1589697548"/>
                     </a:ext>
                   </a:extLst>
                 </a:gridCol>
-                <a:gridCol w="1057059">
+                <a:gridCol w="844950">
                   <a:extLst>
                     <a:ext uri="{9D8B030D-6E8A-4147-A177-3AD203B41FA5}">
                       <a16:colId xmlns:a16="http://schemas.microsoft.com/office/drawing/2014/main" val="1740583638"/>
                     </a:ext>
                   </a:extLst>
                 </a:gridCol>
-                <a:gridCol w="1914144">
+                <a:gridCol w="1329350">
                   <a:extLst>
                     <a:ext uri="{9D8B030D-6E8A-4147-A177-3AD203B41FA5}">
                       <a16:colId xmlns:a16="http://schemas.microsoft.com/office/drawing/2014/main" val="3889417040"/>
@@ -7526,7 +7612,7 @@
                   </a:extLst>
                 </a:gridCol>
               </a:tblGrid>
-              <a:tr h="420115">
+              <a:tr h="293298">
                 <a:tc>
                   <a:txBody>
                     <a:bodyPr/>
@@ -7571,7 +7657,7 @@
                           <a:ea typeface="+mn-ea"/>
                           <a:cs typeface="+mn-cs"/>
                         </a:rPr>
-                        <a:t>targeted_in_CT</a:t>
+                        <a:t>PMTL_Status</a:t>
                       </a:r>
                       <a:endParaRPr lang="en-US" sz="1000" b="1" kern="1200" dirty="0">
                         <a:solidFill>
@@ -7600,7 +7686,7 @@
                           <a:ea typeface="+mn-ea"/>
                           <a:cs typeface="+mn-cs"/>
                         </a:rPr>
-                        <a:t>targeted_in_OT</a:t>
+                        <a:t>targeted_in_CT</a:t>
                       </a:r>
                       <a:endParaRPr lang="en-US" sz="1000" b="1" kern="1200" dirty="0">
                         <a:solidFill>
@@ -7629,7 +7715,7 @@
                           <a:ea typeface="+mn-ea"/>
                           <a:cs typeface="+mn-cs"/>
                         </a:rPr>
-                        <a:t>targeted_in_IDG</a:t>
+                        <a:t>targeted_in_OT</a:t>
                       </a:r>
                       <a:endParaRPr lang="en-US" sz="1000" b="1" kern="1200" dirty="0">
                         <a:solidFill>
@@ -7658,7 +7744,7 @@
                           <a:ea typeface="+mn-ea"/>
                           <a:cs typeface="+mn-cs"/>
                         </a:rPr>
-                        <a:t>Target_Source</a:t>
+                        <a:t>targeted_in_IDG</a:t>
                       </a:r>
                       <a:endParaRPr lang="en-US" sz="1000" b="1" kern="1200" dirty="0">
                         <a:solidFill>
@@ -7679,7 +7765,7 @@
                     <a:p>
                       <a:pPr marL="0" algn="l" defTabSz="914400" rtl="0" eaLnBrk="1" fontAlgn="b" latinLnBrk="0" hangingPunct="1"/>
                       <a:r>
-                        <a:rPr lang="en-US" sz="1000" b="1" kern="1200" dirty="0">
+                        <a:rPr lang="en-US" sz="1000" b="1" kern="1200" dirty="0" err="1">
                           <a:solidFill>
                             <a:schemeClr val="lt1"/>
                           </a:solidFill>
@@ -7687,28 +7773,7 @@
                           <a:ea typeface="+mn-ea"/>
                           <a:cs typeface="+mn-cs"/>
                         </a:rPr>
-                        <a:t>Tumor</a:t>
-                      </a:r>
-                    </a:p>
-                  </a:txBody>
-                  <a:tcPr marL="9525" marR="9525" marT="9525" marB="0"/>
-                </a:tc>
-                <a:tc>
-                  <a:txBody>
-                    <a:bodyPr/>
-                    <a:lstStyle/>
-                    <a:p>
-                      <a:pPr marL="0" algn="l" defTabSz="914400" rtl="0" eaLnBrk="1" fontAlgn="b" latinLnBrk="0" hangingPunct="1"/>
-                      <a:r>
-                        <a:rPr lang="en-US" sz="1000" b="1" kern="1200" dirty="0" err="1">
-                          <a:solidFill>
-                            <a:schemeClr val="lt1"/>
-                          </a:solidFill>
-                          <a:latin typeface="+mn-lt"/>
-                          <a:ea typeface="+mn-ea"/>
-                          <a:cs typeface="+mn-cs"/>
-                        </a:rPr>
-                        <a:t>Is_Valid_Ped_Tumor</a:t>
+                        <a:t>Target_Source</a:t>
                       </a:r>
                       <a:endParaRPr lang="en-US" sz="1000" b="1" kern="1200" dirty="0">
                         <a:solidFill>
@@ -7729,7 +7794,7 @@
                     <a:p>
                       <a:pPr marL="0" algn="l" defTabSz="914400" rtl="0" eaLnBrk="1" fontAlgn="b" latinLnBrk="0" hangingPunct="1"/>
                       <a:r>
-                        <a:rPr lang="en-US" sz="1000" b="1" kern="1200" dirty="0" err="1">
+                        <a:rPr lang="en-US" sz="1000" b="1" kern="1200" dirty="0">
                           <a:solidFill>
                             <a:schemeClr val="lt1"/>
                           </a:solidFill>
@@ -7737,7 +7802,28 @@
                           <a:ea typeface="+mn-ea"/>
                           <a:cs typeface="+mn-cs"/>
                         </a:rPr>
-                        <a:t>Ped_Tumor_Evidence</a:t>
+                        <a:t>Tumor</a:t>
+                      </a:r>
+                    </a:p>
+                  </a:txBody>
+                  <a:tcPr marL="9525" marR="9525" marT="9525" marB="0"/>
+                </a:tc>
+                <a:tc>
+                  <a:txBody>
+                    <a:bodyPr/>
+                    <a:lstStyle/>
+                    <a:p>
+                      <a:pPr marL="0" algn="l" defTabSz="914400" rtl="0" eaLnBrk="1" fontAlgn="b" latinLnBrk="0" hangingPunct="1"/>
+                      <a:r>
+                        <a:rPr lang="en-US" sz="1000" b="1" kern="1200" dirty="0" err="1">
+                          <a:solidFill>
+                            <a:schemeClr val="lt1"/>
+                          </a:solidFill>
+                          <a:latin typeface="+mn-lt"/>
+                          <a:ea typeface="+mn-ea"/>
+                          <a:cs typeface="+mn-cs"/>
+                        </a:rPr>
+                        <a:t>Is_Valid_Ped_Tumor</a:t>
                       </a:r>
                       <a:endParaRPr lang="en-US" sz="1000" b="1" kern="1200" dirty="0">
                         <a:solidFill>
@@ -7766,7 +7852,7 @@
                           <a:ea typeface="+mn-ea"/>
                           <a:cs typeface="+mn-cs"/>
                         </a:rPr>
-                        <a:t>evidenceCount</a:t>
+                        <a:t>Ped_Tumor_Evidence</a:t>
                       </a:r>
                       <a:endParaRPr lang="en-US" sz="1000" b="1" kern="1200" dirty="0">
                         <a:solidFill>
@@ -7795,7 +7881,7 @@
                           <a:ea typeface="+mn-ea"/>
                           <a:cs typeface="+mn-cs"/>
                         </a:rPr>
-                        <a:t>Target_Disease_Relationship_Source</a:t>
+                        <a:t>evidenceCount</a:t>
                       </a:r>
                       <a:endParaRPr lang="en-US" sz="1000" b="1" kern="1200" dirty="0">
                         <a:solidFill>
@@ -7809,113 +7895,42 @@
                   </a:txBody>
                   <a:tcPr marL="9525" marR="9525" marT="9525" marB="0"/>
                 </a:tc>
+                <a:tc>
+                  <a:txBody>
+                    <a:bodyPr/>
+                    <a:lstStyle/>
+                    <a:p>
+                      <a:pPr marL="0" algn="l" defTabSz="914400" rtl="0" eaLnBrk="1" fontAlgn="b" latinLnBrk="0" hangingPunct="1"/>
+                      <a:r>
+                        <a:rPr lang="en-US" sz="1000" b="1" kern="1200" dirty="0" err="1">
+                          <a:solidFill>
+                            <a:schemeClr val="lt1"/>
+                          </a:solidFill>
+                          <a:latin typeface="+mn-lt"/>
+                          <a:ea typeface="+mn-ea"/>
+                          <a:cs typeface="+mn-cs"/>
+                        </a:rPr>
+                        <a:t>Target_Disease_Relationship_Source</a:t>
+                      </a:r>
+                      <a:endParaRPr lang="en-US" sz="1000" b="1" kern="1200" dirty="0">
+                        <a:solidFill>
+                          <a:schemeClr val="lt1"/>
+                        </a:solidFill>
+                        <a:latin typeface="+mn-lt"/>
+                        <a:ea typeface="+mn-ea"/>
+                        <a:cs typeface="+mn-cs"/>
+                      </a:endParaRPr>
+                    </a:p>
+                  </a:txBody>
+                  <a:tcPr marL="9525" marR="9525" marT="9525" marB="0"/>
+                </a:tc>
                 <a:extLst>
                   <a:ext uri="{0D108BD9-81ED-4DB2-BD59-A6C34878D82A}">
                     <a16:rowId xmlns:a16="http://schemas.microsoft.com/office/drawing/2014/main" val="2952561433"/>
                   </a:ext>
                 </a:extLst>
               </a:tr>
-              <a:tr h="266466">
-                <a:tc>
-                  <a:txBody>
-                    <a:bodyPr/>
-                    <a:lstStyle/>
-                    <a:p>
-                      <a:pPr algn="l" fontAlgn="b"/>
-                      <a:r>
-                        <a:rPr lang="en-US" sz="1200" b="0" i="0" u="none" strike="noStrike">
-                          <a:solidFill>
-                            <a:srgbClr val="000000"/>
-                          </a:solidFill>
-                          <a:effectLst/>
-                          <a:latin typeface="Aptos Narrow" panose="020B0004020202020204" pitchFamily="34" charset="0"/>
-                        </a:rPr>
-                        <a:t>ABL1</a:t>
-                      </a:r>
-                    </a:p>
-                  </a:txBody>
-                  <a:tcPr marL="9525" marR="9525" marT="9525" marB="0"/>
-                </a:tc>
-                <a:tc>
-                  <a:txBody>
-                    <a:bodyPr/>
-                    <a:lstStyle/>
-                    <a:p>
-                      <a:pPr algn="l" fontAlgn="b"/>
-                      <a:r>
-                        <a:rPr lang="en-US" sz="1200" b="0" i="0" u="none" strike="noStrike">
-                          <a:solidFill>
-                            <a:srgbClr val="000000"/>
-                          </a:solidFill>
-                          <a:effectLst/>
-                          <a:latin typeface="Aptos Narrow" panose="020B0004020202020204" pitchFamily="34" charset="0"/>
-                        </a:rPr>
-                        <a:t>Yes</a:t>
-                      </a:r>
-                    </a:p>
-                  </a:txBody>
-                  <a:tcPr marL="9525" marR="9525" marT="9525" marB="0"/>
-                </a:tc>
-                <a:tc>
-                  <a:txBody>
-                    <a:bodyPr/>
-                    <a:lstStyle/>
-                    <a:p>
-                      <a:pPr algn="l" fontAlgn="b"/>
-                      <a:r>
-                        <a:rPr lang="en-US" sz="1200" b="0" i="0" u="none" strike="noStrike">
-                          <a:solidFill>
-                            <a:srgbClr val="000000"/>
-                          </a:solidFill>
-                          <a:effectLst/>
-                          <a:latin typeface="Aptos Narrow" panose="020B0004020202020204" pitchFamily="34" charset="0"/>
-                        </a:rPr>
-                        <a:t>Yes</a:t>
-                      </a:r>
-                    </a:p>
-                  </a:txBody>
-                  <a:tcPr marL="9525" marR="9525" marT="9525" marB="0"/>
-                </a:tc>
-                <a:tc>
-                  <a:txBody>
-                    <a:bodyPr/>
-                    <a:lstStyle/>
-                    <a:p>
-                      <a:pPr algn="l" fontAlgn="b"/>
-                      <a:r>
-                        <a:rPr lang="en-US" sz="1200" b="0" i="0" u="none" strike="noStrike">
-                          <a:solidFill>
-                            <a:srgbClr val="000000"/>
-                          </a:solidFill>
-                          <a:effectLst/>
-                          <a:latin typeface="Aptos Narrow" panose="020B0004020202020204" pitchFamily="34" charset="0"/>
-                        </a:rPr>
-                        <a:t>Yes</a:t>
-                      </a:r>
-                    </a:p>
-                  </a:txBody>
-                  <a:tcPr marL="9525" marR="9525" marT="9525" marB="0"/>
-                </a:tc>
-                <a:tc>
-                  <a:txBody>
-                    <a:bodyPr/>
-                    <a:lstStyle/>
-                    <a:p>
-                      <a:pPr algn="l" fontAlgn="b"/>
-                      <a:r>
-                        <a:rPr lang="en-US" sz="1200" b="0" i="0" u="none" strike="noStrike">
-                          <a:solidFill>
-                            <a:srgbClr val="000000"/>
-                          </a:solidFill>
-                          <a:effectLst/>
-                          <a:latin typeface="Aptos Narrow" panose="020B0004020202020204" pitchFamily="34" charset="0"/>
-                        </a:rPr>
-                        <a:t>OT_IDG_PMTL</a:t>
-                      </a:r>
-                    </a:p>
-                  </a:txBody>
-                  <a:tcPr marL="9525" marR="9525" marT="9525" marB="0"/>
-                </a:tc>
+              <a:tr h="217046">
                 <a:tc>
                   <a:txBody>
                     <a:bodyPr/>
@@ -7930,7 +7945,187 @@
                           <a:effectLst/>
                           <a:latin typeface="Aptos Narrow" panose="020B0004020202020204" pitchFamily="34" charset="0"/>
                         </a:rPr>
-                        <a:t>acral lentiginous melanoma</a:t>
+                        <a:t>A1CF</a:t>
+                      </a:r>
+                    </a:p>
+                  </a:txBody>
+                  <a:tcPr marL="9525" marR="9525" marT="9525" marB="0"/>
+                </a:tc>
+                <a:tc>
+                  <a:txBody>
+                    <a:bodyPr/>
+                    <a:lstStyle/>
+                    <a:p>
+                      <a:pPr algn="l" fontAlgn="b"/>
+                      <a:r>
+                        <a:rPr lang="en-US" sz="1200" b="0" i="0" u="none" strike="noStrike">
+                          <a:solidFill>
+                            <a:srgbClr val="000000"/>
+                          </a:solidFill>
+                          <a:effectLst/>
+                          <a:latin typeface="Aptos Narrow" panose="020B0004020202020204" pitchFamily="34" charset="0"/>
+                        </a:rPr>
+                        <a:t>No</a:t>
+                      </a:r>
+                    </a:p>
+                  </a:txBody>
+                  <a:tcPr marL="9525" marR="9525" marT="9525" marB="0"/>
+                </a:tc>
+                <a:tc>
+                  <a:txBody>
+                    <a:bodyPr/>
+                    <a:lstStyle/>
+                    <a:p>
+                      <a:pPr algn="l" fontAlgn="b"/>
+                      <a:r>
+                        <a:rPr lang="en-US" sz="1200" b="0" i="0" u="none" strike="noStrike">
+                          <a:solidFill>
+                            <a:srgbClr val="000000"/>
+                          </a:solidFill>
+                          <a:effectLst/>
+                          <a:latin typeface="Aptos Narrow" panose="020B0004020202020204" pitchFamily="34" charset="0"/>
+                        </a:rPr>
+                        <a:t>No</a:t>
+                      </a:r>
+                    </a:p>
+                  </a:txBody>
+                  <a:tcPr marL="9525" marR="9525" marT="9525" marB="0"/>
+                </a:tc>
+                <a:tc>
+                  <a:txBody>
+                    <a:bodyPr/>
+                    <a:lstStyle/>
+                    <a:p>
+                      <a:pPr algn="l" fontAlgn="b"/>
+                      <a:r>
+                        <a:rPr lang="en-US" sz="1200" b="0" i="0" u="none" strike="noStrike">
+                          <a:solidFill>
+                            <a:srgbClr val="000000"/>
+                          </a:solidFill>
+                          <a:effectLst/>
+                          <a:latin typeface="Aptos Narrow" panose="020B0004020202020204" pitchFamily="34" charset="0"/>
+                        </a:rPr>
+                        <a:t>No</a:t>
+                      </a:r>
+                    </a:p>
+                  </a:txBody>
+                  <a:tcPr marL="9525" marR="9525" marT="9525" marB="0"/>
+                </a:tc>
+                <a:tc>
+                  <a:txBody>
+                    <a:bodyPr/>
+                    <a:lstStyle/>
+                    <a:p>
+                      <a:pPr algn="l" fontAlgn="b"/>
+                      <a:r>
+                        <a:rPr lang="en-US" sz="1200" b="0" i="0" u="none" strike="noStrike">
+                          <a:solidFill>
+                            <a:srgbClr val="000000"/>
+                          </a:solidFill>
+                          <a:effectLst/>
+                          <a:latin typeface="Aptos Narrow" panose="020B0004020202020204" pitchFamily="34" charset="0"/>
+                        </a:rPr>
+                        <a:t>No</a:t>
+                      </a:r>
+                    </a:p>
+                  </a:txBody>
+                  <a:tcPr marL="9525" marR="9525" marT="9525" marB="0"/>
+                </a:tc>
+                <a:tc>
+                  <a:txBody>
+                    <a:bodyPr/>
+                    <a:lstStyle/>
+                    <a:p>
+                      <a:pPr algn="l" fontAlgn="b"/>
+                      <a:r>
+                        <a:rPr lang="en-US" sz="1200" b="0" i="0" u="none" strike="noStrike">
+                          <a:solidFill>
+                            <a:srgbClr val="000000"/>
+                          </a:solidFill>
+                          <a:effectLst/>
+                          <a:latin typeface="Aptos Narrow" panose="020B0004020202020204" pitchFamily="34" charset="0"/>
+                        </a:rPr>
+                        <a:t>IDG</a:t>
+                      </a:r>
+                    </a:p>
+                  </a:txBody>
+                  <a:tcPr marL="9525" marR="9525" marT="9525" marB="0"/>
+                </a:tc>
+                <a:tc>
+                  <a:txBody>
+                    <a:bodyPr/>
+                    <a:lstStyle/>
+                    <a:p>
+                      <a:pPr algn="l" fontAlgn="b"/>
+                      <a:r>
+                        <a:rPr lang="en-US" sz="1200" b="0" i="0" u="none" strike="noStrike">
+                          <a:solidFill>
+                            <a:srgbClr val="000000"/>
+                          </a:solidFill>
+                          <a:effectLst/>
+                          <a:latin typeface="Aptos Narrow" panose="020B0004020202020204" pitchFamily="34" charset="0"/>
+                        </a:rPr>
+                        <a:t>colorectal adenoma</a:t>
+                      </a:r>
+                    </a:p>
+                  </a:txBody>
+                  <a:tcPr marL="9525" marR="9525" marT="9525" marB="0"/>
+                </a:tc>
+                <a:tc>
+                  <a:txBody>
+                    <a:bodyPr/>
+                    <a:lstStyle/>
+                    <a:p>
+                      <a:pPr algn="l" fontAlgn="b"/>
+                      <a:r>
+                        <a:rPr lang="en-US" sz="1200" b="0" i="0" u="none" strike="noStrike">
+                          <a:solidFill>
+                            <a:srgbClr val="000000"/>
+                          </a:solidFill>
+                          <a:effectLst/>
+                          <a:latin typeface="Aptos Narrow" panose="020B0004020202020204" pitchFamily="34" charset="0"/>
+                        </a:rPr>
+                        <a:t>No</a:t>
+                      </a:r>
+                    </a:p>
+                  </a:txBody>
+                  <a:tcPr marL="9525" marR="9525" marT="9525" marB="0"/>
+                </a:tc>
+                <a:tc>
+                  <a:txBody>
+                    <a:bodyPr/>
+                    <a:lstStyle/>
+                    <a:p>
+                      <a:pPr algn="l" fontAlgn="b"/>
+                      <a:r>
+                        <a:rPr lang="en-US" sz="1200" b="0" i="0" u="none" strike="noStrike">
+                          <a:solidFill>
+                            <a:srgbClr val="000000"/>
+                          </a:solidFill>
+                          <a:effectLst/>
+                          <a:latin typeface="Aptos Narrow" panose="020B0004020202020204" pitchFamily="34" charset="0"/>
+                        </a:rPr>
+                        <a:t>NA</a:t>
+                      </a:r>
+                    </a:p>
+                  </a:txBody>
+                  <a:tcPr marL="9525" marR="9525" marT="9525" marB="0"/>
+                </a:tc>
+                <a:tc>
+                  <a:txBody>
+                    <a:bodyPr/>
+                    <a:lstStyle/>
+                    <a:p>
+                      <a:pPr algn="l" fontAlgn="b"/>
+                      <a:r>
+                        <a:rPr lang="en-US" sz="1200" b="0" i="0" u="none" strike="noStrike">
+                          <a:solidFill>
+                            <a:srgbClr val="000000"/>
+                          </a:solidFill>
+                          <a:effectLst/>
+                          <a:latin typeface="Aptos Narrow" panose="020B0004020202020204" pitchFamily="34" charset="0"/>
+                        </a:rPr>
+                        <a:t>NA</a:t>
                       </a:r>
                     </a:p>
                   </a:txBody>
@@ -7950,67 +8145,7 @@
                           <a:effectLst/>
                           <a:latin typeface="Aptos Narrow" panose="020B0004020202020204" pitchFamily="34" charset="0"/>
                         </a:rPr>
-                        <a:t>Yes</a:t>
-                      </a:r>
-                    </a:p>
-                  </a:txBody>
-                  <a:tcPr marL="9525" marR="9525" marT="9525" marB="0"/>
-                </a:tc>
-                <a:tc>
-                  <a:txBody>
-                    <a:bodyPr/>
-                    <a:lstStyle/>
-                    <a:p>
-                      <a:pPr algn="l" fontAlgn="b"/>
-                      <a:r>
-                        <a:rPr lang="en-US" sz="1200" b="0" i="0" u="none" strike="noStrike">
-                          <a:solidFill>
-                            <a:srgbClr val="000000"/>
-                          </a:solidFill>
-                          <a:effectLst/>
-                          <a:latin typeface="Aptos Narrow" panose="020B0004020202020204" pitchFamily="34" charset="0"/>
-                        </a:rPr>
-                        <a:t>https://link.springer.com/article/10.1007/BF02303565</a:t>
-                      </a:r>
-                    </a:p>
-                  </a:txBody>
-                  <a:tcPr marL="9525" marR="9525" marT="9525" marB="0"/>
-                </a:tc>
-                <a:tc>
-                  <a:txBody>
-                    <a:bodyPr/>
-                    <a:lstStyle/>
-                    <a:p>
-                      <a:pPr algn="r" fontAlgn="b"/>
-                      <a:r>
-                        <a:rPr lang="en-US" sz="1200" b="0" i="0" u="none" strike="noStrike" dirty="0">
-                          <a:solidFill>
-                            <a:srgbClr val="000000"/>
-                          </a:solidFill>
-                          <a:effectLst/>
-                          <a:latin typeface="Aptos Narrow" panose="020B0004020202020204" pitchFamily="34" charset="0"/>
-                        </a:rPr>
-                        <a:t>3</a:t>
-                      </a:r>
-                    </a:p>
-                  </a:txBody>
-                  <a:tcPr marL="9525" marR="9525" marT="9525" marB="0"/>
-                </a:tc>
-                <a:tc>
-                  <a:txBody>
-                    <a:bodyPr/>
-                    <a:lstStyle/>
-                    <a:p>
-                      <a:pPr algn="l" fontAlgn="b"/>
-                      <a:r>
-                        <a:rPr lang="en-US" sz="1200" b="0" i="0" u="none" strike="noStrike" dirty="0">
-                          <a:solidFill>
-                            <a:srgbClr val="000000"/>
-                          </a:solidFill>
-                          <a:effectLst/>
-                          <a:latin typeface="Aptos Narrow" panose="020B0004020202020204" pitchFamily="34" charset="0"/>
-                        </a:rPr>
-                        <a:t>OT</a:t>
+                        <a:t>OT_IDG</a:t>
                       </a:r>
                     </a:p>
                   </a:txBody>
@@ -8022,22 +8157,42 @@
                   </a:ext>
                 </a:extLst>
               </a:tr>
-              <a:tr h="343368">
-                <a:tc>
-                  <a:txBody>
-                    <a:bodyPr/>
-                    <a:lstStyle/>
-                    <a:p>
-                      <a:pPr algn="l" fontAlgn="b"/>
-                      <a:r>
-                        <a:rPr lang="en-US" sz="1200" b="0" i="0" u="none" strike="noStrike">
-                          <a:solidFill>
-                            <a:srgbClr val="000000"/>
-                          </a:solidFill>
-                          <a:effectLst/>
-                          <a:latin typeface="Aptos Narrow" panose="020B0004020202020204" pitchFamily="34" charset="0"/>
-                        </a:rPr>
-                        <a:t>FOXO3</a:t>
+              <a:tr h="520827">
+                <a:tc>
+                  <a:txBody>
+                    <a:bodyPr/>
+                    <a:lstStyle/>
+                    <a:p>
+                      <a:pPr algn="l" fontAlgn="b"/>
+                      <a:r>
+                        <a:rPr lang="en-US" sz="1200" b="0" i="0" u="none" strike="noStrike">
+                          <a:solidFill>
+                            <a:srgbClr val="000000"/>
+                          </a:solidFill>
+                          <a:effectLst/>
+                          <a:latin typeface="Aptos Narrow" panose="020B0004020202020204" pitchFamily="34" charset="0"/>
+                        </a:rPr>
+                        <a:t>BAX</a:t>
+                      </a:r>
+                    </a:p>
+                  </a:txBody>
+                  <a:tcPr marL="9525" marR="9525" marT="9525" marB="0"/>
+                </a:tc>
+                <a:tc>
+                  <a:txBody>
+                    <a:bodyPr/>
+                    <a:lstStyle/>
+                    <a:p>
+                      <a:pPr algn="l" fontAlgn="b"/>
+                      <a:r>
+                        <a:rPr lang="en-US" sz="1200" b="0" i="0" u="none" strike="noStrike">
+                          <a:solidFill>
+                            <a:srgbClr val="000000"/>
+                          </a:solidFill>
+                          <a:effectLst/>
+                          <a:latin typeface="Aptos Narrow" panose="020B0004020202020204" pitchFamily="34" charset="0"/>
+                        </a:rPr>
+                        <a:t>Yes</a:t>
                       </a:r>
                     </a:p>
                   </a:txBody>
@@ -8070,7 +8225,7 @@
                     <a:p>
                       <a:pPr algn="l" fontAlgn="b"/>
                       <a:r>
-                        <a:rPr lang="en-US" sz="1200" b="0" i="0" u="none" strike="noStrike">
+                        <a:rPr lang="en-US" sz="1200" b="0" i="0" u="none" strike="noStrike" dirty="0">
                           <a:solidFill>
                             <a:srgbClr val="000000"/>
                           </a:solidFill>
@@ -8137,47 +8292,47 @@
                           <a:effectLst/>
                           <a:latin typeface="Aptos Narrow" panose="020B0004020202020204" pitchFamily="34" charset="0"/>
                         </a:rPr>
-                        <a:t>teratoma</a:t>
-                      </a:r>
-                    </a:p>
-                  </a:txBody>
-                  <a:tcPr marL="9525" marR="9525" marT="9525" marB="0"/>
-                </a:tc>
-                <a:tc>
-                  <a:txBody>
-                    <a:bodyPr/>
-                    <a:lstStyle/>
-                    <a:p>
-                      <a:pPr algn="l" fontAlgn="b"/>
-                      <a:r>
-                        <a:rPr lang="en-US" sz="1200" b="0" i="0" u="none" strike="noStrike">
-                          <a:solidFill>
-                            <a:srgbClr val="000000"/>
-                          </a:solidFill>
-                          <a:effectLst/>
-                          <a:latin typeface="Aptos Narrow" panose="020B0004020202020204" pitchFamily="34" charset="0"/>
-                        </a:rPr>
-                        <a:t>No</a:t>
-                      </a:r>
-                    </a:p>
-                  </a:txBody>
-                  <a:tcPr marL="9525" marR="9525" marT="9525" marB="0"/>
-                </a:tc>
-                <a:tc>
-                  <a:txBody>
-                    <a:bodyPr/>
-                    <a:lstStyle/>
-                    <a:p>
-                      <a:pPr algn="l" fontAlgn="b"/>
-                      <a:r>
-                        <a:rPr lang="en-US" sz="1200" b="0" i="0" u="none" strike="noStrike">
-                          <a:solidFill>
-                            <a:srgbClr val="000000"/>
-                          </a:solidFill>
-                          <a:effectLst/>
-                          <a:latin typeface="Aptos Narrow" panose="020B0004020202020204" pitchFamily="34" charset="0"/>
-                        </a:rPr>
-                        <a:t>NA</a:t>
+                        <a:t>follicular lymphoma</a:t>
+                      </a:r>
+                    </a:p>
+                  </a:txBody>
+                  <a:tcPr marL="9525" marR="9525" marT="9525" marB="0"/>
+                </a:tc>
+                <a:tc>
+                  <a:txBody>
+                    <a:bodyPr/>
+                    <a:lstStyle/>
+                    <a:p>
+                      <a:pPr algn="l" fontAlgn="b"/>
+                      <a:r>
+                        <a:rPr lang="en-US" sz="1200" b="0" i="0" u="none" strike="noStrike">
+                          <a:solidFill>
+                            <a:srgbClr val="000000"/>
+                          </a:solidFill>
+                          <a:effectLst/>
+                          <a:latin typeface="Aptos Narrow" panose="020B0004020202020204" pitchFamily="34" charset="0"/>
+                        </a:rPr>
+                        <a:t>Yes</a:t>
+                      </a:r>
+                    </a:p>
+                  </a:txBody>
+                  <a:tcPr marL="9525" marR="9525" marT="9525" marB="0"/>
+                </a:tc>
+                <a:tc>
+                  <a:txBody>
+                    <a:bodyPr/>
+                    <a:lstStyle/>
+                    <a:p>
+                      <a:pPr algn="l" fontAlgn="b"/>
+                      <a:r>
+                        <a:rPr lang="en-US" sz="1200" b="0" i="0" u="none" strike="noStrike">
+                          <a:solidFill>
+                            <a:srgbClr val="000000"/>
+                          </a:solidFill>
+                          <a:effectLst/>
+                          <a:latin typeface="Aptos Narrow" panose="020B0004020202020204" pitchFamily="34" charset="0"/>
+                        </a:rPr>
+                        <a:t>https://www.ncbi.nlm.nih.gov/pmc/articles/PMC3566339/</a:t>
                       </a:r>
                     </a:p>
                   </a:txBody>
@@ -8190,7 +8345,7 @@
                     <a:p>
                       <a:pPr algn="r" fontAlgn="b"/>
                       <a:r>
-                        <a:rPr lang="en-US" sz="1200" b="0" i="0" u="none" strike="noStrike">
+                        <a:rPr lang="en-US" sz="1200" b="0" i="0" u="none" strike="noStrike" dirty="0">
                           <a:solidFill>
                             <a:srgbClr val="000000"/>
                           </a:solidFill>
@@ -8229,122 +8384,22 @@
                   </a:ext>
                 </a:extLst>
               </a:tr>
-              <a:tr h="242377">
-                <a:tc>
-                  <a:txBody>
-                    <a:bodyPr/>
-                    <a:lstStyle/>
-                    <a:p>
-                      <a:pPr algn="l" fontAlgn="b"/>
-                      <a:r>
-                        <a:rPr lang="en-US" sz="1200" b="0" i="0" u="none" strike="noStrike">
-                          <a:solidFill>
-                            <a:srgbClr val="000000"/>
-                          </a:solidFill>
-                          <a:effectLst/>
-                          <a:latin typeface="Aptos Narrow" panose="020B0004020202020204" pitchFamily="34" charset="0"/>
-                        </a:rPr>
-                        <a:t>JAK1</a:t>
-                      </a:r>
-                    </a:p>
-                  </a:txBody>
-                  <a:tcPr marL="9525" marR="9525" marT="9525" marB="0"/>
-                </a:tc>
-                <a:tc>
-                  <a:txBody>
-                    <a:bodyPr/>
-                    <a:lstStyle/>
-                    <a:p>
-                      <a:pPr algn="l" fontAlgn="b"/>
-                      <a:r>
-                        <a:rPr lang="en-US" sz="1200" b="0" i="0" u="none" strike="noStrike">
-                          <a:solidFill>
-                            <a:srgbClr val="000000"/>
-                          </a:solidFill>
-                          <a:effectLst/>
-                          <a:latin typeface="Aptos Narrow" panose="020B0004020202020204" pitchFamily="34" charset="0"/>
-                        </a:rPr>
-                        <a:t>Yes</a:t>
-                      </a:r>
-                    </a:p>
-                  </a:txBody>
-                  <a:tcPr marL="9525" marR="9525" marT="9525" marB="0"/>
-                </a:tc>
-                <a:tc>
-                  <a:txBody>
-                    <a:bodyPr/>
-                    <a:lstStyle/>
-                    <a:p>
-                      <a:pPr algn="l" fontAlgn="b"/>
-                      <a:r>
-                        <a:rPr lang="en-US" sz="1200" b="0" i="0" u="none" strike="noStrike">
-                          <a:solidFill>
-                            <a:srgbClr val="000000"/>
-                          </a:solidFill>
-                          <a:effectLst/>
-                          <a:latin typeface="Aptos Narrow" panose="020B0004020202020204" pitchFamily="34" charset="0"/>
-                        </a:rPr>
-                        <a:t>Yes</a:t>
-                      </a:r>
-                    </a:p>
-                  </a:txBody>
-                  <a:tcPr marL="9525" marR="9525" marT="9525" marB="0"/>
-                </a:tc>
-                <a:tc>
-                  <a:txBody>
-                    <a:bodyPr/>
-                    <a:lstStyle/>
-                    <a:p>
-                      <a:pPr algn="l" fontAlgn="b"/>
-                      <a:r>
-                        <a:rPr lang="en-US" sz="1200" b="0" i="0" u="none" strike="noStrike">
-                          <a:solidFill>
-                            <a:srgbClr val="000000"/>
-                          </a:solidFill>
-                          <a:effectLst/>
-                          <a:latin typeface="Aptos Narrow" panose="020B0004020202020204" pitchFamily="34" charset="0"/>
-                        </a:rPr>
-                        <a:t>Yes</a:t>
-                      </a:r>
-                    </a:p>
-                  </a:txBody>
-                  <a:tcPr marL="9525" marR="9525" marT="9525" marB="0"/>
-                </a:tc>
-                <a:tc>
-                  <a:txBody>
-                    <a:bodyPr/>
-                    <a:lstStyle/>
-                    <a:p>
-                      <a:pPr algn="l" fontAlgn="b"/>
-                      <a:r>
-                        <a:rPr lang="en-US" sz="1200" b="0" i="0" u="none" strike="noStrike">
-                          <a:solidFill>
-                            <a:srgbClr val="000000"/>
-                          </a:solidFill>
-                          <a:effectLst/>
-                          <a:latin typeface="Aptos Narrow" panose="020B0004020202020204" pitchFamily="34" charset="0"/>
-                        </a:rPr>
-                        <a:t>OT_IDG_PMTL</a:t>
-                      </a:r>
-                    </a:p>
-                  </a:txBody>
-                  <a:tcPr marL="9525" marR="9525" marT="9525" marB="0"/>
-                </a:tc>
-                <a:tc>
-                  <a:txBody>
-                    <a:bodyPr/>
-                    <a:lstStyle/>
-                    <a:p>
-                      <a:pPr algn="l" fontAlgn="b"/>
-                      <a:r>
-                        <a:rPr lang="en-US" sz="1200" b="0" i="0" u="none" strike="noStrike">
-                          <a:solidFill>
-                            <a:srgbClr val="000000"/>
-                          </a:solidFill>
-                          <a:effectLst/>
-                          <a:latin typeface="Aptos Narrow" panose="020B0004020202020204" pitchFamily="34" charset="0"/>
-                        </a:rPr>
-                        <a:t>pancreatic carcinoma</a:t>
+              <a:tr h="226047">
+                <a:tc>
+                  <a:txBody>
+                    <a:bodyPr/>
+                    <a:lstStyle/>
+                    <a:p>
+                      <a:pPr algn="l" fontAlgn="b"/>
+                      <a:r>
+                        <a:rPr lang="en-US" sz="1200" b="0" i="0" u="none" strike="noStrike">
+                          <a:solidFill>
+                            <a:srgbClr val="000000"/>
+                          </a:solidFill>
+                          <a:effectLst/>
+                          <a:latin typeface="Aptos Narrow" panose="020B0004020202020204" pitchFamily="34" charset="0"/>
+                        </a:rPr>
+                        <a:t>MAPRE3</a:t>
                       </a:r>
                     </a:p>
                   </a:txBody>
@@ -8384,6 +8439,126 @@
                           <a:effectLst/>
                           <a:latin typeface="Aptos Narrow" panose="020B0004020202020204" pitchFamily="34" charset="0"/>
                         </a:rPr>
+                        <a:t>No</a:t>
+                      </a:r>
+                    </a:p>
+                  </a:txBody>
+                  <a:tcPr marL="9525" marR="9525" marT="9525" marB="0"/>
+                </a:tc>
+                <a:tc>
+                  <a:txBody>
+                    <a:bodyPr/>
+                    <a:lstStyle/>
+                    <a:p>
+                      <a:pPr algn="l" fontAlgn="b"/>
+                      <a:r>
+                        <a:rPr lang="en-US" sz="1200" b="0" i="0" u="none" strike="noStrike">
+                          <a:solidFill>
+                            <a:srgbClr val="000000"/>
+                          </a:solidFill>
+                          <a:effectLst/>
+                          <a:latin typeface="Aptos Narrow" panose="020B0004020202020204" pitchFamily="34" charset="0"/>
+                        </a:rPr>
+                        <a:t>No</a:t>
+                      </a:r>
+                    </a:p>
+                  </a:txBody>
+                  <a:tcPr marL="9525" marR="9525" marT="9525" marB="0"/>
+                </a:tc>
+                <a:tc>
+                  <a:txBody>
+                    <a:bodyPr/>
+                    <a:lstStyle/>
+                    <a:p>
+                      <a:pPr algn="l" fontAlgn="b"/>
+                      <a:r>
+                        <a:rPr lang="en-US" sz="1200" b="0" i="0" u="none" strike="noStrike">
+                          <a:solidFill>
+                            <a:srgbClr val="000000"/>
+                          </a:solidFill>
+                          <a:effectLst/>
+                          <a:latin typeface="Aptos Narrow" panose="020B0004020202020204" pitchFamily="34" charset="0"/>
+                        </a:rPr>
+                        <a:t>No</a:t>
+                      </a:r>
+                    </a:p>
+                  </a:txBody>
+                  <a:tcPr marL="9525" marR="9525" marT="9525" marB="0"/>
+                </a:tc>
+                <a:tc>
+                  <a:txBody>
+                    <a:bodyPr/>
+                    <a:lstStyle/>
+                    <a:p>
+                      <a:pPr algn="l" fontAlgn="b"/>
+                      <a:r>
+                        <a:rPr lang="en-US" sz="1200" b="0" i="0" u="none" strike="noStrike">
+                          <a:solidFill>
+                            <a:srgbClr val="000000"/>
+                          </a:solidFill>
+                          <a:effectLst/>
+                          <a:latin typeface="Aptos Narrow" panose="020B0004020202020204" pitchFamily="34" charset="0"/>
+                        </a:rPr>
+                        <a:t>IDG</a:t>
+                      </a:r>
+                    </a:p>
+                  </a:txBody>
+                  <a:tcPr marL="9525" marR="9525" marT="9525" marB="0"/>
+                </a:tc>
+                <a:tc>
+                  <a:txBody>
+                    <a:bodyPr/>
+                    <a:lstStyle/>
+                    <a:p>
+                      <a:pPr algn="l" fontAlgn="b"/>
+                      <a:r>
+                        <a:rPr lang="en-US" sz="1200" b="0" i="0" u="none" strike="noStrike">
+                          <a:solidFill>
+                            <a:srgbClr val="000000"/>
+                          </a:solidFill>
+                          <a:effectLst/>
+                          <a:latin typeface="Aptos Narrow" panose="020B0004020202020204" pitchFamily="34" charset="0"/>
+                        </a:rPr>
+                        <a:t>lung carcinoma</a:t>
+                      </a:r>
+                    </a:p>
+                  </a:txBody>
+                  <a:tcPr marL="9525" marR="9525" marT="9525" marB="0"/>
+                </a:tc>
+                <a:tc>
+                  <a:txBody>
+                    <a:bodyPr/>
+                    <a:lstStyle/>
+                    <a:p>
+                      <a:pPr algn="l" fontAlgn="b"/>
+                      <a:r>
+                        <a:rPr lang="en-US" sz="1200" b="0" i="0" u="none" strike="noStrike">
+                          <a:solidFill>
+                            <a:srgbClr val="000000"/>
+                          </a:solidFill>
+                          <a:effectLst/>
+                          <a:latin typeface="Aptos Narrow" panose="020B0004020202020204" pitchFamily="34" charset="0"/>
+                        </a:rPr>
+                        <a:t>No</a:t>
+                      </a:r>
+                    </a:p>
+                  </a:txBody>
+                  <a:tcPr marL="9525" marR="9525" marT="9525" marB="0"/>
+                </a:tc>
+                <a:tc>
+                  <a:txBody>
+                    <a:bodyPr/>
+                    <a:lstStyle/>
+                    <a:p>
+                      <a:pPr algn="l" fontAlgn="b"/>
+                      <a:r>
+                        <a:rPr lang="en-US" sz="1200" b="0" i="0" u="none" strike="noStrike">
+                          <a:solidFill>
+                            <a:srgbClr val="000000"/>
+                          </a:solidFill>
+                          <a:effectLst/>
+                          <a:latin typeface="Aptos Narrow" panose="020B0004020202020204" pitchFamily="34" charset="0"/>
+                        </a:rPr>
                         <a:t>NA</a:t>
                       </a:r>
                     </a:p>
@@ -8395,16 +8570,16 @@
                     <a:bodyPr/>
                     <a:lstStyle/>
                     <a:p>
-                      <a:pPr algn="r" fontAlgn="b"/>
-                      <a:r>
-                        <a:rPr lang="en-US" sz="1200" b="0" i="0" u="none" strike="noStrike">
-                          <a:solidFill>
-                            <a:srgbClr val="000000"/>
-                          </a:solidFill>
-                          <a:effectLst/>
-                          <a:latin typeface="Aptos Narrow" panose="020B0004020202020204" pitchFamily="34" charset="0"/>
-                        </a:rPr>
-                        <a:t>6</a:t>
+                      <a:pPr algn="l" fontAlgn="b"/>
+                      <a:r>
+                        <a:rPr lang="en-US" sz="1200" b="0" i="0" u="none" strike="noStrike">
+                          <a:solidFill>
+                            <a:srgbClr val="000000"/>
+                          </a:solidFill>
+                          <a:effectLst/>
+                          <a:latin typeface="Aptos Narrow" panose="020B0004020202020204" pitchFamily="34" charset="0"/>
+                        </a:rPr>
+                        <a:t>NA</a:t>
                       </a:r>
                     </a:p>
                   </a:txBody>
@@ -8424,7 +8599,7 @@
                           <a:effectLst/>
                           <a:latin typeface="Aptos Narrow" panose="020B0004020202020204" pitchFamily="34" charset="0"/>
                         </a:rPr>
-                        <a:t>OT</a:t>
+                        <a:t>OT_IDG</a:t>
                       </a:r>
                     </a:p>
                   </a:txBody>
@@ -8436,22 +8611,22 @@
                   </a:ext>
                 </a:extLst>
               </a:tr>
-              <a:tr h="333269">
-                <a:tc>
-                  <a:txBody>
-                    <a:bodyPr/>
-                    <a:lstStyle/>
-                    <a:p>
-                      <a:pPr algn="l" fontAlgn="b"/>
-                      <a:r>
-                        <a:rPr lang="en-US" sz="1200" b="0" i="0" u="none" strike="noStrike">
-                          <a:solidFill>
-                            <a:srgbClr val="000000"/>
-                          </a:solidFill>
-                          <a:effectLst/>
-                          <a:latin typeface="Aptos Narrow" panose="020B0004020202020204" pitchFamily="34" charset="0"/>
-                        </a:rPr>
-                        <a:t>PTEN</a:t>
+              <a:tr h="350180">
+                <a:tc>
+                  <a:txBody>
+                    <a:bodyPr/>
+                    <a:lstStyle/>
+                    <a:p>
+                      <a:pPr algn="l" fontAlgn="b"/>
+                      <a:r>
+                        <a:rPr lang="en-US" sz="1200" b="0" i="0" u="none" strike="noStrike">
+                          <a:solidFill>
+                            <a:srgbClr val="000000"/>
+                          </a:solidFill>
+                          <a:effectLst/>
+                          <a:latin typeface="Aptos Narrow" panose="020B0004020202020204" pitchFamily="34" charset="0"/>
+                        </a:rPr>
+                        <a:t>STXBP6</a:t>
                       </a:r>
                     </a:p>
                   </a:txBody>
@@ -8504,6 +8679,146 @@
                     <a:p>
                       <a:pPr algn="l" fontAlgn="b"/>
                       <a:r>
+                        <a:rPr lang="en-US" sz="1200" b="0" i="0" u="none" strike="noStrike">
+                          <a:solidFill>
+                            <a:srgbClr val="000000"/>
+                          </a:solidFill>
+                          <a:effectLst/>
+                          <a:latin typeface="Aptos Narrow" panose="020B0004020202020204" pitchFamily="34" charset="0"/>
+                        </a:rPr>
+                        <a:t>No</a:t>
+                      </a:r>
+                    </a:p>
+                  </a:txBody>
+                  <a:tcPr marL="9525" marR="9525" marT="9525" marB="0"/>
+                </a:tc>
+                <a:tc>
+                  <a:txBody>
+                    <a:bodyPr/>
+                    <a:lstStyle/>
+                    <a:p>
+                      <a:pPr algn="l" fontAlgn="b"/>
+                      <a:r>
+                        <a:rPr lang="en-US" sz="1200" b="0" i="0" u="none" strike="noStrike">
+                          <a:solidFill>
+                            <a:srgbClr val="000000"/>
+                          </a:solidFill>
+                          <a:effectLst/>
+                          <a:latin typeface="Aptos Narrow" panose="020B0004020202020204" pitchFamily="34" charset="0"/>
+                        </a:rPr>
+                        <a:t>No</a:t>
+                      </a:r>
+                    </a:p>
+                  </a:txBody>
+                  <a:tcPr marL="9525" marR="9525" marT="9525" marB="0"/>
+                </a:tc>
+                <a:tc>
+                  <a:txBody>
+                    <a:bodyPr/>
+                    <a:lstStyle/>
+                    <a:p>
+                      <a:pPr algn="l" fontAlgn="b"/>
+                      <a:r>
+                        <a:rPr lang="en-US" sz="1200" b="0" i="0" u="none" strike="noStrike">
+                          <a:solidFill>
+                            <a:srgbClr val="000000"/>
+                          </a:solidFill>
+                          <a:effectLst/>
+                          <a:latin typeface="Aptos Narrow" panose="020B0004020202020204" pitchFamily="34" charset="0"/>
+                        </a:rPr>
+                        <a:t>IDG</a:t>
+                      </a:r>
+                    </a:p>
+                  </a:txBody>
+                  <a:tcPr marL="9525" marR="9525" marT="9525" marB="0"/>
+                </a:tc>
+                <a:tc>
+                  <a:txBody>
+                    <a:bodyPr/>
+                    <a:lstStyle/>
+                    <a:p>
+                      <a:pPr algn="l" fontAlgn="b"/>
+                      <a:r>
+                        <a:rPr lang="en-US" sz="1200" b="0" i="0" u="none" strike="noStrike">
+                          <a:solidFill>
+                            <a:srgbClr val="000000"/>
+                          </a:solidFill>
+                          <a:effectLst/>
+                          <a:latin typeface="Aptos Narrow" panose="020B0004020202020204" pitchFamily="34" charset="0"/>
+                        </a:rPr>
+                        <a:t>subependymal giant cell astrocytoma</a:t>
+                      </a:r>
+                    </a:p>
+                  </a:txBody>
+                  <a:tcPr marL="9525" marR="9525" marT="9525" marB="0"/>
+                </a:tc>
+                <a:tc>
+                  <a:txBody>
+                    <a:bodyPr/>
+                    <a:lstStyle/>
+                    <a:p>
+                      <a:pPr algn="l" fontAlgn="b"/>
+                      <a:r>
+                        <a:rPr lang="en-US" sz="1200" b="0" i="0" u="none" strike="noStrike">
+                          <a:solidFill>
+                            <a:srgbClr val="000000"/>
+                          </a:solidFill>
+                          <a:effectLst/>
+                          <a:latin typeface="Aptos Narrow" panose="020B0004020202020204" pitchFamily="34" charset="0"/>
+                        </a:rPr>
+                        <a:t>Yes</a:t>
+                      </a:r>
+                    </a:p>
+                  </a:txBody>
+                  <a:tcPr marL="9525" marR="9525" marT="9525" marB="0"/>
+                </a:tc>
+                <a:tc>
+                  <a:txBody>
+                    <a:bodyPr/>
+                    <a:lstStyle/>
+                    <a:p>
+                      <a:pPr algn="l" fontAlgn="b"/>
+                      <a:r>
+                        <a:rPr lang="en-US" sz="1200" b="0" i="0" u="none" strike="noStrike">
+                          <a:solidFill>
+                            <a:srgbClr val="000000"/>
+                          </a:solidFill>
+                          <a:effectLst/>
+                          <a:latin typeface="Aptos Narrow" panose="020B0004020202020204" pitchFamily="34" charset="0"/>
+                        </a:rPr>
+                        <a:t>Listed in WHO Ped Tumor</a:t>
+                      </a:r>
+                    </a:p>
+                  </a:txBody>
+                  <a:tcPr marL="9525" marR="9525" marT="9525" marB="0"/>
+                </a:tc>
+                <a:tc>
+                  <a:txBody>
+                    <a:bodyPr/>
+                    <a:lstStyle/>
+                    <a:p>
+                      <a:pPr algn="l" fontAlgn="b"/>
+                      <a:r>
+                        <a:rPr lang="en-US" sz="1200" b="0" i="0" u="none" strike="noStrike">
+                          <a:solidFill>
+                            <a:srgbClr val="000000"/>
+                          </a:solidFill>
+                          <a:effectLst/>
+                          <a:latin typeface="Aptos Narrow" panose="020B0004020202020204" pitchFamily="34" charset="0"/>
+                        </a:rPr>
+                        <a:t>NA</a:t>
+                      </a:r>
+                    </a:p>
+                  </a:txBody>
+                  <a:tcPr marL="9525" marR="9525" marT="9525" marB="0"/>
+                </a:tc>
+                <a:tc>
+                  <a:txBody>
+                    <a:bodyPr/>
+                    <a:lstStyle/>
+                    <a:p>
+                      <a:pPr algn="l" fontAlgn="b"/>
+                      <a:r>
                         <a:rPr lang="en-US" sz="1200" b="0" i="0" u="none" strike="noStrike" dirty="0">
                           <a:solidFill>
                             <a:srgbClr val="000000"/>
@@ -8511,127 +8826,7 @@
                           <a:effectLst/>
                           <a:latin typeface="Aptos Narrow" panose="020B0004020202020204" pitchFamily="34" charset="0"/>
                         </a:rPr>
-                        <a:t>No</a:t>
-                      </a:r>
-                    </a:p>
-                  </a:txBody>
-                  <a:tcPr marL="9525" marR="9525" marT="9525" marB="0"/>
-                </a:tc>
-                <a:tc>
-                  <a:txBody>
-                    <a:bodyPr/>
-                    <a:lstStyle/>
-                    <a:p>
-                      <a:pPr algn="l" fontAlgn="b"/>
-                      <a:r>
-                        <a:rPr lang="en-US" sz="1200" b="0" i="0" u="none" strike="noStrike">
-                          <a:solidFill>
-                            <a:srgbClr val="000000"/>
-                          </a:solidFill>
-                          <a:effectLst/>
-                          <a:latin typeface="Aptos Narrow" panose="020B0004020202020204" pitchFamily="34" charset="0"/>
-                        </a:rPr>
-                        <a:t>IDG_PMTL</a:t>
-                      </a:r>
-                    </a:p>
-                  </a:txBody>
-                  <a:tcPr marL="9525" marR="9525" marT="9525" marB="0"/>
-                </a:tc>
-                <a:tc>
-                  <a:txBody>
-                    <a:bodyPr/>
-                    <a:lstStyle/>
-                    <a:p>
-                      <a:pPr algn="l" fontAlgn="b"/>
-                      <a:r>
-                        <a:rPr lang="en-US" sz="1200" b="0" i="0" u="none" strike="noStrike">
-                          <a:solidFill>
-                            <a:srgbClr val="000000"/>
-                          </a:solidFill>
-                          <a:effectLst/>
-                          <a:latin typeface="Aptos Narrow" panose="020B0004020202020204" pitchFamily="34" charset="0"/>
-                        </a:rPr>
-                        <a:t>fibrosarcoma</a:t>
-                      </a:r>
-                    </a:p>
-                  </a:txBody>
-                  <a:tcPr marL="9525" marR="9525" marT="9525" marB="0"/>
-                </a:tc>
-                <a:tc>
-                  <a:txBody>
-                    <a:bodyPr/>
-                    <a:lstStyle/>
-                    <a:p>
-                      <a:pPr algn="l" fontAlgn="b"/>
-                      <a:r>
-                        <a:rPr lang="en-US" sz="1200" b="0" i="0" u="none" strike="noStrike">
-                          <a:solidFill>
-                            <a:srgbClr val="000000"/>
-                          </a:solidFill>
-                          <a:effectLst/>
-                          <a:latin typeface="Aptos Narrow" panose="020B0004020202020204" pitchFamily="34" charset="0"/>
-                        </a:rPr>
-                        <a:t>Yes</a:t>
-                      </a:r>
-                    </a:p>
-                  </a:txBody>
-                  <a:tcPr marL="9525" marR="9525" marT="9525" marB="0"/>
-                </a:tc>
-                <a:tc>
-                  <a:txBody>
-                    <a:bodyPr/>
-                    <a:lstStyle/>
-                    <a:p>
-                      <a:pPr algn="l" fontAlgn="b"/>
-                      <a:r>
-                        <a:rPr lang="en-US" sz="1200" b="0" i="0" u="none" strike="noStrike">
-                          <a:solidFill>
-                            <a:srgbClr val="000000"/>
-                          </a:solidFill>
-                          <a:effectLst/>
-                          <a:latin typeface="Aptos Narrow" panose="020B0004020202020204" pitchFamily="34" charset="0"/>
-                        </a:rPr>
-                        <a:t>Listed in WHO Ped Tumor</a:t>
-                      </a:r>
-                    </a:p>
-                  </a:txBody>
-                  <a:tcPr marL="9525" marR="9525" marT="9525" marB="0"/>
-                </a:tc>
-                <a:tc>
-                  <a:txBody>
-                    <a:bodyPr/>
-                    <a:lstStyle/>
-                    <a:p>
-                      <a:pPr algn="r" fontAlgn="b"/>
-                      <a:r>
-                        <a:rPr lang="en-US" sz="1200" b="0" i="0" u="none" strike="noStrike">
-                          <a:solidFill>
-                            <a:srgbClr val="000000"/>
-                          </a:solidFill>
-                          <a:effectLst/>
-                          <a:latin typeface="Aptos Narrow" panose="020B0004020202020204" pitchFamily="34" charset="0"/>
-                        </a:rPr>
-                        <a:t>6</a:t>
-                      </a:r>
-                    </a:p>
-                  </a:txBody>
-                  <a:tcPr marL="9525" marR="9525" marT="9525" marB="0"/>
-                </a:tc>
-                <a:tc>
-                  <a:txBody>
-                    <a:bodyPr/>
-                    <a:lstStyle/>
-                    <a:p>
-                      <a:pPr algn="l" fontAlgn="b"/>
-                      <a:r>
-                        <a:rPr lang="en-US" sz="1200" b="0" i="0" u="none" strike="noStrike" dirty="0">
-                          <a:solidFill>
-                            <a:srgbClr val="000000"/>
-                          </a:solidFill>
-                          <a:effectLst/>
-                          <a:latin typeface="Aptos Narrow" panose="020B0004020202020204" pitchFamily="34" charset="0"/>
-                        </a:rPr>
-                        <a:t>OT</a:t>
+                        <a:t>IDG</a:t>
                       </a:r>
                     </a:p>
                   </a:txBody>
@@ -8643,22 +8838,142 @@
                   </a:ext>
                 </a:extLst>
               </a:tr>
-              <a:tr h="575805">
-                <a:tc>
-                  <a:txBody>
-                    <a:bodyPr/>
-                    <a:lstStyle/>
-                    <a:p>
-                      <a:pPr algn="l" fontAlgn="b"/>
-                      <a:r>
-                        <a:rPr lang="en-US" sz="1200" b="0" i="0" u="none" strike="noStrike">
-                          <a:solidFill>
-                            <a:srgbClr val="000000"/>
-                          </a:solidFill>
-                          <a:effectLst/>
-                          <a:latin typeface="Aptos Narrow" panose="020B0004020202020204" pitchFamily="34" charset="0"/>
-                        </a:rPr>
-                        <a:t>STAT3</a:t>
+              <a:tr h="350180">
+                <a:tc>
+                  <a:txBody>
+                    <a:bodyPr/>
+                    <a:lstStyle/>
+                    <a:p>
+                      <a:pPr algn="l" fontAlgn="b"/>
+                      <a:r>
+                        <a:rPr lang="en-US" sz="1200" b="0" i="0" u="none" strike="noStrike">
+                          <a:solidFill>
+                            <a:srgbClr val="000000"/>
+                          </a:solidFill>
+                          <a:effectLst/>
+                          <a:latin typeface="Aptos Narrow" panose="020B0004020202020204" pitchFamily="34" charset="0"/>
+                        </a:rPr>
+                        <a:t>UTF1</a:t>
+                      </a:r>
+                    </a:p>
+                  </a:txBody>
+                  <a:tcPr marL="9525" marR="9525" marT="9525" marB="0"/>
+                </a:tc>
+                <a:tc>
+                  <a:txBody>
+                    <a:bodyPr/>
+                    <a:lstStyle/>
+                    <a:p>
+                      <a:pPr algn="l" fontAlgn="b"/>
+                      <a:r>
+                        <a:rPr lang="en-US" sz="1200" b="0" i="0" u="none" strike="noStrike">
+                          <a:solidFill>
+                            <a:srgbClr val="000000"/>
+                          </a:solidFill>
+                          <a:effectLst/>
+                          <a:latin typeface="Aptos Narrow" panose="020B0004020202020204" pitchFamily="34" charset="0"/>
+                        </a:rPr>
+                        <a:t>No</a:t>
+                      </a:r>
+                    </a:p>
+                  </a:txBody>
+                  <a:tcPr marL="9525" marR="9525" marT="9525" marB="0"/>
+                </a:tc>
+                <a:tc>
+                  <a:txBody>
+                    <a:bodyPr/>
+                    <a:lstStyle/>
+                    <a:p>
+                      <a:pPr algn="l" fontAlgn="b"/>
+                      <a:r>
+                        <a:rPr lang="en-US" sz="1200" b="0" i="0" u="none" strike="noStrike">
+                          <a:solidFill>
+                            <a:srgbClr val="000000"/>
+                          </a:solidFill>
+                          <a:effectLst/>
+                          <a:latin typeface="Aptos Narrow" panose="020B0004020202020204" pitchFamily="34" charset="0"/>
+                        </a:rPr>
+                        <a:t>No</a:t>
+                      </a:r>
+                    </a:p>
+                  </a:txBody>
+                  <a:tcPr marL="9525" marR="9525" marT="9525" marB="0"/>
+                </a:tc>
+                <a:tc>
+                  <a:txBody>
+                    <a:bodyPr/>
+                    <a:lstStyle/>
+                    <a:p>
+                      <a:pPr algn="l" fontAlgn="b"/>
+                      <a:r>
+                        <a:rPr lang="en-US" sz="1200" b="0" i="0" u="none" strike="noStrike">
+                          <a:solidFill>
+                            <a:srgbClr val="000000"/>
+                          </a:solidFill>
+                          <a:effectLst/>
+                          <a:latin typeface="Aptos Narrow" panose="020B0004020202020204" pitchFamily="34" charset="0"/>
+                        </a:rPr>
+                        <a:t>No</a:t>
+                      </a:r>
+                    </a:p>
+                  </a:txBody>
+                  <a:tcPr marL="9525" marR="9525" marT="9525" marB="0"/>
+                </a:tc>
+                <a:tc>
+                  <a:txBody>
+                    <a:bodyPr/>
+                    <a:lstStyle/>
+                    <a:p>
+                      <a:pPr algn="l" fontAlgn="b"/>
+                      <a:r>
+                        <a:rPr lang="en-US" sz="1200" b="0" i="0" u="none" strike="noStrike">
+                          <a:solidFill>
+                            <a:srgbClr val="000000"/>
+                          </a:solidFill>
+                          <a:effectLst/>
+                          <a:latin typeface="Aptos Narrow" panose="020B0004020202020204" pitchFamily="34" charset="0"/>
+                        </a:rPr>
+                        <a:t>No</a:t>
+                      </a:r>
+                    </a:p>
+                  </a:txBody>
+                  <a:tcPr marL="9525" marR="9525" marT="9525" marB="0"/>
+                </a:tc>
+                <a:tc>
+                  <a:txBody>
+                    <a:bodyPr/>
+                    <a:lstStyle/>
+                    <a:p>
+                      <a:pPr algn="l" fontAlgn="b"/>
+                      <a:r>
+                        <a:rPr lang="en-US" sz="1200" b="0" i="0" u="none" strike="noStrike">
+                          <a:solidFill>
+                            <a:srgbClr val="000000"/>
+                          </a:solidFill>
+                          <a:effectLst/>
+                          <a:latin typeface="Aptos Narrow" panose="020B0004020202020204" pitchFamily="34" charset="0"/>
+                        </a:rPr>
+                        <a:t>IDG</a:t>
+                      </a:r>
+                    </a:p>
+                  </a:txBody>
+                  <a:tcPr marL="9525" marR="9525" marT="9525" marB="0"/>
+                </a:tc>
+                <a:tc>
+                  <a:txBody>
+                    <a:bodyPr/>
+                    <a:lstStyle/>
+                    <a:p>
+                      <a:pPr algn="l" fontAlgn="b"/>
+                      <a:r>
+                        <a:rPr lang="en-US" sz="1200" b="0" i="0" u="none" strike="noStrike">
+                          <a:solidFill>
+                            <a:srgbClr val="000000"/>
+                          </a:solidFill>
+                          <a:effectLst/>
+                          <a:latin typeface="Aptos Narrow" panose="020B0004020202020204" pitchFamily="34" charset="0"/>
+                        </a:rPr>
+                        <a:t>atypical teratoid rhabdoid tumor</a:t>
                       </a:r>
                     </a:p>
                   </a:txBody>
@@ -8698,87 +9013,27 @@
                           <a:effectLst/>
                           <a:latin typeface="Aptos Narrow" panose="020B0004020202020204" pitchFamily="34" charset="0"/>
                         </a:rPr>
-                        <a:t>Yes</a:t>
-                      </a:r>
-                    </a:p>
-                  </a:txBody>
-                  <a:tcPr marL="9525" marR="9525" marT="9525" marB="0"/>
-                </a:tc>
-                <a:tc>
-                  <a:txBody>
-                    <a:bodyPr/>
-                    <a:lstStyle/>
-                    <a:p>
-                      <a:pPr algn="l" fontAlgn="b"/>
-                      <a:r>
-                        <a:rPr lang="en-US" sz="1200" b="0" i="0" u="none" strike="noStrike">
-                          <a:solidFill>
-                            <a:srgbClr val="000000"/>
-                          </a:solidFill>
-                          <a:effectLst/>
-                          <a:latin typeface="Aptos Narrow" panose="020B0004020202020204" pitchFamily="34" charset="0"/>
-                        </a:rPr>
-                        <a:t>Yes</a:t>
-                      </a:r>
-                    </a:p>
-                  </a:txBody>
-                  <a:tcPr marL="9525" marR="9525" marT="9525" marB="0"/>
-                </a:tc>
-                <a:tc>
-                  <a:txBody>
-                    <a:bodyPr/>
-                    <a:lstStyle/>
-                    <a:p>
-                      <a:pPr algn="l" fontAlgn="b"/>
-                      <a:r>
-                        <a:rPr lang="en-US" sz="1200" b="0" i="0" u="none" strike="noStrike">
-                          <a:solidFill>
-                            <a:srgbClr val="000000"/>
-                          </a:solidFill>
-                          <a:effectLst/>
-                          <a:latin typeface="Aptos Narrow" panose="020B0004020202020204" pitchFamily="34" charset="0"/>
-                        </a:rPr>
-                        <a:t>OT_IDG_PMTL</a:t>
-                      </a:r>
-                    </a:p>
-                  </a:txBody>
-                  <a:tcPr marL="9525" marR="9525" marT="9525" marB="0"/>
-                </a:tc>
-                <a:tc>
-                  <a:txBody>
-                    <a:bodyPr/>
-                    <a:lstStyle/>
-                    <a:p>
-                      <a:pPr algn="l" fontAlgn="b"/>
-                      <a:r>
-                        <a:rPr lang="en-US" sz="1200" b="0" i="0" u="none" strike="noStrike">
-                          <a:solidFill>
-                            <a:srgbClr val="000000"/>
-                          </a:solidFill>
-                          <a:effectLst/>
-                          <a:latin typeface="Aptos Narrow" panose="020B0004020202020204" pitchFamily="34" charset="0"/>
-                        </a:rPr>
-                        <a:t>olfactory neuroblastoma</a:t>
-                      </a:r>
-                    </a:p>
-                  </a:txBody>
-                  <a:tcPr marL="9525" marR="9525" marT="9525" marB="0"/>
-                </a:tc>
-                <a:tc>
-                  <a:txBody>
-                    <a:bodyPr/>
-                    <a:lstStyle/>
-                    <a:p>
-                      <a:pPr algn="l" fontAlgn="b"/>
-                      <a:r>
-                        <a:rPr lang="en-US" sz="1200" b="0" i="0" u="none" strike="noStrike">
-                          <a:solidFill>
-                            <a:srgbClr val="000000"/>
-                          </a:solidFill>
-                          <a:effectLst/>
-                          <a:latin typeface="Aptos Narrow" panose="020B0004020202020204" pitchFamily="34" charset="0"/>
-                        </a:rPr>
-                        <a:t>Yes</a:t>
+                        <a:t>Listed in WHO Ped Tumor</a:t>
+                      </a:r>
+                    </a:p>
+                  </a:txBody>
+                  <a:tcPr marL="9525" marR="9525" marT="9525" marB="0"/>
+                </a:tc>
+                <a:tc>
+                  <a:txBody>
+                    <a:bodyPr/>
+                    <a:lstStyle/>
+                    <a:p>
+                      <a:pPr algn="l" fontAlgn="b"/>
+                      <a:r>
+                        <a:rPr lang="en-US" sz="1200" b="0" i="0" u="none" strike="noStrike">
+                          <a:solidFill>
+                            <a:srgbClr val="000000"/>
+                          </a:solidFill>
+                          <a:effectLst/>
+                          <a:latin typeface="Aptos Narrow" panose="020B0004020202020204" pitchFamily="34" charset="0"/>
+                        </a:rPr>
+                        <a:t>NA</a:t>
                       </a:r>
                     </a:p>
                   </a:txBody>
@@ -8798,67 +9053,7 @@
                           <a:effectLst/>
                           <a:latin typeface="Aptos Narrow" panose="020B0004020202020204" pitchFamily="34" charset="0"/>
                         </a:rPr>
-                        <a:t>https://</a:t>
-                      </a:r>
-                      <a:r>
-                        <a:rPr lang="en-US" sz="1200" b="0" i="0" u="none" strike="noStrike" dirty="0" err="1">
-                          <a:solidFill>
-                            <a:srgbClr val="000000"/>
-                          </a:solidFill>
-                          <a:effectLst/>
-                          <a:latin typeface="Aptos Narrow" panose="020B0004020202020204" pitchFamily="34" charset="0"/>
-                        </a:rPr>
-                        <a:t>www.mdpi.com</a:t>
-                      </a:r>
-                      <a:r>
-                        <a:rPr lang="en-US" sz="1200" b="0" i="0" u="none" strike="noStrike" dirty="0">
-                          <a:solidFill>
-                            <a:srgbClr val="000000"/>
-                          </a:solidFill>
-                          <a:effectLst/>
-                          <a:latin typeface="Aptos Narrow" panose="020B0004020202020204" pitchFamily="34" charset="0"/>
-                        </a:rPr>
-                        <a:t>/2077-0383/10/12/2685</a:t>
-                      </a:r>
-                    </a:p>
-                  </a:txBody>
-                  <a:tcPr marL="9525" marR="9525" marT="9525" marB="0"/>
-                </a:tc>
-                <a:tc>
-                  <a:txBody>
-                    <a:bodyPr/>
-                    <a:lstStyle/>
-                    <a:p>
-                      <a:pPr algn="r" fontAlgn="b"/>
-                      <a:r>
-                        <a:rPr lang="en-US" sz="1200" b="0" i="0" u="none" strike="noStrike" dirty="0">
-                          <a:solidFill>
-                            <a:srgbClr val="000000"/>
-                          </a:solidFill>
-                          <a:effectLst/>
-                          <a:latin typeface="Aptos Narrow" panose="020B0004020202020204" pitchFamily="34" charset="0"/>
-                        </a:rPr>
-                        <a:t>1</a:t>
-                      </a:r>
-                    </a:p>
-                  </a:txBody>
-                  <a:tcPr marL="9525" marR="9525" marT="9525" marB="0"/>
-                </a:tc>
-                <a:tc>
-                  <a:txBody>
-                    <a:bodyPr/>
-                    <a:lstStyle/>
-                    <a:p>
-                      <a:pPr algn="l" fontAlgn="b"/>
-                      <a:r>
-                        <a:rPr lang="en-US" sz="1200" b="0" i="0" u="none" strike="noStrike" dirty="0">
-                          <a:solidFill>
-                            <a:srgbClr val="000000"/>
-                          </a:solidFill>
-                          <a:effectLst/>
-                          <a:latin typeface="Aptos Narrow" panose="020B0004020202020204" pitchFamily="34" charset="0"/>
-                        </a:rPr>
-                        <a:t>OT</a:t>
+                        <a:t>IDG</a:t>
                       </a:r>
                     </a:p>
                   </a:txBody>
@@ -8888,7 +9083,7 @@
         </p:nvSpPr>
         <p:spPr>
           <a:xfrm>
-            <a:off x="382232" y="5296375"/>
+            <a:off x="172054" y="4669011"/>
             <a:ext cx="11427536" cy="646331"/>
           </a:xfrm>
           <a:prstGeom prst="rect">
@@ -8904,7 +9099,7 @@
           <a:p>
             <a:r>
               <a:rPr lang="en-US" dirty="0"/>
-              <a:t>Majority of the PMTLs have multiple tumors associated with them. This table has 36298 relationships (rows) between PMTLs and tumors.</a:t>
+              <a:t>Majority of the targets have multiple tumors associated with them. This table has 127506 relationships (rows) between targets  and tumors.</a:t>
             </a:r>
           </a:p>
         </p:txBody>
@@ -11920,6 +12115,33 @@
 </file>
 
 <file path=customXml/item1.xml><?xml version="1.0" encoding="utf-8"?>
+<p:properties xmlns:p="http://schemas.microsoft.com/office/2006/metadata/properties" xmlns:xsi="http://www.w3.org/2001/XMLSchema-instance" xmlns:pc="http://schemas.microsoft.com/office/infopath/2007/PartnerControls">
+  <documentManagement>
+    <h6a4a4262ab844b18de92e197378cee0 xmlns="e96402cb-0a6e-49e7-8465-cfae72b5129c">
+      <Terms xmlns="http://schemas.microsoft.com/office/infopath/2007/PartnerControls"/>
+    </h6a4a4262ab844b18de92e197378cee0>
+    <o54b1e4c7e8f4e00a12ce46439e0e974 xmlns="e96402cb-0a6e-49e7-8465-cfae72b5129c">
+      <Terms xmlns="http://schemas.microsoft.com/office/infopath/2007/PartnerControls"/>
+    </o54b1e4c7e8f4e00a12ce46439e0e974>
+    <Category xmlns="34d7e926-6bad-4161-b251-cfc43f69ae87">Templates</Category>
+    <TaxKeywordTaxHTField xmlns="fcde5e04-944e-4dfc-be86-0a9ace870ff9">
+      <Terms xmlns="http://schemas.microsoft.com/office/infopath/2007/PartnerControls"/>
+    </TaxKeywordTaxHTField>
+    <IconOverlay xmlns="http://schemas.microsoft.com/sharepoint/v4" xsi:nil="true"/>
+  </documentManagement>
+</p:properties>
+</file>
+
+<file path=customXml/item2.xml><?xml version="1.0" encoding="utf-8"?>
+<?mso-contentType ?>
+<FormTemplates xmlns="http://schemas.microsoft.com/sharepoint/v3/contenttype/forms">
+  <Display>DocumentLibraryForm</Display>
+  <Edit>DocumentLibraryForm</Edit>
+  <New>DocumentLibraryForm</New>
+</FormTemplates>
+</file>
+
+<file path=customXml/item3.xml><?xml version="1.0" encoding="utf-8"?>
 <ct:contentTypeSchema xmlns:ct="http://schemas.microsoft.com/office/2006/metadata/contentType" xmlns:ma="http://schemas.microsoft.com/office/2006/metadata/properties/metaAttributes" ct:_="" ma:_="" ma:contentTypeName="Document" ma:contentTypeID="0x010100DF3D347118B88A4EA8E9A5FEBC94FD86" ma:contentTypeVersion="8" ma:contentTypeDescription="Create a new document." ma:contentTypeScope="" ma:versionID="e54af44cc39137a71e496aa5089235ef">
   <xsd:schema xmlns:xsd="http://www.w3.org/2001/XMLSchema" xmlns:xs="http://www.w3.org/2001/XMLSchema" xmlns:p="http://schemas.microsoft.com/office/2006/metadata/properties" xmlns:ns2="fcde5e04-944e-4dfc-be86-0a9ace870ff9" xmlns:ns3="e96402cb-0a6e-49e7-8465-cfae72b5129c" xmlns:ns4="34d7e926-6bad-4161-b251-cfc43f69ae87" xmlns:ns5="http://schemas.microsoft.com/sharepoint/v4" targetNamespace="http://schemas.microsoft.com/office/2006/metadata/properties" ma:root="true" ma:fieldsID="4dfd49e6986a0fb6e4e84e6606b80ac7" ns2:_="" ns3:_="" ns4:_="" ns5:_="">
     <xsd:import namespace="fcde5e04-944e-4dfc-be86-0a9ace870ff9"/>
@@ -12094,34 +12316,28 @@
 </ct:contentTypeSchema>
 </file>
 
-<file path=customXml/item2.xml><?xml version="1.0" encoding="utf-8"?>
-<p:properties xmlns:p="http://schemas.microsoft.com/office/2006/metadata/properties" xmlns:xsi="http://www.w3.org/2001/XMLSchema-instance" xmlns:pc="http://schemas.microsoft.com/office/infopath/2007/PartnerControls">
-  <documentManagement>
-    <h6a4a4262ab844b18de92e197378cee0 xmlns="e96402cb-0a6e-49e7-8465-cfae72b5129c">
-      <Terms xmlns="http://schemas.microsoft.com/office/infopath/2007/PartnerControls"/>
-    </h6a4a4262ab844b18de92e197378cee0>
-    <o54b1e4c7e8f4e00a12ce46439e0e974 xmlns="e96402cb-0a6e-49e7-8465-cfae72b5129c">
-      <Terms xmlns="http://schemas.microsoft.com/office/infopath/2007/PartnerControls"/>
-    </o54b1e4c7e8f4e00a12ce46439e0e974>
-    <Category xmlns="34d7e926-6bad-4161-b251-cfc43f69ae87">Templates</Category>
-    <TaxKeywordTaxHTField xmlns="fcde5e04-944e-4dfc-be86-0a9ace870ff9">
-      <Terms xmlns="http://schemas.microsoft.com/office/infopath/2007/PartnerControls"/>
-    </TaxKeywordTaxHTField>
-    <IconOverlay xmlns="http://schemas.microsoft.com/sharepoint/v4" xsi:nil="true"/>
-  </documentManagement>
-</p:properties>
+<file path=customXml/itemProps1.xml><?xml version="1.0" encoding="utf-8"?>
+<ds:datastoreItem xmlns:ds="http://schemas.openxmlformats.org/officeDocument/2006/customXml" ds:itemID="{7C493EF0-0BE4-4E84-A0BC-FF9879CDB9E8}">
+  <ds:schemaRefs>
+    <ds:schemaRef ds:uri="http://schemas.microsoft.com/office/2006/metadata/properties"/>
+    <ds:schemaRef ds:uri="http://schemas.microsoft.com/office/infopath/2007/PartnerControls"/>
+    <ds:schemaRef ds:uri="e96402cb-0a6e-49e7-8465-cfae72b5129c"/>
+    <ds:schemaRef ds:uri="34d7e926-6bad-4161-b251-cfc43f69ae87"/>
+    <ds:schemaRef ds:uri="fcde5e04-944e-4dfc-be86-0a9ace870ff9"/>
+    <ds:schemaRef ds:uri="http://schemas.microsoft.com/sharepoint/v4"/>
+  </ds:schemaRefs>
+</ds:datastoreItem>
 </file>
 
-<file path=customXml/item3.xml><?xml version="1.0" encoding="utf-8"?>
-<?mso-contentType ?>
-<FormTemplates xmlns="http://schemas.microsoft.com/sharepoint/v3/contenttype/forms">
-  <Display>DocumentLibraryForm</Display>
-  <Edit>DocumentLibraryForm</Edit>
-  <New>DocumentLibraryForm</New>
-</FormTemplates>
+<file path=customXml/itemProps2.xml><?xml version="1.0" encoding="utf-8"?>
+<ds:datastoreItem xmlns:ds="http://schemas.openxmlformats.org/officeDocument/2006/customXml" ds:itemID="{8E78B9CA-BC85-4AC4-82A4-AD53C20980F5}">
+  <ds:schemaRefs>
+    <ds:schemaRef ds:uri="http://schemas.microsoft.com/sharepoint/v3/contenttype/forms"/>
+  </ds:schemaRefs>
+</ds:datastoreItem>
 </file>
 
-<file path=customXml/itemProps1.xml><?xml version="1.0" encoding="utf-8"?>
+<file path=customXml/itemProps3.xml><?xml version="1.0" encoding="utf-8"?>
 <ds:datastoreItem xmlns:ds="http://schemas.openxmlformats.org/officeDocument/2006/customXml" ds:itemID="{1BBAC596-346B-4E59-839B-DB15DC7AE2D4}">
   <ds:schemaRefs>
     <ds:schemaRef ds:uri="http://schemas.microsoft.com/office/2006/metadata/contentType"/>
@@ -12140,25 +12356,4 @@
     <ds:schemaRef ds:uri="http://schemas.microsoft.com/internal/obd"/>
   </ds:schemaRefs>
 </ds:datastoreItem>
-</file>
-
-<file path=customXml/itemProps2.xml><?xml version="1.0" encoding="utf-8"?>
-<ds:datastoreItem xmlns:ds="http://schemas.openxmlformats.org/officeDocument/2006/customXml" ds:itemID="{7C493EF0-0BE4-4E84-A0BC-FF9879CDB9E8}">
-  <ds:schemaRefs>
-    <ds:schemaRef ds:uri="http://schemas.microsoft.com/office/2006/metadata/properties"/>
-    <ds:schemaRef ds:uri="http://schemas.microsoft.com/office/infopath/2007/PartnerControls"/>
-    <ds:schemaRef ds:uri="e96402cb-0a6e-49e7-8465-cfae72b5129c"/>
-    <ds:schemaRef ds:uri="34d7e926-6bad-4161-b251-cfc43f69ae87"/>
-    <ds:schemaRef ds:uri="fcde5e04-944e-4dfc-be86-0a9ace870ff9"/>
-    <ds:schemaRef ds:uri="http://schemas.microsoft.com/sharepoint/v4"/>
-  </ds:schemaRefs>
-</ds:datastoreItem>
-</file>
-
-<file path=customXml/itemProps3.xml><?xml version="1.0" encoding="utf-8"?>
-<ds:datastoreItem xmlns:ds="http://schemas.openxmlformats.org/officeDocument/2006/customXml" ds:itemID="{8E78B9CA-BC85-4AC4-82A4-AD53C20980F5}">
-  <ds:schemaRefs>
-    <ds:schemaRef ds:uri="http://schemas.microsoft.com/sharepoint/v3/contenttype/forms"/>
-  </ds:schemaRefs>
-</ds:datastoreItem>
 </file>
</xml_diff>

<commit_message>
added approach 1 and 2
</commit_message>
<xml_diff>
--- a/presentations/PMTL_Embedding_Short.pptx
+++ b/presentations/PMTL_Embedding_Short.pptx
@@ -5,7 +5,7 @@
     <p:sldMasterId id="2147483672" r:id="rId4"/>
   </p:sldMasterIdLst>
   <p:notesMasterIdLst>
-    <p:notesMasterId r:id="rId25"/>
+    <p:notesMasterId r:id="rId28"/>
   </p:notesMasterIdLst>
   <p:sldIdLst>
     <p:sldId id="256" r:id="rId5"/>
@@ -27,7 +27,10 @@
     <p:sldId id="273" r:id="rId21"/>
     <p:sldId id="280" r:id="rId22"/>
     <p:sldId id="279" r:id="rId23"/>
-    <p:sldId id="258" r:id="rId24"/>
+    <p:sldId id="282" r:id="rId24"/>
+    <p:sldId id="283" r:id="rId25"/>
+    <p:sldId id="281" r:id="rId26"/>
+    <p:sldId id="258" r:id="rId27"/>
   </p:sldIdLst>
   <p:sldSz cx="12192000" cy="6858000"/>
   <p:notesSz cx="6858000" cy="9144000"/>
@@ -9700,7 +9703,7 @@
           <a:p>
             <a:r>
               <a:rPr lang="en-US" dirty="0"/>
-              <a:t>Background</a:t>
+              <a:t>Standardizing CT tumor names</a:t>
             </a:r>
           </a:p>
         </p:txBody>
@@ -9735,7 +9738,40 @@
                 <a:effectLst/>
                 <a:latin typeface="Arial" panose="020B0604020202020204" pitchFamily="34" charset="0"/>
               </a:rPr>
-              <a:t>There are multiple publicly available databases that outline drug-target ,  drug-disease, and disease-target relationships. </a:t>
+              <a:t>Approach 1 (Edit distance) : Find the pairwise edit distance between every tumor in CT and WHO Tumors, and find the closest WHO tumor. </a:t>
+            </a:r>
+          </a:p>
+          <a:p>
+            <a:endParaRPr lang="en-US" sz="1800" dirty="0">
+              <a:solidFill>
+                <a:srgbClr val="000000"/>
+              </a:solidFill>
+            </a:endParaRPr>
+          </a:p>
+          <a:p>
+            <a:r>
+              <a:rPr lang="en-US" sz="1800" dirty="0">
+                <a:solidFill>
+                  <a:srgbClr val="000000"/>
+                </a:solidFill>
+              </a:rPr>
+              <a:t>Approach 2 (Edit distance + clustering): Use the edit distances as dissimilarity matrix in clustering </a:t>
+            </a:r>
+            <a:r>
+              <a:rPr lang="en-US" sz="1800" dirty="0" err="1">
+                <a:solidFill>
+                  <a:srgbClr val="000000"/>
+                </a:solidFill>
+              </a:rPr>
+              <a:t>algroithms</a:t>
+            </a:r>
+            <a:r>
+              <a:rPr lang="en-US" sz="1800" dirty="0">
+                <a:solidFill>
+                  <a:srgbClr val="000000"/>
+                </a:solidFill>
+              </a:rPr>
+              <a:t> and cluster similar tumors together.  For each cluster member in a given cluster, find the closest matching WHO tumor, the WHO tumor which is represented the most in the cluster is established as the standardized tumor name for that cluster of tumors. </a:t>
             </a:r>
           </a:p>
           <a:p>
@@ -9754,36 +9790,16 @@
                 <a:effectLst/>
                 <a:latin typeface="Arial" panose="020B0604020202020204" pitchFamily="34" charset="0"/>
               </a:rPr>
-              <a:t>However, there is a lack is a lack of publicly available resources that highlight these relationships for cancers , especially pediatric cancer.</a:t>
+              <a:t>Approach 2  (Embeddings + </a:t>
             </a:r>
-          </a:p>
-          <a:p>
-            <a:pPr lvl="1"/>
             <a:r>
-              <a:rPr lang="en-US" sz="1900" dirty="0">
+              <a:rPr lang="en-US" sz="1800" dirty="0">
                 <a:solidFill>
                   <a:srgbClr val="000000"/>
                 </a:solidFill>
-                <a:latin typeface="Arial" panose="020B0604020202020204" pitchFamily="34" charset="0"/>
               </a:rPr>
-              <a:t>Such a resource can help us understand the drug and target landscape for a particular cancer. </a:t>
+              <a:t>c</a:t>
             </a:r>
-            <a:endParaRPr lang="en-US" sz="1900" b="0" i="0" u="none" strike="noStrike" dirty="0">
-              <a:solidFill>
-                <a:srgbClr val="000000"/>
-              </a:solidFill>
-              <a:effectLst/>
-              <a:latin typeface="Arial" panose="020B0604020202020204" pitchFamily="34" charset="0"/>
-            </a:endParaRPr>
-          </a:p>
-          <a:p>
-            <a:endParaRPr lang="en-US" sz="1800" dirty="0">
-              <a:solidFill>
-                <a:srgbClr val="000000"/>
-              </a:solidFill>
-            </a:endParaRPr>
-          </a:p>
-          <a:p>
             <a:r>
               <a:rPr lang="en-US" sz="1800" b="0" i="0" u="none" strike="noStrike" dirty="0">
                 <a:solidFill>
@@ -9792,67 +9808,88 @@
                 <a:effectLst/>
                 <a:latin typeface="Arial" panose="020B0604020202020204" pitchFamily="34" charset="0"/>
               </a:rPr>
-              <a:t>Furthermore, there are limited publicly available resources which elucidate these relationships for drug and disease (specifically cancers) registered in clinical trials database.</a:t>
+              <a:t>lustering): </a:t>
             </a:r>
+          </a:p>
+          <a:p>
+            <a:pPr lvl="1"/>
+            <a:endParaRPr lang="en-US" sz="1400" dirty="0">
+              <a:solidFill>
+                <a:srgbClr val="000000"/>
+              </a:solidFill>
+              <a:latin typeface="Arial" panose="020B0604020202020204" pitchFamily="34" charset="0"/>
+            </a:endParaRPr>
           </a:p>
           <a:p>
             <a:pPr lvl="1"/>
             <a:r>
-              <a:rPr lang="en-US" sz="1900" b="0" i="0" u="none" strike="noStrike" dirty="0">
+              <a:rPr lang="en-US" sz="2000" b="0" i="0" u="none" strike="noStrike" dirty="0">
                 <a:solidFill>
                   <a:srgbClr val="000000"/>
                 </a:solidFill>
                 <a:effectLst/>
                 <a:latin typeface="Arial" panose="020B0604020202020204" pitchFamily="34" charset="0"/>
               </a:rPr>
-              <a:t>In particular, there is a need to identify these relationships for the FDA Pediatric Molecular Target List (FDA-PMTL) , which contains over 400 pediatric cancer gene targets of interest.</a:t>
+              <a:t>Generate embeddings (convert tumor names to numeric vectors) using Open AI’s ADA 2.0. </a:t>
             </a:r>
           </a:p>
           <a:p>
-            <a:endParaRPr lang="en-US" sz="1800" dirty="0">
-              <a:solidFill>
-                <a:srgbClr val="000000"/>
-              </a:solidFill>
-            </a:endParaRPr>
-          </a:p>
-          <a:p>
+            <a:pPr lvl="1"/>
             <a:r>
-              <a:rPr lang="en-US" sz="1800" b="0" i="0" u="none" strike="noStrike" dirty="0">
+              <a:rPr lang="en-US" sz="2000" b="0" i="0" u="none" strike="noStrike" dirty="0">
                 <a:solidFill>
                   <a:srgbClr val="000000"/>
                 </a:solidFill>
                 <a:effectLst/>
                 <a:latin typeface="Arial" panose="020B0604020202020204" pitchFamily="34" charset="0"/>
               </a:rPr>
-              <a:t> </a:t>
+              <a:t>Embeddings are low dimensional representation of text data. </a:t>
             </a:r>
+          </a:p>
+          <a:p>
+            <a:pPr lvl="1"/>
             <a:r>
-              <a:rPr lang="en-US" sz="1800" b="0" i="0" u="none" strike="noStrike" dirty="0">
+              <a:rPr lang="en-US" sz="2000" b="0" i="0" u="none" strike="noStrike" dirty="0">
                 <a:solidFill>
-                  <a:schemeClr val="tx1"/>
+                  <a:srgbClr val="000000"/>
                 </a:solidFill>
                 <a:effectLst/>
                 <a:latin typeface="Arial" panose="020B0604020202020204" pitchFamily="34" charset="0"/>
               </a:rPr>
-              <a:t>We propose to build a pipeline that ingests data from major public databases </a:t>
+              <a:t>Embeddings gene</a:t>
             </a:r>
             <a:r>
-              <a:rPr lang="en-US" sz="1800" dirty="0">
+              <a:rPr lang="en-US" sz="2000" dirty="0">
                 <a:solidFill>
-                  <a:schemeClr val="tx1"/>
+                  <a:srgbClr val="000000"/>
                 </a:solidFill>
-              </a:rPr>
-              <a:t>to </a:t>
-            </a:r>
-            <a:r>
-              <a:rPr lang="en-US" sz="1800" b="0" i="0" u="none" strike="noStrike" dirty="0">
-                <a:solidFill>
-                  <a:schemeClr val="tx1"/>
-                </a:solidFill>
-                <a:effectLst/>
                 <a:latin typeface="Arial" panose="020B0604020202020204" pitchFamily="34" charset="0"/>
               </a:rPr>
-              <a:t>highlight the relationship among drug, cancer, and drug targets.</a:t>
+              <a:t>rate by ADA have a maximum of 1536 dimensions.  Apply PCA to reduce dimensions. </a:t>
+            </a:r>
+          </a:p>
+          <a:p>
+            <a:pPr lvl="1"/>
+            <a:r>
+              <a:rPr lang="en-US" sz="2000" dirty="0">
+                <a:solidFill>
+                  <a:srgbClr val="000000"/>
+                </a:solidFill>
+                <a:latin typeface="Arial" panose="020B0604020202020204" pitchFamily="34" charset="0"/>
+              </a:rPr>
+              <a:t>Cluster the tumor names using the embeddings. </a:t>
+            </a:r>
+          </a:p>
+          <a:p>
+            <a:pPr lvl="1"/>
+            <a:r>
+              <a:rPr lang="en-US" sz="2000" dirty="0">
+                <a:solidFill>
+                  <a:srgbClr val="000000"/>
+                </a:solidFill>
+                <a:latin typeface="Arial" panose="020B0604020202020204" pitchFamily="34" charset="0"/>
+              </a:rPr>
+              <a:t>Cost of generating embeddings for 15K diseases ~$6.00 </a:t>
             </a:r>
           </a:p>
           <a:p>
@@ -10079,6 +10116,751 @@
       </p:grpSpPr>
       <p:sp>
         <p:nvSpPr>
+          <p:cNvPr id="2" name="Title 1"/>
+          <p:cNvSpPr>
+            <a:spLocks noGrp="1"/>
+          </p:cNvSpPr>
+          <p:nvPr>
+            <p:ph type="title"/>
+          </p:nvPr>
+        </p:nvSpPr>
+        <p:spPr>
+          <a:xfrm>
+            <a:off x="591117" y="0"/>
+            <a:ext cx="10651402" cy="1143000"/>
+          </a:xfrm>
+        </p:spPr>
+        <p:txBody>
+          <a:bodyPr/>
+          <a:lstStyle/>
+          <a:p>
+            <a:r>
+              <a:rPr lang="en-US" dirty="0"/>
+              <a:t>Standardizing CT tumor names</a:t>
+            </a:r>
+          </a:p>
+        </p:txBody>
+      </p:sp>
+      <p:sp>
+        <p:nvSpPr>
+          <p:cNvPr id="3" name="Content Placeholder 2"/>
+          <p:cNvSpPr>
+            <a:spLocks noGrp="1"/>
+          </p:cNvSpPr>
+          <p:nvPr>
+            <p:ph idx="1"/>
+          </p:nvPr>
+        </p:nvSpPr>
+        <p:spPr>
+          <a:xfrm>
+            <a:off x="591116" y="1143000"/>
+            <a:ext cx="11600884" cy="4663440"/>
+          </a:xfrm>
+        </p:spPr>
+        <p:txBody>
+          <a:bodyPr>
+            <a:noAutofit/>
+          </a:bodyPr>
+          <a:lstStyle/>
+          <a:p>
+            <a:r>
+              <a:rPr lang="en-US" sz="1800" b="0" i="0" u="none" strike="noStrike" dirty="0">
+                <a:solidFill>
+                  <a:srgbClr val="000000"/>
+                </a:solidFill>
+                <a:effectLst/>
+                <a:latin typeface="Arial" panose="020B0604020202020204" pitchFamily="34" charset="0"/>
+              </a:rPr>
+              <a:t>Approach 1 (Edit distance) : Find the pairwise edit distance between every tumor in CT and WHO Tumors, and find the closest WHO tumor. </a:t>
+            </a:r>
+          </a:p>
+          <a:p>
+            <a:endParaRPr lang="en-US" sz="1800" dirty="0">
+              <a:solidFill>
+                <a:srgbClr val="000000"/>
+              </a:solidFill>
+            </a:endParaRPr>
+          </a:p>
+          <a:p>
+            <a:pPr marL="457200" lvl="1" indent="0">
+              <a:buNone/>
+            </a:pPr>
+            <a:endParaRPr lang="en-US" sz="1400" b="0" i="0" u="none" strike="noStrike" dirty="0">
+              <a:solidFill>
+                <a:srgbClr val="000000"/>
+              </a:solidFill>
+              <a:effectLst/>
+              <a:latin typeface="Arial" panose="020B0604020202020204" pitchFamily="34" charset="0"/>
+            </a:endParaRPr>
+          </a:p>
+          <a:p>
+            <a:endParaRPr lang="en-US" sz="1800" dirty="0">
+              <a:solidFill>
+                <a:srgbClr val="000000"/>
+              </a:solidFill>
+            </a:endParaRPr>
+          </a:p>
+          <a:p>
+            <a:endParaRPr lang="en-US" sz="1800" dirty="0">
+              <a:solidFill>
+                <a:srgbClr val="000000"/>
+              </a:solidFill>
+            </a:endParaRPr>
+          </a:p>
+          <a:p>
+            <a:endParaRPr lang="en-US" sz="1800" dirty="0">
+              <a:solidFill>
+                <a:srgbClr val="000000"/>
+              </a:solidFill>
+            </a:endParaRPr>
+          </a:p>
+          <a:p>
+            <a:endParaRPr lang="en-US" sz="1800" dirty="0">
+              <a:solidFill>
+                <a:srgbClr val="000000"/>
+              </a:solidFill>
+            </a:endParaRPr>
+          </a:p>
+          <a:p>
+            <a:endParaRPr lang="en-US" sz="1800" dirty="0">
+              <a:solidFill>
+                <a:srgbClr val="000000"/>
+              </a:solidFill>
+            </a:endParaRPr>
+          </a:p>
+          <a:p>
+            <a:endParaRPr lang="en-US" dirty="0"/>
+          </a:p>
+          <a:p>
+            <a:endParaRPr lang="en-US" dirty="0"/>
+          </a:p>
+        </p:txBody>
+      </p:sp>
+      <p:sp>
+        <p:nvSpPr>
+          <p:cNvPr id="4" name="Slide Number Placeholder 3"/>
+          <p:cNvSpPr>
+            <a:spLocks noGrp="1"/>
+          </p:cNvSpPr>
+          <p:nvPr>
+            <p:ph type="sldNum" sz="quarter" idx="12"/>
+          </p:nvPr>
+        </p:nvSpPr>
+        <p:spPr/>
+        <p:txBody>
+          <a:bodyPr/>
+          <a:lstStyle/>
+          <a:p>
+            <a:fld id="{AD40181A-01B0-4CB8-8614-1473649F6741}" type="slidenum">
+              <a:rPr lang="en-US" smtClean="0">
+                <a:solidFill>
+                  <a:schemeClr val="bg1"/>
+                </a:solidFill>
+              </a:rPr>
+              <a:t>20</a:t>
+            </a:fld>
+            <a:endParaRPr lang="en-US" dirty="0">
+              <a:solidFill>
+                <a:schemeClr val="bg1"/>
+              </a:solidFill>
+            </a:endParaRPr>
+          </a:p>
+        </p:txBody>
+      </p:sp>
+      <p:pic>
+        <p:nvPicPr>
+          <p:cNvPr id="8" name="Picture 7" descr="A diagram of a cancer patient&#10;&#10;Description automatically generated">
+            <a:extLst>
+              <a:ext uri="{FF2B5EF4-FFF2-40B4-BE49-F238E27FC236}">
+                <a16:creationId xmlns:a16="http://schemas.microsoft.com/office/drawing/2014/main" id="{FEA93937-F77D-9402-D568-CBAADABFA2D0}"/>
+              </a:ext>
+            </a:extLst>
+          </p:cNvPr>
+          <p:cNvPicPr>
+            <a:picLocks noChangeAspect="1"/>
+          </p:cNvPicPr>
+          <p:nvPr/>
+        </p:nvPicPr>
+        <p:blipFill>
+          <a:blip r:embed="rId2">
+            <a:extLst>
+              <a:ext uri="{28A0092B-C50C-407E-A947-70E740481C1C}">
+                <a14:useLocalDpi xmlns:a14="http://schemas.microsoft.com/office/drawing/2010/main" val="0"/>
+              </a:ext>
+            </a:extLst>
+          </a:blip>
+          <a:stretch>
+            <a:fillRect/>
+          </a:stretch>
+        </p:blipFill>
+        <p:spPr>
+          <a:xfrm>
+            <a:off x="1156447" y="1437750"/>
+            <a:ext cx="9350188" cy="4643646"/>
+          </a:xfrm>
+          <a:prstGeom prst="rect">
+            <a:avLst/>
+          </a:prstGeom>
+        </p:spPr>
+      </p:pic>
+    </p:spTree>
+    <p:extLst>
+      <p:ext uri="{BB962C8B-B14F-4D97-AF65-F5344CB8AC3E}">
+        <p14:creationId xmlns:p14="http://schemas.microsoft.com/office/powerpoint/2010/main" val="846582669"/>
+      </p:ext>
+    </p:extLst>
+  </p:cSld>
+  <p:clrMapOvr>
+    <a:masterClrMapping/>
+  </p:clrMapOvr>
+</p:sld>
+</file>
+
+<file path=ppt/slides/slide21.xml><?xml version="1.0" encoding="utf-8"?>
+<p:sld xmlns:a="http://schemas.openxmlformats.org/drawingml/2006/main" xmlns:r="http://schemas.openxmlformats.org/officeDocument/2006/relationships" xmlns:p="http://schemas.openxmlformats.org/presentationml/2006/main">
+  <p:cSld>
+    <p:spTree>
+      <p:nvGrpSpPr>
+        <p:cNvPr id="1" name=""/>
+        <p:cNvGrpSpPr/>
+        <p:nvPr/>
+      </p:nvGrpSpPr>
+      <p:grpSpPr>
+        <a:xfrm>
+          <a:off x="0" y="0"/>
+          <a:ext cx="0" cy="0"/>
+          <a:chOff x="0" y="0"/>
+          <a:chExt cx="0" cy="0"/>
+        </a:xfrm>
+      </p:grpSpPr>
+      <p:sp>
+        <p:nvSpPr>
+          <p:cNvPr id="2" name="Title 1"/>
+          <p:cNvSpPr>
+            <a:spLocks noGrp="1"/>
+          </p:cNvSpPr>
+          <p:nvPr>
+            <p:ph type="title"/>
+          </p:nvPr>
+        </p:nvSpPr>
+        <p:spPr>
+          <a:xfrm>
+            <a:off x="591117" y="0"/>
+            <a:ext cx="10651402" cy="1143000"/>
+          </a:xfrm>
+        </p:spPr>
+        <p:txBody>
+          <a:bodyPr/>
+          <a:lstStyle/>
+          <a:p>
+            <a:r>
+              <a:rPr lang="en-US" dirty="0"/>
+              <a:t>Standardizing CT tumor names</a:t>
+            </a:r>
+          </a:p>
+        </p:txBody>
+      </p:sp>
+      <p:sp>
+        <p:nvSpPr>
+          <p:cNvPr id="3" name="Content Placeholder 2"/>
+          <p:cNvSpPr>
+            <a:spLocks noGrp="1"/>
+          </p:cNvSpPr>
+          <p:nvPr>
+            <p:ph idx="1"/>
+          </p:nvPr>
+        </p:nvSpPr>
+        <p:spPr>
+          <a:xfrm>
+            <a:off x="483539" y="915004"/>
+            <a:ext cx="11600884" cy="4663440"/>
+          </a:xfrm>
+        </p:spPr>
+        <p:txBody>
+          <a:bodyPr>
+            <a:noAutofit/>
+          </a:bodyPr>
+          <a:lstStyle/>
+          <a:p>
+            <a:r>
+              <a:rPr lang="en-US" sz="1800" dirty="0">
+                <a:solidFill>
+                  <a:srgbClr val="000000"/>
+                </a:solidFill>
+              </a:rPr>
+              <a:t>Approach 2 (Edit distance + clustering): Use the edit distances as dissimilarity matrix in clustering </a:t>
+            </a:r>
+            <a:r>
+              <a:rPr lang="en-US" sz="1800" dirty="0" err="1">
+                <a:solidFill>
+                  <a:srgbClr val="000000"/>
+                </a:solidFill>
+              </a:rPr>
+              <a:t>algroithms</a:t>
+            </a:r>
+            <a:r>
+              <a:rPr lang="en-US" sz="1800" dirty="0">
+                <a:solidFill>
+                  <a:srgbClr val="000000"/>
+                </a:solidFill>
+              </a:rPr>
+              <a:t> and cluster similar tumors together.  For each cluster member in a given cluster, find the closest matching WHO tumor, the WHO tumor which is represented the most in the cluster is established as the standardized tumor name for that cluster of tumors. </a:t>
+            </a:r>
+          </a:p>
+          <a:p>
+            <a:endParaRPr lang="en-US" sz="1800" dirty="0">
+              <a:solidFill>
+                <a:srgbClr val="000000"/>
+              </a:solidFill>
+            </a:endParaRPr>
+          </a:p>
+          <a:p>
+            <a:pPr marL="457200" lvl="1" indent="0">
+              <a:buNone/>
+            </a:pPr>
+            <a:endParaRPr lang="en-US" sz="1400" b="0" i="0" u="none" strike="noStrike" dirty="0">
+              <a:solidFill>
+                <a:srgbClr val="000000"/>
+              </a:solidFill>
+              <a:effectLst/>
+              <a:latin typeface="Arial" panose="020B0604020202020204" pitchFamily="34" charset="0"/>
+            </a:endParaRPr>
+          </a:p>
+          <a:p>
+            <a:endParaRPr lang="en-US" sz="1800" dirty="0">
+              <a:solidFill>
+                <a:srgbClr val="000000"/>
+              </a:solidFill>
+            </a:endParaRPr>
+          </a:p>
+          <a:p>
+            <a:endParaRPr lang="en-US" sz="1800" dirty="0">
+              <a:solidFill>
+                <a:srgbClr val="000000"/>
+              </a:solidFill>
+            </a:endParaRPr>
+          </a:p>
+          <a:p>
+            <a:endParaRPr lang="en-US" sz="1800" dirty="0">
+              <a:solidFill>
+                <a:srgbClr val="000000"/>
+              </a:solidFill>
+            </a:endParaRPr>
+          </a:p>
+          <a:p>
+            <a:endParaRPr lang="en-US" sz="1800" dirty="0">
+              <a:solidFill>
+                <a:srgbClr val="000000"/>
+              </a:solidFill>
+            </a:endParaRPr>
+          </a:p>
+          <a:p>
+            <a:endParaRPr lang="en-US" sz="1800" dirty="0">
+              <a:solidFill>
+                <a:srgbClr val="000000"/>
+              </a:solidFill>
+            </a:endParaRPr>
+          </a:p>
+          <a:p>
+            <a:endParaRPr lang="en-US" dirty="0"/>
+          </a:p>
+          <a:p>
+            <a:endParaRPr lang="en-US" dirty="0"/>
+          </a:p>
+        </p:txBody>
+      </p:sp>
+      <p:sp>
+        <p:nvSpPr>
+          <p:cNvPr id="4" name="Slide Number Placeholder 3"/>
+          <p:cNvSpPr>
+            <a:spLocks noGrp="1"/>
+          </p:cNvSpPr>
+          <p:nvPr>
+            <p:ph type="sldNum" sz="quarter" idx="12"/>
+          </p:nvPr>
+        </p:nvSpPr>
+        <p:spPr/>
+        <p:txBody>
+          <a:bodyPr/>
+          <a:lstStyle/>
+          <a:p>
+            <a:fld id="{AD40181A-01B0-4CB8-8614-1473649F6741}" type="slidenum">
+              <a:rPr lang="en-US" smtClean="0">
+                <a:solidFill>
+                  <a:schemeClr val="bg1"/>
+                </a:solidFill>
+              </a:rPr>
+              <a:t>21</a:t>
+            </a:fld>
+            <a:endParaRPr lang="en-US" dirty="0">
+              <a:solidFill>
+                <a:schemeClr val="bg1"/>
+              </a:solidFill>
+            </a:endParaRPr>
+          </a:p>
+        </p:txBody>
+      </p:sp>
+      <p:pic>
+        <p:nvPicPr>
+          <p:cNvPr id="11" name="Picture 10" descr="A diagram of a medical procedure&#10;&#10;Description automatically generated">
+            <a:extLst>
+              <a:ext uri="{FF2B5EF4-FFF2-40B4-BE49-F238E27FC236}">
+                <a16:creationId xmlns:a16="http://schemas.microsoft.com/office/drawing/2014/main" id="{66EB9C56-D7DC-7D88-B1D2-13E6ABFE3A82}"/>
+              </a:ext>
+            </a:extLst>
+          </p:cNvPr>
+          <p:cNvPicPr>
+            <a:picLocks noChangeAspect="1"/>
+          </p:cNvPicPr>
+          <p:nvPr/>
+        </p:nvPicPr>
+        <p:blipFill>
+          <a:blip r:embed="rId2">
+            <a:extLst>
+              <a:ext uri="{28A0092B-C50C-407E-A947-70E740481C1C}">
+                <a14:useLocalDpi xmlns:a14="http://schemas.microsoft.com/office/drawing/2010/main" val="0"/>
+              </a:ext>
+            </a:extLst>
+          </a:blip>
+          <a:stretch>
+            <a:fillRect/>
+          </a:stretch>
+        </p:blipFill>
+        <p:spPr>
+          <a:xfrm>
+            <a:off x="591116" y="1935372"/>
+            <a:ext cx="10635087" cy="3900651"/>
+          </a:xfrm>
+          <a:prstGeom prst="rect">
+            <a:avLst/>
+          </a:prstGeom>
+        </p:spPr>
+      </p:pic>
+    </p:spTree>
+    <p:extLst>
+      <p:ext uri="{BB962C8B-B14F-4D97-AF65-F5344CB8AC3E}">
+        <p14:creationId xmlns:p14="http://schemas.microsoft.com/office/powerpoint/2010/main" val="1055254936"/>
+      </p:ext>
+    </p:extLst>
+  </p:cSld>
+  <p:clrMapOvr>
+    <a:masterClrMapping/>
+  </p:clrMapOvr>
+</p:sld>
+</file>
+
+<file path=ppt/slides/slide22.xml><?xml version="1.0" encoding="utf-8"?>
+<p:sld xmlns:a="http://schemas.openxmlformats.org/drawingml/2006/main" xmlns:r="http://schemas.openxmlformats.org/officeDocument/2006/relationships" xmlns:p="http://schemas.openxmlformats.org/presentationml/2006/main">
+  <p:cSld>
+    <p:spTree>
+      <p:nvGrpSpPr>
+        <p:cNvPr id="1" name=""/>
+        <p:cNvGrpSpPr/>
+        <p:nvPr/>
+      </p:nvGrpSpPr>
+      <p:grpSpPr>
+        <a:xfrm>
+          <a:off x="0" y="0"/>
+          <a:ext cx="0" cy="0"/>
+          <a:chOff x="0" y="0"/>
+          <a:chExt cx="0" cy="0"/>
+        </a:xfrm>
+      </p:grpSpPr>
+      <p:sp>
+        <p:nvSpPr>
+          <p:cNvPr id="2" name="Title 1"/>
+          <p:cNvSpPr>
+            <a:spLocks noGrp="1"/>
+          </p:cNvSpPr>
+          <p:nvPr>
+            <p:ph type="title"/>
+          </p:nvPr>
+        </p:nvSpPr>
+        <p:spPr>
+          <a:xfrm>
+            <a:off x="591117" y="0"/>
+            <a:ext cx="10651402" cy="1143000"/>
+          </a:xfrm>
+        </p:spPr>
+        <p:txBody>
+          <a:bodyPr/>
+          <a:lstStyle/>
+          <a:p>
+            <a:r>
+              <a:rPr lang="en-US" dirty="0"/>
+              <a:t>Background</a:t>
+            </a:r>
+          </a:p>
+        </p:txBody>
+      </p:sp>
+      <p:sp>
+        <p:nvSpPr>
+          <p:cNvPr id="3" name="Content Placeholder 2"/>
+          <p:cNvSpPr>
+            <a:spLocks noGrp="1"/>
+          </p:cNvSpPr>
+          <p:nvPr>
+            <p:ph idx="1"/>
+          </p:nvPr>
+        </p:nvSpPr>
+        <p:spPr>
+          <a:xfrm>
+            <a:off x="591116" y="1143000"/>
+            <a:ext cx="11600884" cy="4663440"/>
+          </a:xfrm>
+        </p:spPr>
+        <p:txBody>
+          <a:bodyPr>
+            <a:noAutofit/>
+          </a:bodyPr>
+          <a:lstStyle/>
+          <a:p>
+            <a:r>
+              <a:rPr lang="en-US" sz="1800" b="0" i="0" u="none" strike="noStrike" dirty="0">
+                <a:solidFill>
+                  <a:srgbClr val="000000"/>
+                </a:solidFill>
+                <a:effectLst/>
+                <a:latin typeface="Arial" panose="020B0604020202020204" pitchFamily="34" charset="0"/>
+              </a:rPr>
+              <a:t>There are multiple publicly available databases that outline drug-target ,  drug-disease, and disease-target relationships. </a:t>
+            </a:r>
+          </a:p>
+          <a:p>
+            <a:endParaRPr lang="en-US" sz="1800" dirty="0">
+              <a:solidFill>
+                <a:srgbClr val="000000"/>
+              </a:solidFill>
+            </a:endParaRPr>
+          </a:p>
+          <a:p>
+            <a:r>
+              <a:rPr lang="en-US" sz="1800" b="0" i="0" u="none" strike="noStrike" dirty="0">
+                <a:solidFill>
+                  <a:srgbClr val="000000"/>
+                </a:solidFill>
+                <a:effectLst/>
+                <a:latin typeface="Arial" panose="020B0604020202020204" pitchFamily="34" charset="0"/>
+              </a:rPr>
+              <a:t>However, there is a lack is a lack of publicly available resources that highlight these relationships for cancers , especially pediatric cancer.</a:t>
+            </a:r>
+          </a:p>
+          <a:p>
+            <a:pPr lvl="1"/>
+            <a:r>
+              <a:rPr lang="en-US" sz="1900" dirty="0">
+                <a:solidFill>
+                  <a:srgbClr val="000000"/>
+                </a:solidFill>
+                <a:latin typeface="Arial" panose="020B0604020202020204" pitchFamily="34" charset="0"/>
+              </a:rPr>
+              <a:t>Such a resource can help us understand the drug and target landscape for a particular cancer. </a:t>
+            </a:r>
+            <a:endParaRPr lang="en-US" sz="1900" b="0" i="0" u="none" strike="noStrike" dirty="0">
+              <a:solidFill>
+                <a:srgbClr val="000000"/>
+              </a:solidFill>
+              <a:effectLst/>
+              <a:latin typeface="Arial" panose="020B0604020202020204" pitchFamily="34" charset="0"/>
+            </a:endParaRPr>
+          </a:p>
+          <a:p>
+            <a:endParaRPr lang="en-US" sz="1800" dirty="0">
+              <a:solidFill>
+                <a:srgbClr val="000000"/>
+              </a:solidFill>
+            </a:endParaRPr>
+          </a:p>
+          <a:p>
+            <a:r>
+              <a:rPr lang="en-US" sz="1800" b="0" i="0" u="none" strike="noStrike" dirty="0">
+                <a:solidFill>
+                  <a:srgbClr val="000000"/>
+                </a:solidFill>
+                <a:effectLst/>
+                <a:latin typeface="Arial" panose="020B0604020202020204" pitchFamily="34" charset="0"/>
+              </a:rPr>
+              <a:t>Furthermore, there are limited publicly available resources which elucidate these relationships for drug and disease (specifically cancers) registered in clinical trials database.</a:t>
+            </a:r>
+          </a:p>
+          <a:p>
+            <a:pPr lvl="1"/>
+            <a:r>
+              <a:rPr lang="en-US" sz="1900" b="0" i="0" u="none" strike="noStrike" dirty="0">
+                <a:solidFill>
+                  <a:srgbClr val="000000"/>
+                </a:solidFill>
+                <a:effectLst/>
+                <a:latin typeface="Arial" panose="020B0604020202020204" pitchFamily="34" charset="0"/>
+              </a:rPr>
+              <a:t>In particular, there is a need to identify these relationships for the FDA Pediatric Molecular Target List (FDA-PMTL) , which contains over 400 pediatric cancer gene targets of interest.</a:t>
+            </a:r>
+          </a:p>
+          <a:p>
+            <a:endParaRPr lang="en-US" sz="1800" dirty="0">
+              <a:solidFill>
+                <a:srgbClr val="000000"/>
+              </a:solidFill>
+            </a:endParaRPr>
+          </a:p>
+          <a:p>
+            <a:r>
+              <a:rPr lang="en-US" sz="1800" b="0" i="0" u="none" strike="noStrike" dirty="0">
+                <a:solidFill>
+                  <a:srgbClr val="000000"/>
+                </a:solidFill>
+                <a:effectLst/>
+                <a:latin typeface="Arial" panose="020B0604020202020204" pitchFamily="34" charset="0"/>
+              </a:rPr>
+              <a:t> </a:t>
+            </a:r>
+            <a:r>
+              <a:rPr lang="en-US" sz="1800" b="0" i="0" u="none" strike="noStrike" dirty="0">
+                <a:solidFill>
+                  <a:schemeClr val="tx1"/>
+                </a:solidFill>
+                <a:effectLst/>
+                <a:latin typeface="Arial" panose="020B0604020202020204" pitchFamily="34" charset="0"/>
+              </a:rPr>
+              <a:t>We propose to build a pipeline that ingests data from major public databases </a:t>
+            </a:r>
+            <a:r>
+              <a:rPr lang="en-US" sz="1800" dirty="0">
+                <a:solidFill>
+                  <a:schemeClr val="tx1"/>
+                </a:solidFill>
+              </a:rPr>
+              <a:t>to </a:t>
+            </a:r>
+            <a:r>
+              <a:rPr lang="en-US" sz="1800" b="0" i="0" u="none" strike="noStrike" dirty="0">
+                <a:solidFill>
+                  <a:schemeClr val="tx1"/>
+                </a:solidFill>
+                <a:effectLst/>
+                <a:latin typeface="Arial" panose="020B0604020202020204" pitchFamily="34" charset="0"/>
+              </a:rPr>
+              <a:t>highlight the relationship among drug, cancer, and drug targets.</a:t>
+            </a:r>
+          </a:p>
+          <a:p>
+            <a:pPr marL="457200" lvl="1" indent="0">
+              <a:buNone/>
+            </a:pPr>
+            <a:endParaRPr lang="en-US" sz="1400" b="0" i="0" u="none" strike="noStrike" dirty="0">
+              <a:solidFill>
+                <a:srgbClr val="000000"/>
+              </a:solidFill>
+              <a:effectLst/>
+              <a:latin typeface="Arial" panose="020B0604020202020204" pitchFamily="34" charset="0"/>
+            </a:endParaRPr>
+          </a:p>
+          <a:p>
+            <a:endParaRPr lang="en-US" sz="1800" dirty="0">
+              <a:solidFill>
+                <a:srgbClr val="000000"/>
+              </a:solidFill>
+            </a:endParaRPr>
+          </a:p>
+          <a:p>
+            <a:endParaRPr lang="en-US" sz="1800" dirty="0">
+              <a:solidFill>
+                <a:srgbClr val="000000"/>
+              </a:solidFill>
+            </a:endParaRPr>
+          </a:p>
+          <a:p>
+            <a:endParaRPr lang="en-US" sz="1800" dirty="0">
+              <a:solidFill>
+                <a:srgbClr val="000000"/>
+              </a:solidFill>
+            </a:endParaRPr>
+          </a:p>
+          <a:p>
+            <a:endParaRPr lang="en-US" sz="1800" dirty="0">
+              <a:solidFill>
+                <a:srgbClr val="000000"/>
+              </a:solidFill>
+            </a:endParaRPr>
+          </a:p>
+          <a:p>
+            <a:endParaRPr lang="en-US" sz="1800" dirty="0">
+              <a:solidFill>
+                <a:srgbClr val="000000"/>
+              </a:solidFill>
+            </a:endParaRPr>
+          </a:p>
+          <a:p>
+            <a:endParaRPr lang="en-US" dirty="0"/>
+          </a:p>
+          <a:p>
+            <a:endParaRPr lang="en-US" dirty="0"/>
+          </a:p>
+        </p:txBody>
+      </p:sp>
+      <p:sp>
+        <p:nvSpPr>
+          <p:cNvPr id="4" name="Slide Number Placeholder 3"/>
+          <p:cNvSpPr>
+            <a:spLocks noGrp="1"/>
+          </p:cNvSpPr>
+          <p:nvPr>
+            <p:ph type="sldNum" sz="quarter" idx="12"/>
+          </p:nvPr>
+        </p:nvSpPr>
+        <p:spPr/>
+        <p:txBody>
+          <a:bodyPr/>
+          <a:lstStyle/>
+          <a:p>
+            <a:fld id="{AD40181A-01B0-4CB8-8614-1473649F6741}" type="slidenum">
+              <a:rPr lang="en-US" smtClean="0">
+                <a:solidFill>
+                  <a:schemeClr val="bg1"/>
+                </a:solidFill>
+              </a:rPr>
+              <a:t>22</a:t>
+            </a:fld>
+            <a:endParaRPr lang="en-US" dirty="0">
+              <a:solidFill>
+                <a:schemeClr val="bg1"/>
+              </a:solidFill>
+            </a:endParaRPr>
+          </a:p>
+        </p:txBody>
+      </p:sp>
+    </p:spTree>
+    <p:extLst>
+      <p:ext uri="{BB962C8B-B14F-4D97-AF65-F5344CB8AC3E}">
+        <p14:creationId xmlns:p14="http://schemas.microsoft.com/office/powerpoint/2010/main" val="3836037884"/>
+      </p:ext>
+    </p:extLst>
+  </p:cSld>
+  <p:clrMapOvr>
+    <a:masterClrMapping/>
+  </p:clrMapOvr>
+</p:sld>
+</file>
+
+<file path=ppt/slides/slide23.xml><?xml version="1.0" encoding="utf-8"?>
+<p:sld xmlns:a="http://schemas.openxmlformats.org/drawingml/2006/main" xmlns:r="http://schemas.openxmlformats.org/officeDocument/2006/relationships" xmlns:p="http://schemas.openxmlformats.org/presentationml/2006/main">
+  <p:cSld>
+    <p:spTree>
+      <p:nvGrpSpPr>
+        <p:cNvPr id="1" name=""/>
+        <p:cNvGrpSpPr/>
+        <p:nvPr/>
+      </p:nvGrpSpPr>
+      <p:grpSpPr>
+        <a:xfrm>
+          <a:off x="0" y="0"/>
+          <a:ext cx="0" cy="0"/>
+          <a:chOff x="0" y="0"/>
+          <a:chExt cx="0" cy="0"/>
+        </a:xfrm>
+      </p:grpSpPr>
+      <p:sp>
+        <p:nvSpPr>
           <p:cNvPr id="2" name="Slide Number Placeholder 1"/>
           <p:cNvSpPr>
             <a:spLocks noGrp="1"/>
@@ -10098,7 +10880,7 @@
                   <a:srgbClr val="FFFFFE"/>
                 </a:solidFill>
               </a:rPr>
-              <a:t>20</a:t>
+              <a:t>23</a:t>
             </a:fld>
             <a:endParaRPr lang="en-US" dirty="0">
               <a:solidFill>

</xml_diff>

<commit_message>
updated ppt for Tuesday presentation
</commit_message>
<xml_diff>
--- a/presentations/PMTL_Embedding_Short.pptx
+++ b/presentations/PMTL_Embedding_Short.pptx
@@ -26,11 +26,11 @@
     <p:sldId id="278" r:id="rId20"/>
     <p:sldId id="273" r:id="rId21"/>
     <p:sldId id="280" r:id="rId22"/>
-    <p:sldId id="279" r:id="rId23"/>
-    <p:sldId id="282" r:id="rId24"/>
-    <p:sldId id="283" r:id="rId25"/>
-    <p:sldId id="285" r:id="rId26"/>
-    <p:sldId id="284" r:id="rId27"/>
+    <p:sldId id="282" r:id="rId23"/>
+    <p:sldId id="283" r:id="rId24"/>
+    <p:sldId id="285" r:id="rId25"/>
+    <p:sldId id="284" r:id="rId26"/>
+    <p:sldId id="286" r:id="rId27"/>
     <p:sldId id="281" r:id="rId28"/>
     <p:sldId id="258" r:id="rId29"/>
   </p:sldIdLst>
@@ -9695,8 +9695,8 @@
         </p:nvSpPr>
         <p:spPr>
           <a:xfrm>
-            <a:off x="591117" y="0"/>
-            <a:ext cx="10651402" cy="1143000"/>
+            <a:off x="591116" y="0"/>
+            <a:ext cx="10865777" cy="1143000"/>
           </a:xfrm>
         </p:spPr>
         <p:txBody>
@@ -9705,7 +9705,7 @@
           <a:p>
             <a:r>
               <a:rPr lang="en-US" dirty="0"/>
-              <a:t>Standardizing CT tumor names</a:t>
+              <a:t>Standardizing CT tumor names Method 1</a:t>
             </a:r>
           </a:p>
         </p:txBody>
@@ -9740,7 +9740,7 @@
                 <a:effectLst/>
                 <a:latin typeface="Arial" panose="020B0604020202020204" pitchFamily="34" charset="0"/>
               </a:rPr>
-              <a:t>Approach 1 (Edit distance) : Find the pairwise edit distance between every tumor in CT and WHO Tumors, and find the closest WHO tumor. </a:t>
+              <a:t>Method 1 (Edit Distance) : Find the pairwise edit distance between every tumor in CT and WHO Tumors, and find the closest WHO tumor. </a:t>
             </a:r>
           </a:p>
           <a:p>
@@ -9749,150 +9749,6 @@
                 <a:srgbClr val="000000"/>
               </a:solidFill>
             </a:endParaRPr>
-          </a:p>
-          <a:p>
-            <a:r>
-              <a:rPr lang="en-US" sz="1800" dirty="0">
-                <a:solidFill>
-                  <a:srgbClr val="000000"/>
-                </a:solidFill>
-              </a:rPr>
-              <a:t>Approach 2 (Edit distance + clustering): Use the edit distances as dissimilarity matrix in clustering </a:t>
-            </a:r>
-            <a:r>
-              <a:rPr lang="en-US" sz="1800" dirty="0" err="1">
-                <a:solidFill>
-                  <a:srgbClr val="000000"/>
-                </a:solidFill>
-              </a:rPr>
-              <a:t>algroithms</a:t>
-            </a:r>
-            <a:r>
-              <a:rPr lang="en-US" sz="1800" dirty="0">
-                <a:solidFill>
-                  <a:srgbClr val="000000"/>
-                </a:solidFill>
-              </a:rPr>
-              <a:t> and cluster similar tumors together.  For each cluster member in a given cluster, find the closest matching WHO tumor, the WHO tumor which is represented the most in the cluster is established as the standardized tumor name for that cluster of tumors. </a:t>
-            </a:r>
-          </a:p>
-          <a:p>
-            <a:endParaRPr lang="en-US" sz="1800" dirty="0">
-              <a:solidFill>
-                <a:srgbClr val="000000"/>
-              </a:solidFill>
-            </a:endParaRPr>
-          </a:p>
-          <a:p>
-            <a:r>
-              <a:rPr lang="en-US" sz="1800" b="0" i="0" u="none" strike="noStrike" dirty="0">
-                <a:solidFill>
-                  <a:srgbClr val="000000"/>
-                </a:solidFill>
-                <a:effectLst/>
-                <a:latin typeface="Arial" panose="020B0604020202020204" pitchFamily="34" charset="0"/>
-              </a:rPr>
-              <a:t>Approach 2  (Embeddings + </a:t>
-            </a:r>
-            <a:r>
-              <a:rPr lang="en-US" sz="1800" dirty="0">
-                <a:solidFill>
-                  <a:srgbClr val="000000"/>
-                </a:solidFill>
-              </a:rPr>
-              <a:t>c</a:t>
-            </a:r>
-            <a:r>
-              <a:rPr lang="en-US" sz="1800" b="0" i="0" u="none" strike="noStrike" dirty="0">
-                <a:solidFill>
-                  <a:srgbClr val="000000"/>
-                </a:solidFill>
-                <a:effectLst/>
-                <a:latin typeface="Arial" panose="020B0604020202020204" pitchFamily="34" charset="0"/>
-              </a:rPr>
-              <a:t>lustering): </a:t>
-            </a:r>
-          </a:p>
-          <a:p>
-            <a:pPr lvl="1"/>
-            <a:endParaRPr lang="en-US" sz="1400" dirty="0">
-              <a:solidFill>
-                <a:srgbClr val="000000"/>
-              </a:solidFill>
-              <a:latin typeface="Arial" panose="020B0604020202020204" pitchFamily="34" charset="0"/>
-            </a:endParaRPr>
-          </a:p>
-          <a:p>
-            <a:pPr lvl="1"/>
-            <a:r>
-              <a:rPr lang="en-US" sz="2000" b="0" i="0" u="none" strike="noStrike" dirty="0">
-                <a:solidFill>
-                  <a:srgbClr val="000000"/>
-                </a:solidFill>
-                <a:effectLst/>
-                <a:latin typeface="Arial" panose="020B0604020202020204" pitchFamily="34" charset="0"/>
-              </a:rPr>
-              <a:t>Generate embeddings (convert tumor names to numeric vectors) using Open AI’s ADA 2.0. </a:t>
-            </a:r>
-          </a:p>
-          <a:p>
-            <a:pPr lvl="1"/>
-            <a:r>
-              <a:rPr lang="en-US" sz="2000" b="0" i="0" u="none" strike="noStrike" dirty="0">
-                <a:solidFill>
-                  <a:srgbClr val="000000"/>
-                </a:solidFill>
-                <a:effectLst/>
-                <a:latin typeface="Arial" panose="020B0604020202020204" pitchFamily="34" charset="0"/>
-              </a:rPr>
-              <a:t>Embeddings are low dimensional representation of text data. </a:t>
-            </a:r>
-          </a:p>
-          <a:p>
-            <a:pPr lvl="1"/>
-            <a:r>
-              <a:rPr lang="en-US" sz="2000" b="0" i="0" u="none" strike="noStrike" dirty="0">
-                <a:solidFill>
-                  <a:srgbClr val="000000"/>
-                </a:solidFill>
-                <a:effectLst/>
-                <a:latin typeface="Arial" panose="020B0604020202020204" pitchFamily="34" charset="0"/>
-              </a:rPr>
-              <a:t>Embeddings gene</a:t>
-            </a:r>
-            <a:r>
-              <a:rPr lang="en-US" sz="2000" dirty="0">
-                <a:solidFill>
-                  <a:srgbClr val="000000"/>
-                </a:solidFill>
-                <a:latin typeface="Arial" panose="020B0604020202020204" pitchFamily="34" charset="0"/>
-              </a:rPr>
-              <a:t>rate by ADA have a maximum of 1536 dimensions.  Apply PCA to reduce dimensions. </a:t>
-            </a:r>
-          </a:p>
-          <a:p>
-            <a:pPr lvl="1"/>
-            <a:r>
-              <a:rPr lang="en-US" sz="2000" dirty="0">
-                <a:solidFill>
-                  <a:srgbClr val="000000"/>
-                </a:solidFill>
-                <a:latin typeface="Arial" panose="020B0604020202020204" pitchFamily="34" charset="0"/>
-              </a:rPr>
-              <a:t>Cluster the tumor names using the embeddings. </a:t>
-            </a:r>
-          </a:p>
-          <a:p>
-            <a:pPr lvl="1"/>
-            <a:r>
-              <a:rPr lang="en-US" sz="2000" dirty="0">
-                <a:solidFill>
-                  <a:srgbClr val="000000"/>
-                </a:solidFill>
-                <a:latin typeface="Arial" panose="020B0604020202020204" pitchFamily="34" charset="0"/>
-              </a:rPr>
-              <a:t>Cost of generating embeddings for 15K diseases ~$6.00 </a:t>
-            </a:r>
           </a:p>
           <a:p>
             <a:pPr marL="457200" lvl="1" indent="0">
@@ -9971,295 +9827,6 @@
                 </a:solidFill>
               </a:rPr>
               <a:t>19</a:t>
-            </a:fld>
-            <a:endParaRPr lang="en-US" dirty="0">
-              <a:solidFill>
-                <a:schemeClr val="bg1"/>
-              </a:solidFill>
-            </a:endParaRPr>
-          </a:p>
-        </p:txBody>
-      </p:sp>
-    </p:spTree>
-    <p:extLst>
-      <p:ext uri="{BB962C8B-B14F-4D97-AF65-F5344CB8AC3E}">
-        <p14:creationId xmlns:p14="http://schemas.microsoft.com/office/powerpoint/2010/main" val="3134771933"/>
-      </p:ext>
-    </p:extLst>
-  </p:cSld>
-  <p:clrMapOvr>
-    <a:masterClrMapping/>
-  </p:clrMapOvr>
-</p:sld>
-</file>
-
-<file path=ppt/slides/slide2.xml><?xml version="1.0" encoding="utf-8"?>
-<p:sld xmlns:a="http://schemas.openxmlformats.org/drawingml/2006/main" xmlns:r="http://schemas.openxmlformats.org/officeDocument/2006/relationships" xmlns:p="http://schemas.openxmlformats.org/presentationml/2006/main">
-  <p:cSld>
-    <p:spTree>
-      <p:nvGrpSpPr>
-        <p:cNvPr id="1" name=""/>
-        <p:cNvGrpSpPr/>
-        <p:nvPr/>
-      </p:nvGrpSpPr>
-      <p:grpSpPr>
-        <a:xfrm>
-          <a:off x="0" y="0"/>
-          <a:ext cx="0" cy="0"/>
-          <a:chOff x="0" y="0"/>
-          <a:chExt cx="0" cy="0"/>
-        </a:xfrm>
-      </p:grpSpPr>
-      <p:sp>
-        <p:nvSpPr>
-          <p:cNvPr id="3" name="Title 2"/>
-          <p:cNvSpPr>
-            <a:spLocks noGrp="1"/>
-          </p:cNvSpPr>
-          <p:nvPr>
-            <p:ph type="ctrTitle"/>
-          </p:nvPr>
-        </p:nvSpPr>
-        <p:spPr>
-          <a:xfrm>
-            <a:off x="180801" y="758309"/>
-            <a:ext cx="6320012" cy="1544541"/>
-          </a:xfrm>
-        </p:spPr>
-        <p:txBody>
-          <a:bodyPr/>
-          <a:lstStyle/>
-          <a:p>
-            <a:r>
-              <a:rPr lang="en-US" dirty="0"/>
-              <a:t>PART 1</a:t>
-            </a:r>
-          </a:p>
-        </p:txBody>
-      </p:sp>
-      <p:sp>
-        <p:nvSpPr>
-          <p:cNvPr id="4" name="Slide Number Placeholder 3"/>
-          <p:cNvSpPr>
-            <a:spLocks noGrp="1"/>
-          </p:cNvSpPr>
-          <p:nvPr>
-            <p:ph type="sldNum" sz="quarter" idx="12"/>
-          </p:nvPr>
-        </p:nvSpPr>
-        <p:spPr/>
-        <p:txBody>
-          <a:bodyPr/>
-          <a:lstStyle/>
-          <a:p>
-            <a:fld id="{AD40181A-01B0-4CB8-8614-1473649F6741}" type="slidenum">
-              <a:rPr lang="en-US" smtClean="0"/>
-              <a:t>2</a:t>
-            </a:fld>
-            <a:endParaRPr lang="en-US" dirty="0"/>
-          </a:p>
-        </p:txBody>
-      </p:sp>
-      <p:sp>
-        <p:nvSpPr>
-          <p:cNvPr id="2" name="TextBox 1"/>
-          <p:cNvSpPr txBox="1"/>
-          <p:nvPr/>
-        </p:nvSpPr>
-        <p:spPr>
-          <a:xfrm>
-            <a:off x="8247758" y="1780652"/>
-            <a:ext cx="184666" cy="369332"/>
-          </a:xfrm>
-          <a:prstGeom prst="rect">
-            <a:avLst/>
-          </a:prstGeom>
-          <a:noFill/>
-        </p:spPr>
-        <p:txBody>
-          <a:bodyPr wrap="none" rtlCol="0">
-            <a:spAutoFit/>
-          </a:bodyPr>
-          <a:lstStyle/>
-          <a:p>
-            <a:endParaRPr lang="en-US" dirty="0"/>
-          </a:p>
-        </p:txBody>
-      </p:sp>
-    </p:spTree>
-    <p:extLst>
-      <p:ext uri="{BB962C8B-B14F-4D97-AF65-F5344CB8AC3E}">
-        <p14:creationId xmlns:p14="http://schemas.microsoft.com/office/powerpoint/2010/main" val="304241821"/>
-      </p:ext>
-    </p:extLst>
-  </p:cSld>
-  <p:clrMapOvr>
-    <a:masterClrMapping/>
-  </p:clrMapOvr>
-</p:sld>
-</file>
-
-<file path=ppt/slides/slide20.xml><?xml version="1.0" encoding="utf-8"?>
-<p:sld xmlns:a="http://schemas.openxmlformats.org/drawingml/2006/main" xmlns:r="http://schemas.openxmlformats.org/officeDocument/2006/relationships" xmlns:p="http://schemas.openxmlformats.org/presentationml/2006/main">
-  <p:cSld>
-    <p:spTree>
-      <p:nvGrpSpPr>
-        <p:cNvPr id="1" name=""/>
-        <p:cNvGrpSpPr/>
-        <p:nvPr/>
-      </p:nvGrpSpPr>
-      <p:grpSpPr>
-        <a:xfrm>
-          <a:off x="0" y="0"/>
-          <a:ext cx="0" cy="0"/>
-          <a:chOff x="0" y="0"/>
-          <a:chExt cx="0" cy="0"/>
-        </a:xfrm>
-      </p:grpSpPr>
-      <p:sp>
-        <p:nvSpPr>
-          <p:cNvPr id="2" name="Title 1"/>
-          <p:cNvSpPr>
-            <a:spLocks noGrp="1"/>
-          </p:cNvSpPr>
-          <p:nvPr>
-            <p:ph type="title"/>
-          </p:nvPr>
-        </p:nvSpPr>
-        <p:spPr>
-          <a:xfrm>
-            <a:off x="591116" y="0"/>
-            <a:ext cx="10865777" cy="1143000"/>
-          </a:xfrm>
-        </p:spPr>
-        <p:txBody>
-          <a:bodyPr/>
-          <a:lstStyle/>
-          <a:p>
-            <a:r>
-              <a:rPr lang="en-US" dirty="0"/>
-              <a:t>Standardizing CT tumor names Method 1</a:t>
-            </a:r>
-          </a:p>
-        </p:txBody>
-      </p:sp>
-      <p:sp>
-        <p:nvSpPr>
-          <p:cNvPr id="3" name="Content Placeholder 2"/>
-          <p:cNvSpPr>
-            <a:spLocks noGrp="1"/>
-          </p:cNvSpPr>
-          <p:nvPr>
-            <p:ph idx="1"/>
-          </p:nvPr>
-        </p:nvSpPr>
-        <p:spPr>
-          <a:xfrm>
-            <a:off x="591116" y="1143000"/>
-            <a:ext cx="11600884" cy="4663440"/>
-          </a:xfrm>
-        </p:spPr>
-        <p:txBody>
-          <a:bodyPr>
-            <a:noAutofit/>
-          </a:bodyPr>
-          <a:lstStyle/>
-          <a:p>
-            <a:r>
-              <a:rPr lang="en-US" sz="1800" b="0" i="0" u="none" strike="noStrike" dirty="0">
-                <a:solidFill>
-                  <a:srgbClr val="000000"/>
-                </a:solidFill>
-                <a:effectLst/>
-                <a:latin typeface="Arial" panose="020B0604020202020204" pitchFamily="34" charset="0"/>
-              </a:rPr>
-              <a:t>Method 1 (Edit Distance) : Find the pairwise edit distance between every tumor in CT and WHO Tumors, and find the closest WHO tumor. </a:t>
-            </a:r>
-          </a:p>
-          <a:p>
-            <a:endParaRPr lang="en-US" sz="1800" dirty="0">
-              <a:solidFill>
-                <a:srgbClr val="000000"/>
-              </a:solidFill>
-            </a:endParaRPr>
-          </a:p>
-          <a:p>
-            <a:pPr marL="457200" lvl="1" indent="0">
-              <a:buNone/>
-            </a:pPr>
-            <a:endParaRPr lang="en-US" sz="1400" b="0" i="0" u="none" strike="noStrike" dirty="0">
-              <a:solidFill>
-                <a:srgbClr val="000000"/>
-              </a:solidFill>
-              <a:effectLst/>
-              <a:latin typeface="Arial" panose="020B0604020202020204" pitchFamily="34" charset="0"/>
-            </a:endParaRPr>
-          </a:p>
-          <a:p>
-            <a:endParaRPr lang="en-US" sz="1800" dirty="0">
-              <a:solidFill>
-                <a:srgbClr val="000000"/>
-              </a:solidFill>
-            </a:endParaRPr>
-          </a:p>
-          <a:p>
-            <a:endParaRPr lang="en-US" sz="1800" dirty="0">
-              <a:solidFill>
-                <a:srgbClr val="000000"/>
-              </a:solidFill>
-            </a:endParaRPr>
-          </a:p>
-          <a:p>
-            <a:endParaRPr lang="en-US" sz="1800" dirty="0">
-              <a:solidFill>
-                <a:srgbClr val="000000"/>
-              </a:solidFill>
-            </a:endParaRPr>
-          </a:p>
-          <a:p>
-            <a:endParaRPr lang="en-US" sz="1800" dirty="0">
-              <a:solidFill>
-                <a:srgbClr val="000000"/>
-              </a:solidFill>
-            </a:endParaRPr>
-          </a:p>
-          <a:p>
-            <a:endParaRPr lang="en-US" sz="1800" dirty="0">
-              <a:solidFill>
-                <a:srgbClr val="000000"/>
-              </a:solidFill>
-            </a:endParaRPr>
-          </a:p>
-          <a:p>
-            <a:endParaRPr lang="en-US" dirty="0"/>
-          </a:p>
-          <a:p>
-            <a:endParaRPr lang="en-US" dirty="0"/>
-          </a:p>
-        </p:txBody>
-      </p:sp>
-      <p:sp>
-        <p:nvSpPr>
-          <p:cNvPr id="4" name="Slide Number Placeholder 3"/>
-          <p:cNvSpPr>
-            <a:spLocks noGrp="1"/>
-          </p:cNvSpPr>
-          <p:nvPr>
-            <p:ph type="sldNum" sz="quarter" idx="12"/>
-          </p:nvPr>
-        </p:nvSpPr>
-        <p:spPr/>
-        <p:txBody>
-          <a:bodyPr/>
-          <a:lstStyle/>
-          <a:p>
-            <a:fld id="{AD40181A-01B0-4CB8-8614-1473649F6741}" type="slidenum">
-              <a:rPr lang="en-US" smtClean="0">
-                <a:solidFill>
-                  <a:schemeClr val="bg1"/>
-                </a:solidFill>
-              </a:rPr>
-              <a:t>20</a:t>
             </a:fld>
             <a:endParaRPr lang="en-US" dirty="0">
               <a:solidFill>
@@ -10318,7 +9885,113 @@
 </p:sld>
 </file>
 
-<file path=ppt/slides/slide21.xml><?xml version="1.0" encoding="utf-8"?>
+<file path=ppt/slides/slide2.xml><?xml version="1.0" encoding="utf-8"?>
+<p:sld xmlns:a="http://schemas.openxmlformats.org/drawingml/2006/main" xmlns:r="http://schemas.openxmlformats.org/officeDocument/2006/relationships" xmlns:p="http://schemas.openxmlformats.org/presentationml/2006/main">
+  <p:cSld>
+    <p:spTree>
+      <p:nvGrpSpPr>
+        <p:cNvPr id="1" name=""/>
+        <p:cNvGrpSpPr/>
+        <p:nvPr/>
+      </p:nvGrpSpPr>
+      <p:grpSpPr>
+        <a:xfrm>
+          <a:off x="0" y="0"/>
+          <a:ext cx="0" cy="0"/>
+          <a:chOff x="0" y="0"/>
+          <a:chExt cx="0" cy="0"/>
+        </a:xfrm>
+      </p:grpSpPr>
+      <p:sp>
+        <p:nvSpPr>
+          <p:cNvPr id="3" name="Title 2"/>
+          <p:cNvSpPr>
+            <a:spLocks noGrp="1"/>
+          </p:cNvSpPr>
+          <p:nvPr>
+            <p:ph type="ctrTitle"/>
+          </p:nvPr>
+        </p:nvSpPr>
+        <p:spPr>
+          <a:xfrm>
+            <a:off x="180801" y="758309"/>
+            <a:ext cx="6320012" cy="1544541"/>
+          </a:xfrm>
+        </p:spPr>
+        <p:txBody>
+          <a:bodyPr/>
+          <a:lstStyle/>
+          <a:p>
+            <a:r>
+              <a:rPr lang="en-US" dirty="0"/>
+              <a:t>PART 1</a:t>
+            </a:r>
+          </a:p>
+        </p:txBody>
+      </p:sp>
+      <p:sp>
+        <p:nvSpPr>
+          <p:cNvPr id="4" name="Slide Number Placeholder 3"/>
+          <p:cNvSpPr>
+            <a:spLocks noGrp="1"/>
+          </p:cNvSpPr>
+          <p:nvPr>
+            <p:ph type="sldNum" sz="quarter" idx="12"/>
+          </p:nvPr>
+        </p:nvSpPr>
+        <p:spPr/>
+        <p:txBody>
+          <a:bodyPr/>
+          <a:lstStyle/>
+          <a:p>
+            <a:fld id="{AD40181A-01B0-4CB8-8614-1473649F6741}" type="slidenum">
+              <a:rPr lang="en-US" smtClean="0"/>
+              <a:t>2</a:t>
+            </a:fld>
+            <a:endParaRPr lang="en-US" dirty="0"/>
+          </a:p>
+        </p:txBody>
+      </p:sp>
+      <p:sp>
+        <p:nvSpPr>
+          <p:cNvPr id="2" name="TextBox 1"/>
+          <p:cNvSpPr txBox="1"/>
+          <p:nvPr/>
+        </p:nvSpPr>
+        <p:spPr>
+          <a:xfrm>
+            <a:off x="8247758" y="1780652"/>
+            <a:ext cx="184666" cy="369332"/>
+          </a:xfrm>
+          <a:prstGeom prst="rect">
+            <a:avLst/>
+          </a:prstGeom>
+          <a:noFill/>
+        </p:spPr>
+        <p:txBody>
+          <a:bodyPr wrap="none" rtlCol="0">
+            <a:spAutoFit/>
+          </a:bodyPr>
+          <a:lstStyle/>
+          <a:p>
+            <a:endParaRPr lang="en-US" dirty="0"/>
+          </a:p>
+        </p:txBody>
+      </p:sp>
+    </p:spTree>
+    <p:extLst>
+      <p:ext uri="{BB962C8B-B14F-4D97-AF65-F5344CB8AC3E}">
+        <p14:creationId xmlns:p14="http://schemas.microsoft.com/office/powerpoint/2010/main" val="304241821"/>
+      </p:ext>
+    </p:extLst>
+  </p:cSld>
+  <p:clrMapOvr>
+    <a:masterClrMapping/>
+  </p:clrMapOvr>
+</p:sld>
+</file>
+
+<file path=ppt/slides/slide20.xml><?xml version="1.0" encoding="utf-8"?>
 <p:sld xmlns:a="http://schemas.openxmlformats.org/drawingml/2006/main" xmlns:r="http://schemas.openxmlformats.org/officeDocument/2006/relationships" xmlns:p="http://schemas.openxmlformats.org/presentationml/2006/main">
   <p:cSld>
     <p:spTree>
@@ -10492,7 +10165,7 @@
                   <a:schemeClr val="bg1"/>
                 </a:solidFill>
               </a:rPr>
-              <a:t>21</a:t>
+              <a:t>20</a:t>
             </a:fld>
             <a:endParaRPr lang="en-US" dirty="0">
               <a:solidFill>
@@ -10551,7 +10224,7 @@
 </p:sld>
 </file>
 
-<file path=ppt/slides/slide22.xml><?xml version="1.0" encoding="utf-8"?>
+<file path=ppt/slides/slide21.xml><?xml version="1.0" encoding="utf-8"?>
 <p:sld xmlns:a="http://schemas.openxmlformats.org/drawingml/2006/main" xmlns:r="http://schemas.openxmlformats.org/officeDocument/2006/relationships" xmlns:p="http://schemas.openxmlformats.org/presentationml/2006/main">
   <p:cSld>
     <p:spTree>
@@ -10797,7 +10470,7 @@
                   <a:schemeClr val="bg1"/>
                 </a:solidFill>
               </a:rPr>
-              <a:t>22</a:t>
+              <a:t>21</a:t>
             </a:fld>
             <a:endParaRPr lang="en-US" dirty="0">
               <a:solidFill>
@@ -10856,7 +10529,7 @@
 </p:sld>
 </file>
 
-<file path=ppt/slides/slide23.xml><?xml version="1.0" encoding="utf-8"?>
+<file path=ppt/slides/slide22.xml><?xml version="1.0" encoding="utf-8"?>
 <p:sld xmlns:a="http://schemas.openxmlformats.org/drawingml/2006/main" xmlns:r="http://schemas.openxmlformats.org/officeDocument/2006/relationships" xmlns:p="http://schemas.openxmlformats.org/presentationml/2006/main">
   <p:cSld>
     <p:spTree>
@@ -11107,7 +10780,7 @@
                   <a:schemeClr val="bg1"/>
                 </a:solidFill>
               </a:rPr>
-              <a:t>23</a:t>
+              <a:t>22</a:t>
             </a:fld>
             <a:endParaRPr lang="en-US" dirty="0">
               <a:solidFill>
@@ -11166,6 +10839,284 @@
 </p:sld>
 </file>
 
+<file path=ppt/slides/slide23.xml><?xml version="1.0" encoding="utf-8"?>
+<p:sld xmlns:a="http://schemas.openxmlformats.org/drawingml/2006/main" xmlns:r="http://schemas.openxmlformats.org/officeDocument/2006/relationships" xmlns:p="http://schemas.openxmlformats.org/presentationml/2006/main">
+  <p:cSld>
+    <p:spTree>
+      <p:nvGrpSpPr>
+        <p:cNvPr id="1" name=""/>
+        <p:cNvGrpSpPr/>
+        <p:nvPr/>
+      </p:nvGrpSpPr>
+      <p:grpSpPr>
+        <a:xfrm>
+          <a:off x="0" y="0"/>
+          <a:ext cx="0" cy="0"/>
+          <a:chOff x="0" y="0"/>
+          <a:chExt cx="0" cy="0"/>
+        </a:xfrm>
+      </p:grpSpPr>
+      <p:sp>
+        <p:nvSpPr>
+          <p:cNvPr id="2" name="Title 1"/>
+          <p:cNvSpPr>
+            <a:spLocks noGrp="1"/>
+          </p:cNvSpPr>
+          <p:nvPr>
+            <p:ph type="title"/>
+          </p:nvPr>
+        </p:nvSpPr>
+        <p:spPr>
+          <a:xfrm>
+            <a:off x="591117" y="0"/>
+            <a:ext cx="10803024" cy="1192306"/>
+          </a:xfrm>
+        </p:spPr>
+        <p:txBody>
+          <a:bodyPr/>
+          <a:lstStyle/>
+          <a:p>
+            <a:r>
+              <a:rPr lang="en-US" dirty="0"/>
+              <a:t>Method Evaluation</a:t>
+            </a:r>
+          </a:p>
+        </p:txBody>
+      </p:sp>
+      <p:sp>
+        <p:nvSpPr>
+          <p:cNvPr id="3" name="Content Placeholder 2"/>
+          <p:cNvSpPr>
+            <a:spLocks noGrp="1"/>
+          </p:cNvSpPr>
+          <p:nvPr>
+            <p:ph idx="1"/>
+          </p:nvPr>
+        </p:nvSpPr>
+        <p:spPr>
+          <a:xfrm>
+            <a:off x="483539" y="915004"/>
+            <a:ext cx="11600884" cy="4663440"/>
+          </a:xfrm>
+        </p:spPr>
+        <p:txBody>
+          <a:bodyPr>
+            <a:noAutofit/>
+          </a:bodyPr>
+          <a:lstStyle/>
+          <a:p>
+            <a:r>
+              <a:rPr lang="en-US" sz="1800" dirty="0">
+                <a:solidFill>
+                  <a:srgbClr val="000000"/>
+                </a:solidFill>
+              </a:rPr>
+              <a:t>We went over the 800,000 diseases in CT databases, and selected the diseases which were associated with a drug registered in clinical </a:t>
+            </a:r>
+            <a:r>
+              <a:rPr lang="en-US" sz="1800" dirty="0" err="1">
+                <a:solidFill>
+                  <a:srgbClr val="000000"/>
+                </a:solidFill>
+              </a:rPr>
+              <a:t>trials,and</a:t>
+            </a:r>
+            <a:r>
+              <a:rPr lang="en-US" sz="1800" dirty="0">
+                <a:solidFill>
+                  <a:srgbClr val="000000"/>
+                </a:solidFill>
+              </a:rPr>
+              <a:t> removed instances of duplicate diseases. </a:t>
+            </a:r>
+          </a:p>
+          <a:p>
+            <a:endParaRPr lang="en-US" sz="1800" dirty="0">
+              <a:solidFill>
+                <a:srgbClr val="000000"/>
+              </a:solidFill>
+            </a:endParaRPr>
+          </a:p>
+          <a:p>
+            <a:r>
+              <a:rPr lang="en-US" sz="1800" dirty="0">
+                <a:solidFill>
+                  <a:srgbClr val="000000"/>
+                </a:solidFill>
+              </a:rPr>
+              <a:t>After filtering the diseases, we identified 13K unique tumors in the CT database .</a:t>
+            </a:r>
+          </a:p>
+          <a:p>
+            <a:endParaRPr lang="en-US" sz="1800" dirty="0">
+              <a:solidFill>
+                <a:srgbClr val="000000"/>
+              </a:solidFill>
+            </a:endParaRPr>
+          </a:p>
+          <a:p>
+            <a:r>
+              <a:rPr lang="en-US" sz="1800" dirty="0">
+                <a:solidFill>
+                  <a:srgbClr val="000000"/>
+                </a:solidFill>
+              </a:rPr>
+              <a:t>We randomly selected 1600  tumors from the CT database to evaluate the performance of our methods. Out of which 578 tumors had a viable ground truth , i.e., they could be mapped to tumor name in the WHO database.  There many tumor in the CT database which cannot be mapped to a WHO Tumor. For instance, consider the CT tumor :  “Triple Negative Breast Cancer”, this term is not present in the WHO Tumor database (5</a:t>
+            </a:r>
+            <a:r>
+              <a:rPr lang="en-US" sz="1800" baseline="30000" dirty="0">
+                <a:solidFill>
+                  <a:srgbClr val="000000"/>
+                </a:solidFill>
+              </a:rPr>
+              <a:t>th</a:t>
+            </a:r>
+            <a:r>
+              <a:rPr lang="en-US" sz="1800" dirty="0">
+                <a:solidFill>
+                  <a:srgbClr val="000000"/>
+                </a:solidFill>
+              </a:rPr>
+              <a:t> Edition).  Thus, for such tumors our methods cannot be expected to perform.</a:t>
+            </a:r>
+          </a:p>
+          <a:p>
+            <a:endParaRPr lang="en-US" sz="1800" dirty="0">
+              <a:solidFill>
+                <a:srgbClr val="000000"/>
+              </a:solidFill>
+            </a:endParaRPr>
+          </a:p>
+          <a:p>
+            <a:r>
+              <a:rPr lang="en-US" sz="1800" dirty="0">
+                <a:solidFill>
+                  <a:srgbClr val="000000"/>
+                </a:solidFill>
+              </a:rPr>
+              <a:t>In the next slide we present the accuracy of each method with respect to the 578 tumors in for which we identified a viable tumor name (ground truth) from the WHO database.</a:t>
+            </a:r>
+          </a:p>
+          <a:p>
+            <a:endParaRPr lang="en-US" sz="1800" dirty="0">
+              <a:solidFill>
+                <a:srgbClr val="000000"/>
+              </a:solidFill>
+            </a:endParaRPr>
+          </a:p>
+          <a:p>
+            <a:endParaRPr lang="en-US" sz="1800" dirty="0">
+              <a:solidFill>
+                <a:srgbClr val="000000"/>
+              </a:solidFill>
+            </a:endParaRPr>
+          </a:p>
+          <a:p>
+            <a:endParaRPr lang="en-US" sz="1800" dirty="0">
+              <a:solidFill>
+                <a:srgbClr val="000000"/>
+              </a:solidFill>
+            </a:endParaRPr>
+          </a:p>
+          <a:p>
+            <a:pPr marL="457200" lvl="1" indent="0">
+              <a:buNone/>
+            </a:pPr>
+            <a:endParaRPr lang="en-US" sz="1400" b="0" i="0" u="none" strike="noStrike" dirty="0">
+              <a:solidFill>
+                <a:srgbClr val="000000"/>
+              </a:solidFill>
+              <a:effectLst/>
+              <a:latin typeface="Arial" panose="020B0604020202020204" pitchFamily="34" charset="0"/>
+            </a:endParaRPr>
+          </a:p>
+          <a:p>
+            <a:endParaRPr lang="en-US" sz="1800" dirty="0">
+              <a:solidFill>
+                <a:srgbClr val="000000"/>
+              </a:solidFill>
+            </a:endParaRPr>
+          </a:p>
+          <a:p>
+            <a:endParaRPr lang="en-US" sz="1800" dirty="0">
+              <a:solidFill>
+                <a:srgbClr val="000000"/>
+              </a:solidFill>
+            </a:endParaRPr>
+          </a:p>
+          <a:p>
+            <a:endParaRPr lang="en-US" sz="1800" dirty="0">
+              <a:solidFill>
+                <a:srgbClr val="000000"/>
+              </a:solidFill>
+            </a:endParaRPr>
+          </a:p>
+          <a:p>
+            <a:endParaRPr lang="en-US" sz="1800" dirty="0">
+              <a:solidFill>
+                <a:srgbClr val="000000"/>
+              </a:solidFill>
+            </a:endParaRPr>
+          </a:p>
+          <a:p>
+            <a:endParaRPr lang="en-US" sz="1800" dirty="0">
+              <a:solidFill>
+                <a:srgbClr val="000000"/>
+              </a:solidFill>
+            </a:endParaRPr>
+          </a:p>
+          <a:p>
+            <a:endParaRPr lang="en-US" dirty="0"/>
+          </a:p>
+          <a:p>
+            <a:endParaRPr lang="en-US" dirty="0"/>
+          </a:p>
+        </p:txBody>
+      </p:sp>
+      <p:sp>
+        <p:nvSpPr>
+          <p:cNvPr id="4" name="Slide Number Placeholder 3"/>
+          <p:cNvSpPr>
+            <a:spLocks noGrp="1"/>
+          </p:cNvSpPr>
+          <p:nvPr>
+            <p:ph type="sldNum" sz="quarter" idx="12"/>
+          </p:nvPr>
+        </p:nvSpPr>
+        <p:spPr/>
+        <p:txBody>
+          <a:bodyPr/>
+          <a:lstStyle/>
+          <a:p>
+            <a:fld id="{AD40181A-01B0-4CB8-8614-1473649F6741}" type="slidenum">
+              <a:rPr lang="en-US" smtClean="0">
+                <a:solidFill>
+                  <a:schemeClr val="bg1"/>
+                </a:solidFill>
+              </a:rPr>
+              <a:t>23</a:t>
+            </a:fld>
+            <a:endParaRPr lang="en-US" dirty="0">
+              <a:solidFill>
+                <a:schemeClr val="bg1"/>
+              </a:solidFill>
+            </a:endParaRPr>
+          </a:p>
+        </p:txBody>
+      </p:sp>
+    </p:spTree>
+    <p:extLst>
+      <p:ext uri="{BB962C8B-B14F-4D97-AF65-F5344CB8AC3E}">
+        <p14:creationId xmlns:p14="http://schemas.microsoft.com/office/powerpoint/2010/main" val="4031105910"/>
+      </p:ext>
+    </p:extLst>
+  </p:cSld>
+  <p:clrMapOvr>
+    <a:masterClrMapping/>
+  </p:clrMapOvr>
+</p:sld>
+</file>
+
 <file path=ppt/slides/slide24.xml><?xml version="1.0" encoding="utf-8"?>
 <p:sld xmlns:a="http://schemas.openxmlformats.org/drawingml/2006/main" xmlns:r="http://schemas.openxmlformats.org/officeDocument/2006/relationships" xmlns:p="http://schemas.openxmlformats.org/presentationml/2006/main">
   <p:cSld>
@@ -11890,6 +11841,55 @@
           </a:graphicData>
         </a:graphic>
       </p:graphicFrame>
+      <p:sp>
+        <p:nvSpPr>
+          <p:cNvPr id="8" name="Cloud 7">
+            <a:extLst>
+              <a:ext uri="{FF2B5EF4-FFF2-40B4-BE49-F238E27FC236}">
+                <a16:creationId xmlns:a16="http://schemas.microsoft.com/office/drawing/2014/main" id="{F45B766C-7BB1-9946-3687-9CA8231DE9ED}"/>
+              </a:ext>
+            </a:extLst>
+          </p:cNvPr>
+          <p:cNvSpPr/>
+          <p:nvPr/>
+        </p:nvSpPr>
+        <p:spPr>
+          <a:xfrm>
+            <a:off x="10036629" y="1426029"/>
+            <a:ext cx="2079171" cy="1774371"/>
+          </a:xfrm>
+          <a:prstGeom prst="cloud">
+            <a:avLst/>
+          </a:prstGeom>
+        </p:spPr>
+        <p:style>
+          <a:lnRef idx="2">
+            <a:schemeClr val="accent1">
+              <a:shade val="15000"/>
+            </a:schemeClr>
+          </a:lnRef>
+          <a:fillRef idx="1">
+            <a:schemeClr val="accent1"/>
+          </a:fillRef>
+          <a:effectRef idx="0">
+            <a:schemeClr val="accent1"/>
+          </a:effectRef>
+          <a:fontRef idx="minor">
+            <a:schemeClr val="lt1"/>
+          </a:fontRef>
+        </p:style>
+        <p:txBody>
+          <a:bodyPr rtlCol="0" anchor="ctr"/>
+          <a:lstStyle/>
+          <a:p>
+            <a:pPr algn="ctr"/>
+            <a:r>
+              <a:rPr lang="en-US" dirty="0"/>
+              <a:t>Results for 578 CT tumors</a:t>
+            </a:r>
+          </a:p>
+        </p:txBody>
+      </p:sp>
     </p:spTree>
     <p:extLst>
       <p:ext uri="{BB962C8B-B14F-4D97-AF65-F5344CB8AC3E}">

</xml_diff>